<commit_message>
poster almost ready for print
</commit_message>
<xml_diff>
--- a/GFSTimeClock/WIPposter.pptx
+++ b/GFSTimeClock/WIPposter.pptx
@@ -212,7 +212,7 @@
             <a:fld id="{0774E6B3-4EE3-434C-B9AF-BFD4E40BBE89}" type="datetimeFigureOut">
               <a:rPr lang="en-US" smtClean="0"/>
               <a:pPr/>
-              <a:t>4/10/17</a:t>
+              <a:t>4/11/17</a:t>
             </a:fld>
             <a:endParaRPr lang="en-US" dirty="0"/>
           </a:p>
@@ -789,7 +789,7 @@
             <a:fld id="{985D6BDF-9D0E-4E2B-85B8-D8F4790360C9}" type="datetimeFigureOut">
               <a:rPr lang="en-US" smtClean="0"/>
               <a:pPr/>
-              <a:t>4/10/17</a:t>
+              <a:t>4/11/17</a:t>
             </a:fld>
             <a:endParaRPr lang="en-US" dirty="0"/>
           </a:p>
@@ -994,7 +994,7 @@
             <a:fld id="{985D6BDF-9D0E-4E2B-85B8-D8F4790360C9}" type="datetimeFigureOut">
               <a:rPr lang="en-US" smtClean="0"/>
               <a:pPr/>
-              <a:t>4/10/17</a:t>
+              <a:t>4/11/17</a:t>
             </a:fld>
             <a:endParaRPr lang="en-US" dirty="0"/>
           </a:p>
@@ -1247,7 +1247,7 @@
             <a:fld id="{985D6BDF-9D0E-4E2B-85B8-D8F4790360C9}" type="datetimeFigureOut">
               <a:rPr lang="en-US" smtClean="0"/>
               <a:pPr/>
-              <a:t>4/10/17</a:t>
+              <a:t>4/11/17</a:t>
             </a:fld>
             <a:endParaRPr lang="en-US" dirty="0"/>
           </a:p>
@@ -1628,7 +1628,7 @@
             <a:fld id="{985D6BDF-9D0E-4E2B-85B8-D8F4790360C9}" type="datetimeFigureOut">
               <a:rPr lang="en-US" smtClean="0"/>
               <a:pPr/>
-              <a:t>4/10/17</a:t>
+              <a:t>4/11/17</a:t>
             </a:fld>
             <a:endParaRPr lang="en-US" dirty="0"/>
           </a:p>
@@ -1968,7 +1968,7 @@
             <a:fld id="{985D6BDF-9D0E-4E2B-85B8-D8F4790360C9}" type="datetimeFigureOut">
               <a:rPr lang="en-US" smtClean="0"/>
               <a:pPr/>
-              <a:t>4/10/17</a:t>
+              <a:t>4/11/17</a:t>
             </a:fld>
             <a:endParaRPr lang="en-US" dirty="0"/>
           </a:p>
@@ -2240,7 +2240,7 @@
             <a:fld id="{985D6BDF-9D0E-4E2B-85B8-D8F4790360C9}" type="datetimeFigureOut">
               <a:rPr lang="en-US" smtClean="0"/>
               <a:pPr/>
-              <a:t>4/10/17</a:t>
+              <a:t>4/11/17</a:t>
             </a:fld>
             <a:endParaRPr lang="en-US" dirty="0"/>
           </a:p>
@@ -2616,7 +2616,7 @@
             <a:fld id="{985D6BDF-9D0E-4E2B-85B8-D8F4790360C9}" type="datetimeFigureOut">
               <a:rPr lang="en-US" smtClean="0"/>
               <a:pPr/>
-              <a:t>4/10/17</a:t>
+              <a:t>4/11/17</a:t>
             </a:fld>
             <a:endParaRPr lang="en-US" dirty="0"/>
           </a:p>
@@ -2731,7 +2731,7 @@
             <a:fld id="{985D6BDF-9D0E-4E2B-85B8-D8F4790360C9}" type="datetimeFigureOut">
               <a:rPr lang="en-US" smtClean="0"/>
               <a:pPr/>
-              <a:t>4/10/17</a:t>
+              <a:t>4/11/17</a:t>
             </a:fld>
             <a:endParaRPr lang="en-US" dirty="0"/>
           </a:p>
@@ -2899,7 +2899,7 @@
             <a:fld id="{985D6BDF-9D0E-4E2B-85B8-D8F4790360C9}" type="datetimeFigureOut">
               <a:rPr lang="en-US" smtClean="0"/>
               <a:pPr/>
-              <a:t>4/10/17</a:t>
+              <a:t>4/11/17</a:t>
             </a:fld>
             <a:endParaRPr lang="en-US" dirty="0"/>
           </a:p>
@@ -3250,7 +3250,7 @@
             <a:fld id="{985D6BDF-9D0E-4E2B-85B8-D8F4790360C9}" type="datetimeFigureOut">
               <a:rPr lang="en-US" smtClean="0"/>
               <a:pPr/>
-              <a:t>4/10/17</a:t>
+              <a:t>4/11/17</a:t>
             </a:fld>
             <a:endParaRPr lang="en-US" dirty="0"/>
           </a:p>
@@ -3624,7 +3624,7 @@
             <a:fld id="{985D6BDF-9D0E-4E2B-85B8-D8F4790360C9}" type="datetimeFigureOut">
               <a:rPr lang="en-US" smtClean="0"/>
               <a:pPr/>
-              <a:t>4/10/17</a:t>
+              <a:t>4/11/17</a:t>
             </a:fld>
             <a:endParaRPr lang="en-US" dirty="0"/>
           </a:p>
@@ -3908,7 +3908,7 @@
             <a:fld id="{985D6BDF-9D0E-4E2B-85B8-D8F4790360C9}" type="datetimeFigureOut">
               <a:rPr lang="en-US" smtClean="0"/>
               <a:pPr/>
-              <a:t>4/10/17</a:t>
+              <a:t>4/11/17</a:t>
             </a:fld>
             <a:endParaRPr lang="en-US" dirty="0"/>
           </a:p>
@@ -4589,19 +4589,23 @@
           <a:p>
             <a:pPr algn="ctr" eaLnBrk="1" hangingPunct="1"/>
             <a:r>
-              <a:rPr lang="en-US" sz="8000" b="1" dirty="0" smtClean="0">
+              <a:rPr lang="en-US" sz="8000" dirty="0" smtClean="0">
                 <a:solidFill>
                   <a:schemeClr val="tx2"/>
                 </a:solidFill>
-                <a:latin typeface="+mn-lt"/>
+                <a:latin typeface="Roboto Medium" charset="0"/>
+                <a:ea typeface="Roboto Medium" charset="0"/>
+                <a:cs typeface="Roboto Medium" charset="0"/>
               </a:rPr>
               <a:t>GFS Time Clock</a:t>
             </a:r>
-            <a:endParaRPr lang="en-US" sz="8000" b="1" dirty="0">
+            <a:endParaRPr lang="en-US" sz="8000" dirty="0">
               <a:solidFill>
                 <a:schemeClr val="tx2"/>
               </a:solidFill>
-              <a:latin typeface="+mn-lt"/>
+              <a:latin typeface="Roboto Medium" charset="0"/>
+              <a:ea typeface="Roboto Medium" charset="0"/>
+              <a:cs typeface="Roboto Medium" charset="0"/>
             </a:endParaRPr>
           </a:p>
         </p:txBody>
@@ -4759,19 +4763,45 @@
           <a:p>
             <a:pPr algn="ctr" eaLnBrk="1" hangingPunct="1"/>
             <a:r>
-              <a:rPr lang="en-US" sz="4000" b="1" dirty="0" smtClean="0">
+              <a:rPr lang="en-US" sz="4000" dirty="0" smtClean="0">
                 <a:solidFill>
                   <a:schemeClr val="tx2"/>
                 </a:solidFill>
-                <a:latin typeface="+mn-lt"/>
+                <a:latin typeface="Roboto" charset="0"/>
+                <a:ea typeface="Roboto" charset="0"/>
+                <a:cs typeface="Roboto" charset="0"/>
               </a:rPr>
-              <a:t>Kent Sinclair, Thanh Nguyen Sponsor: Gordon Food Service</a:t>
-            </a:r>
-            <a:endParaRPr lang="en-US" sz="4000" b="1" dirty="0">
+              <a:t>Kent Sinclair, Thanh Nguyen </a:t>
+            </a:r>
+            <a:r>
+              <a:rPr lang="en-US" sz="4000" dirty="0" smtClean="0">
+                <a:solidFill>
+                  <a:schemeClr val="tx2"/>
+                </a:solidFill>
+                <a:latin typeface="Roboto" charset="0"/>
+                <a:ea typeface="Roboto" charset="0"/>
+                <a:cs typeface="Roboto" charset="0"/>
+              </a:rPr>
+              <a:t>Advisors: Dr. Robert Adams, GVSU | Ron Hull, Ehsan Rahman, James Uhi li </a:t>
+            </a:r>
+            <a:r>
+              <a:rPr lang="en-US" sz="4000" dirty="0" smtClean="0">
+                <a:solidFill>
+                  <a:schemeClr val="tx2"/>
+                </a:solidFill>
+                <a:latin typeface="Roboto" charset="0"/>
+                <a:ea typeface="Roboto" charset="0"/>
+                <a:cs typeface="Roboto" charset="0"/>
+              </a:rPr>
+              <a:t>Gordon Food Service</a:t>
+            </a:r>
+            <a:endParaRPr lang="en-US" sz="4000" dirty="0">
               <a:solidFill>
                 <a:schemeClr val="tx2"/>
               </a:solidFill>
-              <a:latin typeface="+mn-lt"/>
+              <a:latin typeface="Roboto" charset="0"/>
+              <a:ea typeface="Roboto" charset="0"/>
+              <a:cs typeface="Roboto" charset="0"/>
             </a:endParaRPr>
           </a:p>
         </p:txBody>
@@ -4786,8 +4816,8 @@
         </p:nvSpPr>
         <p:spPr bwMode="auto">
           <a:xfrm>
-            <a:off x="1371600" y="4409518"/>
-            <a:ext cx="13258800" cy="3046942"/>
+            <a:off x="15654689" y="4610663"/>
+            <a:ext cx="13258801" cy="3046942"/>
           </a:xfrm>
           <a:prstGeom prst="rect">
             <a:avLst/>
@@ -4805,7 +4835,7 @@
           <a:effectLst/>
         </p:spPr>
         <p:txBody>
-          <a:bodyPr lIns="137137" tIns="137137" rIns="137137" bIns="137137">
+          <a:bodyPr wrap="square" lIns="137137" tIns="137137" rIns="137137" bIns="137137">
             <a:spAutoFit/>
           </a:bodyPr>
           <a:lstStyle>
@@ -4908,24 +4938,42 @@
           </a:lstStyle>
           <a:p>
             <a:r>
-              <a:rPr lang="en-US" sz="3600" dirty="0"/>
+              <a:rPr lang="en-US" sz="3600" dirty="0">
+                <a:latin typeface="Roboto" charset="0"/>
+                <a:ea typeface="Roboto" charset="0"/>
+                <a:cs typeface="Roboto" charset="0"/>
+              </a:rPr>
               <a:t>Develop a networked clock that leverages commodity hardware and software to reduce maintenance and replacement cost over dedicated time clock solutions</a:t>
             </a:r>
             <a:r>
-              <a:rPr lang="en-US" sz="3600" dirty="0" smtClean="0"/>
+              <a:rPr lang="en-US" sz="3600" dirty="0" smtClean="0">
+                <a:latin typeface="Roboto" charset="0"/>
+                <a:ea typeface="Roboto" charset="0"/>
+                <a:cs typeface="Roboto" charset="0"/>
+              </a:rPr>
               <a:t>.</a:t>
             </a:r>
           </a:p>
           <a:p>
             <a:r>
-              <a:rPr lang="en-US" sz="3600" dirty="0" smtClean="0"/>
+              <a:rPr lang="en-US" sz="3600" dirty="0" smtClean="0">
+                <a:latin typeface="Roboto" charset="0"/>
+                <a:ea typeface="Roboto" charset="0"/>
+                <a:cs typeface="Roboto" charset="0"/>
+              </a:rPr>
               <a:t/>
             </a:r>
             <a:br>
-              <a:rPr lang="en-US" sz="3600" dirty="0" smtClean="0"/>
+              <a:rPr lang="en-US" sz="3600" dirty="0" smtClean="0">
+                <a:latin typeface="Roboto" charset="0"/>
+                <a:ea typeface="Roboto" charset="0"/>
+                <a:cs typeface="Roboto" charset="0"/>
+              </a:rPr>
             </a:br>
             <a:endParaRPr lang="en-US" sz="3600" dirty="0">
-              <a:latin typeface="+mn-lt"/>
+              <a:latin typeface="Roboto" charset="0"/>
+              <a:ea typeface="Roboto" charset="0"/>
+              <a:cs typeface="Roboto" charset="0"/>
             </a:endParaRPr>
           </a:p>
         </p:txBody>
@@ -4938,7 +4986,7 @@
         </p:nvSpPr>
         <p:spPr>
           <a:xfrm>
-            <a:off x="1371600" y="3495117"/>
+            <a:off x="15648070" y="3731431"/>
             <a:ext cx="13258800" cy="914401"/>
           </a:xfrm>
           <a:prstGeom prst="rect">
@@ -4971,23 +5019,29 @@
           <a:p>
             <a:pPr algn="ctr"/>
             <a:r>
-              <a:rPr lang="en-US" sz="4400" b="1" dirty="0" smtClean="0">
+              <a:rPr lang="en-US" sz="4400" dirty="0" smtClean="0">
                 <a:solidFill>
                   <a:schemeClr val="accent3">
                     <a:lumMod val="20000"/>
                     <a:lumOff val="80000"/>
                   </a:schemeClr>
                 </a:solidFill>
+                <a:latin typeface="Roboto Medium" charset="0"/>
+                <a:ea typeface="Roboto Medium" charset="0"/>
+                <a:cs typeface="Roboto Medium" charset="0"/>
               </a:rPr>
               <a:t>Goal</a:t>
             </a:r>
-            <a:endParaRPr lang="en-US" sz="4400" b="1" dirty="0">
+            <a:endParaRPr lang="en-US" sz="4400" dirty="0">
               <a:solidFill>
                 <a:schemeClr val="accent3">
                   <a:lumMod val="20000"/>
                   <a:lumOff val="80000"/>
                 </a:schemeClr>
               </a:solidFill>
+              <a:latin typeface="Roboto Medium" charset="0"/>
+              <a:ea typeface="Roboto Medium" charset="0"/>
+              <a:cs typeface="Roboto Medium" charset="0"/>
             </a:endParaRPr>
           </a:p>
         </p:txBody>
@@ -5002,8 +5056,8 @@
         </p:nvSpPr>
         <p:spPr bwMode="auto">
           <a:xfrm>
-            <a:off x="15360588" y="13534125"/>
-            <a:ext cx="13258800" cy="3003286"/>
+            <a:off x="29870400" y="4389597"/>
+            <a:ext cx="12649200" cy="3268007"/>
           </a:xfrm>
           <a:prstGeom prst="rect">
             <a:avLst/>
@@ -5134,11 +5188,81 @@
               <a:buChar char="•"/>
             </a:pPr>
             <a:r>
-              <a:rPr lang="en-US" sz="3200" dirty="0"/>
-              <a:t>As an operating system and ecosystem, Android is very specifically optimized for use in the context of single user mobile applications.</a:t>
+              <a:rPr lang="en-US" sz="3200" dirty="0">
+                <a:latin typeface="Roboto" charset="0"/>
+                <a:ea typeface="Roboto" charset="0"/>
+                <a:cs typeface="Roboto" charset="0"/>
+              </a:rPr>
+              <a:t>As an operating system and ecosystem, Android </a:t>
+            </a:r>
+            <a:r>
+              <a:rPr lang="en-US" sz="3200" dirty="0" smtClean="0">
+                <a:latin typeface="Roboto" charset="0"/>
+                <a:ea typeface="Roboto" charset="0"/>
+                <a:cs typeface="Roboto" charset="0"/>
+              </a:rPr>
+              <a:t>is optimized single </a:t>
+            </a:r>
+            <a:r>
+              <a:rPr lang="en-US" sz="3200" dirty="0">
+                <a:latin typeface="Roboto" charset="0"/>
+                <a:ea typeface="Roboto" charset="0"/>
+                <a:cs typeface="Roboto" charset="0"/>
+              </a:rPr>
+              <a:t>user mobile applications</a:t>
+            </a:r>
+            <a:r>
+              <a:rPr lang="en-US" sz="3200" dirty="0" smtClean="0">
+                <a:latin typeface="Roboto" charset="0"/>
+                <a:ea typeface="Roboto" charset="0"/>
+                <a:cs typeface="Roboto" charset="0"/>
+              </a:rPr>
+              <a:t>.</a:t>
+            </a:r>
+          </a:p>
+          <a:p>
+            <a:pPr marL="1314450" lvl="1" indent="-571500" defTabSz="913839" eaLnBrk="1" fontAlgn="base" hangingPunct="1">
+              <a:spcBef>
+                <a:spcPct val="0"/>
+              </a:spcBef>
+              <a:spcAft>
+                <a:spcPct val="0"/>
+              </a:spcAft>
+              <a:buFont typeface="Arial" panose="020B0604020202020204" pitchFamily="34" charset="0"/>
+              <a:buChar char="•"/>
+            </a:pPr>
+            <a:r>
+              <a:rPr lang="en-US" sz="3200" dirty="0" smtClean="0">
+                <a:latin typeface="Roboto" charset="0"/>
+                <a:ea typeface="Roboto" charset="0"/>
+                <a:cs typeface="Roboto" charset="0"/>
+              </a:rPr>
+              <a:t>Commodity hardware</a:t>
+            </a:r>
+          </a:p>
+          <a:p>
+            <a:pPr marL="1314450" lvl="1" indent="-571500" defTabSz="913839" eaLnBrk="1" fontAlgn="base" hangingPunct="1">
+              <a:spcBef>
+                <a:spcPct val="0"/>
+              </a:spcBef>
+              <a:spcAft>
+                <a:spcPct val="0"/>
+              </a:spcAft>
+              <a:buFont typeface="Arial" panose="020B0604020202020204" pitchFamily="34" charset="0"/>
+              <a:buChar char="•"/>
+            </a:pPr>
+            <a:r>
+              <a:rPr lang="en-US" sz="3200" dirty="0" smtClean="0">
+                <a:latin typeface="Roboto" charset="0"/>
+                <a:ea typeface="Roboto" charset="0"/>
+                <a:cs typeface="Roboto" charset="0"/>
+              </a:rPr>
+              <a:t>Maintain consistent experience</a:t>
             </a:r>
             <a:endParaRPr lang="en-US" sz="3200" dirty="0">
-              <a:latin typeface="Calibri" pitchFamily="34" charset="0"/>
+              <a:latin typeface="Roboto" charset="0"/>
+              <a:ea typeface="Roboto" charset="0"/>
+              <a:cs typeface="Roboto" charset="0"/>
             </a:endParaRPr>
           </a:p>
         </p:txBody>
@@ -5151,8 +5275,8 @@
         </p:nvSpPr>
         <p:spPr>
           <a:xfrm>
-            <a:off x="15320212" y="12631581"/>
-            <a:ext cx="13258800" cy="914400"/>
+            <a:off x="29870400" y="3630145"/>
+            <a:ext cx="12649200" cy="880659"/>
           </a:xfrm>
           <a:prstGeom prst="rect">
             <a:avLst/>
@@ -5184,330 +5308,30 @@
           <a:p>
             <a:pPr algn="ctr"/>
             <a:r>
-              <a:rPr lang="en-US" sz="4400" b="1" dirty="0" smtClean="0">
+              <a:rPr lang="en-US" sz="4400" dirty="0" smtClean="0">
                 <a:solidFill>
                   <a:schemeClr val="accent3">
                     <a:lumMod val="20000"/>
                     <a:lumOff val="80000"/>
                   </a:schemeClr>
                 </a:solidFill>
+                <a:latin typeface="Roboto Medium" charset="0"/>
+                <a:ea typeface="Roboto Medium" charset="0"/>
+                <a:cs typeface="Roboto Medium" charset="0"/>
               </a:rPr>
-              <a:t>Problems</a:t>
-            </a:r>
-            <a:endParaRPr lang="en-US" sz="4400" b="1" dirty="0">
+              <a:t>Challenges</a:t>
+            </a:r>
+            <a:endParaRPr lang="en-US" sz="4400" dirty="0">
               <a:solidFill>
                 <a:schemeClr val="accent3">
                   <a:lumMod val="20000"/>
                   <a:lumOff val="80000"/>
                 </a:schemeClr>
               </a:solidFill>
+              <a:latin typeface="Roboto Medium" charset="0"/>
+              <a:ea typeface="Roboto Medium" charset="0"/>
+              <a:cs typeface="Roboto Medium" charset="0"/>
             </a:endParaRPr>
-          </a:p>
-        </p:txBody>
-      </p:sp>
-      <p:sp>
-        <p:nvSpPr>
-          <p:cNvPr id="12" name="Text Box 191"/>
-          <p:cNvSpPr txBox="1">
-            <a:spLocks noChangeArrowheads="1"/>
-          </p:cNvSpPr>
-          <p:nvPr/>
-        </p:nvSpPr>
-        <p:spPr bwMode="auto">
-          <a:xfrm>
-            <a:off x="29268825" y="15825980"/>
-            <a:ext cx="13250775" cy="4559785"/>
-          </a:xfrm>
-          <a:prstGeom prst="rect">
-            <a:avLst/>
-          </a:prstGeom>
-          <a:solidFill>
-            <a:schemeClr val="bg1"/>
-          </a:solidFill>
-          <a:ln w="12700">
-            <a:solidFill>
-              <a:schemeClr val="accent1">
-                <a:lumMod val="75000"/>
-              </a:schemeClr>
-            </a:solidFill>
-          </a:ln>
-          <a:effectLst/>
-        </p:spPr>
-        <p:txBody>
-          <a:bodyPr wrap="square" lIns="137137" tIns="137137" rIns="137137" bIns="137137" anchor="t" anchorCtr="0">
-            <a:noAutofit/>
-          </a:bodyPr>
-          <a:lstStyle>
-            <a:lvl1pPr eaLnBrk="0" hangingPunct="0">
-              <a:defRPr sz="2200">
-                <a:solidFill>
-                  <a:schemeClr val="tx1"/>
-                </a:solidFill>
-                <a:latin typeface="Arial" charset="0"/>
-              </a:defRPr>
-            </a:lvl1pPr>
-            <a:lvl2pPr marL="742950" indent="-285750" eaLnBrk="0" hangingPunct="0">
-              <a:defRPr sz="2200">
-                <a:solidFill>
-                  <a:schemeClr val="tx1"/>
-                </a:solidFill>
-                <a:latin typeface="Arial" charset="0"/>
-              </a:defRPr>
-            </a:lvl2pPr>
-            <a:lvl3pPr marL="1143000" indent="-228600" eaLnBrk="0" hangingPunct="0">
-              <a:defRPr sz="2200">
-                <a:solidFill>
-                  <a:schemeClr val="tx1"/>
-                </a:solidFill>
-                <a:latin typeface="Arial" charset="0"/>
-              </a:defRPr>
-            </a:lvl3pPr>
-            <a:lvl4pPr marL="1600200" indent="-228600" eaLnBrk="0" hangingPunct="0">
-              <a:defRPr sz="2200">
-                <a:solidFill>
-                  <a:schemeClr val="tx1"/>
-                </a:solidFill>
-                <a:latin typeface="Arial" charset="0"/>
-              </a:defRPr>
-            </a:lvl4pPr>
-            <a:lvl5pPr marL="2057400" indent="-228600" eaLnBrk="0" hangingPunct="0">
-              <a:defRPr sz="2200">
-                <a:solidFill>
-                  <a:schemeClr val="tx1"/>
-                </a:solidFill>
-                <a:latin typeface="Arial" charset="0"/>
-              </a:defRPr>
-            </a:lvl5pPr>
-            <a:lvl6pPr marL="2514600" indent="-228600" eaLnBrk="0" fontAlgn="base" hangingPunct="0">
-              <a:spcBef>
-                <a:spcPct val="0"/>
-              </a:spcBef>
-              <a:spcAft>
-                <a:spcPct val="0"/>
-              </a:spcAft>
-              <a:defRPr sz="2200">
-                <a:solidFill>
-                  <a:schemeClr val="tx1"/>
-                </a:solidFill>
-                <a:latin typeface="Arial" charset="0"/>
-              </a:defRPr>
-            </a:lvl6pPr>
-            <a:lvl7pPr marL="2971800" indent="-228600" eaLnBrk="0" fontAlgn="base" hangingPunct="0">
-              <a:spcBef>
-                <a:spcPct val="0"/>
-              </a:spcBef>
-              <a:spcAft>
-                <a:spcPct val="0"/>
-              </a:spcAft>
-              <a:defRPr sz="2200">
-                <a:solidFill>
-                  <a:schemeClr val="tx1"/>
-                </a:solidFill>
-                <a:latin typeface="Arial" charset="0"/>
-              </a:defRPr>
-            </a:lvl7pPr>
-            <a:lvl8pPr marL="3429000" indent="-228600" eaLnBrk="0" fontAlgn="base" hangingPunct="0">
-              <a:spcBef>
-                <a:spcPct val="0"/>
-              </a:spcBef>
-              <a:spcAft>
-                <a:spcPct val="0"/>
-              </a:spcAft>
-              <a:defRPr sz="2200">
-                <a:solidFill>
-                  <a:schemeClr val="tx1"/>
-                </a:solidFill>
-                <a:latin typeface="Arial" charset="0"/>
-              </a:defRPr>
-            </a:lvl8pPr>
-            <a:lvl9pPr marL="3886200" indent="-228600" eaLnBrk="0" fontAlgn="base" hangingPunct="0">
-              <a:spcBef>
-                <a:spcPct val="0"/>
-              </a:spcBef>
-              <a:spcAft>
-                <a:spcPct val="0"/>
-              </a:spcAft>
-              <a:defRPr sz="2200">
-                <a:solidFill>
-                  <a:schemeClr val="tx1"/>
-                </a:solidFill>
-                <a:latin typeface="Arial" charset="0"/>
-              </a:defRPr>
-            </a:lvl9pPr>
-          </a:lstStyle>
-          <a:p>
-            <a:pPr marL="1314450" lvl="1" indent="-571500" defTabSz="913839" eaLnBrk="1" fontAlgn="base" hangingPunct="1">
-              <a:spcBef>
-                <a:spcPct val="0"/>
-              </a:spcBef>
-              <a:spcAft>
-                <a:spcPct val="0"/>
-              </a:spcAft>
-              <a:buFont typeface="Arial" panose="020B0604020202020204" pitchFamily="34" charset="0"/>
-              <a:buChar char="•"/>
-            </a:pPr>
-            <a:r>
-              <a:rPr lang="en-US" altLang="en-US" sz="3600" dirty="0" smtClean="0">
-                <a:latin typeface="+mn-lt"/>
-              </a:rPr>
-              <a:t>Dramatic improvement in </a:t>
-            </a:r>
-            <a:r>
-              <a:rPr lang="en-US" altLang="en-US" sz="3600" dirty="0">
-                <a:latin typeface="+mn-lt"/>
-              </a:rPr>
-              <a:t>the reduction of </a:t>
-            </a:r>
-            <a:r>
-              <a:rPr lang="en-US" altLang="en-US" sz="3600" dirty="0" smtClean="0">
-                <a:latin typeface="+mn-lt"/>
-              </a:rPr>
-              <a:t>artifacts.</a:t>
-            </a:r>
-          </a:p>
-          <a:p>
-            <a:pPr marL="1314450" lvl="1" indent="-571500" defTabSz="913839" eaLnBrk="1" fontAlgn="base" hangingPunct="1">
-              <a:spcBef>
-                <a:spcPct val="0"/>
-              </a:spcBef>
-              <a:spcAft>
-                <a:spcPct val="0"/>
-              </a:spcAft>
-              <a:buFont typeface="Arial" panose="020B0604020202020204" pitchFamily="34" charset="0"/>
-              <a:buChar char="•"/>
-            </a:pPr>
-            <a:r>
-              <a:rPr lang="en-US" altLang="en-US" sz="3600" dirty="0" smtClean="0">
-                <a:latin typeface="+mn-lt"/>
-              </a:rPr>
-              <a:t>Content </a:t>
-            </a:r>
-            <a:r>
-              <a:rPr lang="en-US" altLang="en-US" sz="3600" dirty="0">
-                <a:latin typeface="+mn-lt"/>
-              </a:rPr>
-              <a:t>image </a:t>
-            </a:r>
-            <a:r>
-              <a:rPr lang="en-US" altLang="en-US" sz="3600" dirty="0" smtClean="0">
-                <a:latin typeface="+mn-lt"/>
-              </a:rPr>
-              <a:t>correlates weakly with higher layers (conv5_1), which contain data on specific features.  This </a:t>
-            </a:r>
-            <a:r>
-              <a:rPr lang="en-US" altLang="en-US" sz="3600" dirty="0">
-                <a:latin typeface="+mn-lt"/>
-              </a:rPr>
-              <a:t>reduces the weight of those </a:t>
-            </a:r>
-            <a:r>
-              <a:rPr lang="en-US" altLang="en-US" sz="3600" dirty="0" smtClean="0">
-                <a:latin typeface="+mn-lt"/>
-              </a:rPr>
-              <a:t>layers, thereby reducing </a:t>
-            </a:r>
-            <a:r>
-              <a:rPr lang="en-US" altLang="en-US" sz="3600" dirty="0">
-                <a:latin typeface="+mn-lt"/>
-              </a:rPr>
-              <a:t>their impact. </a:t>
-            </a:r>
-          </a:p>
-          <a:p>
-            <a:pPr marL="1314450" lvl="1" indent="-571500" defTabSz="913839" eaLnBrk="1" fontAlgn="base" hangingPunct="1">
-              <a:spcBef>
-                <a:spcPct val="0"/>
-              </a:spcBef>
-              <a:spcAft>
-                <a:spcPct val="0"/>
-              </a:spcAft>
-              <a:buFont typeface="Arial" panose="020B0604020202020204" pitchFamily="34" charset="0"/>
-              <a:buChar char="•"/>
-            </a:pPr>
-            <a:r>
-              <a:rPr lang="en-US" altLang="en-US" sz="3600" dirty="0" smtClean="0">
-                <a:latin typeface="+mn-lt"/>
-              </a:rPr>
-              <a:t>Beneficial in cases where the style image has a strong content: </a:t>
-            </a:r>
-          </a:p>
-          <a:p>
-            <a:pPr marL="1714500" lvl="2" indent="-571500" defTabSz="913839" eaLnBrk="1" fontAlgn="base" hangingPunct="1">
-              <a:spcBef>
-                <a:spcPct val="0"/>
-              </a:spcBef>
-              <a:spcAft>
-                <a:spcPct val="0"/>
-              </a:spcAft>
-              <a:buFont typeface="Calibri" pitchFamily="34" charset="0"/>
-              <a:buChar char="▫"/>
-            </a:pPr>
-            <a:r>
-              <a:rPr lang="en-US" altLang="en-US" sz="3600" dirty="0" smtClean="0">
-                <a:latin typeface="+mn-lt"/>
-              </a:rPr>
-              <a:t>In </a:t>
-            </a:r>
-            <a:r>
-              <a:rPr lang="en-US" altLang="en-US" sz="3600" i="1" dirty="0" smtClean="0">
-                <a:latin typeface="+mn-lt"/>
-              </a:rPr>
-              <a:t>Girl with a Pearl Earring</a:t>
-            </a:r>
-            <a:r>
-              <a:rPr lang="en-US" altLang="en-US" sz="3600" dirty="0" smtClean="0">
-                <a:latin typeface="+mn-lt"/>
-              </a:rPr>
-              <a:t>, this reduces facial artifacts</a:t>
-            </a:r>
-          </a:p>
-          <a:p>
-            <a:pPr marL="1314450" lvl="1" indent="-571500" defTabSz="913839" eaLnBrk="1" fontAlgn="base" hangingPunct="1">
-              <a:spcBef>
-                <a:spcPct val="0"/>
-              </a:spcBef>
-              <a:spcAft>
-                <a:spcPct val="0"/>
-              </a:spcAft>
-              <a:buFont typeface="Arial" panose="020B0604020202020204" pitchFamily="34" charset="0"/>
-              <a:buChar char="•"/>
-            </a:pPr>
-            <a:r>
-              <a:rPr lang="en-US" altLang="en-US" sz="3600" dirty="0" smtClean="0">
-                <a:latin typeface="+mn-lt"/>
-              </a:rPr>
-              <a:t>Not suitable if style is defined by high level features:</a:t>
-            </a:r>
-          </a:p>
-          <a:p>
-            <a:pPr marL="1714500" lvl="2" indent="-571500" defTabSz="913839" eaLnBrk="1" fontAlgn="base" hangingPunct="1">
-              <a:spcBef>
-                <a:spcPct val="0"/>
-              </a:spcBef>
-              <a:spcAft>
-                <a:spcPct val="0"/>
-              </a:spcAft>
-              <a:buFont typeface="Calibri" pitchFamily="34" charset="0"/>
-              <a:buChar char="▫"/>
-            </a:pPr>
-            <a:r>
-              <a:rPr lang="en-US" altLang="en-US" sz="3600" dirty="0" smtClean="0">
-                <a:latin typeface="+mn-lt"/>
-              </a:rPr>
-              <a:t>In </a:t>
-            </a:r>
-            <a:r>
-              <a:rPr lang="en-US" altLang="en-US" sz="3600" i="1" dirty="0" smtClean="0">
-                <a:latin typeface="+mn-lt"/>
-              </a:rPr>
-              <a:t>abstract,</a:t>
-            </a:r>
-            <a:r>
-              <a:rPr lang="en-US" altLang="en-US" sz="3600" dirty="0" smtClean="0">
-                <a:latin typeface="+mn-lt"/>
-              </a:rPr>
-              <a:t> large brush strokes are lost during style transfer</a:t>
-            </a:r>
           </a:p>
         </p:txBody>
       </p:sp>
@@ -5519,8 +5343,8 @@
         </p:nvSpPr>
         <p:spPr>
           <a:xfrm>
-            <a:off x="29260800" y="14888454"/>
-            <a:ext cx="13258800" cy="914400"/>
+            <a:off x="1783434" y="15355226"/>
+            <a:ext cx="12675516" cy="914400"/>
           </a:xfrm>
           <a:prstGeom prst="rect">
             <a:avLst/>
@@ -5552,77 +5376,29 @@
           <a:p>
             <a:pPr algn="ctr"/>
             <a:r>
-              <a:rPr lang="en-US" sz="4400" b="1" dirty="0">
+              <a:rPr lang="en-US" sz="4400" dirty="0" smtClean="0">
                 <a:solidFill>
                   <a:schemeClr val="accent3">
                     <a:lumMod val="20000"/>
                     <a:lumOff val="80000"/>
                   </a:schemeClr>
                 </a:solidFill>
+                <a:latin typeface="Roboto Medium" charset="0"/>
+                <a:ea typeface="Roboto Medium" charset="0"/>
+                <a:cs typeface="Roboto Medium" charset="0"/>
               </a:rPr>
-              <a:t>Discussion</a:t>
-            </a:r>
-          </a:p>
-        </p:txBody>
-      </p:sp>
-      <p:sp>
-        <p:nvSpPr>
-          <p:cNvPr id="36" name="Rectangle 35"/>
-          <p:cNvSpPr/>
-          <p:nvPr/>
-        </p:nvSpPr>
-        <p:spPr>
-          <a:xfrm>
-            <a:off x="29260800" y="21031200"/>
-            <a:ext cx="13258800" cy="685800"/>
-          </a:xfrm>
-          <a:prstGeom prst="rect">
-            <a:avLst/>
-          </a:prstGeom>
-          <a:solidFill>
-            <a:schemeClr val="tx1"/>
-          </a:solidFill>
-          <a:ln w="12700"/>
-        </p:spPr>
-        <p:style>
-          <a:lnRef idx="2">
-            <a:schemeClr val="accent1">
-              <a:shade val="50000"/>
-            </a:schemeClr>
-          </a:lnRef>
-          <a:fillRef idx="1">
-            <a:schemeClr val="accent1"/>
-          </a:fillRef>
-          <a:effectRef idx="0">
-            <a:schemeClr val="accent1"/>
-          </a:effectRef>
-          <a:fontRef idx="minor">
-            <a:schemeClr val="lt1"/>
-          </a:fontRef>
-        </p:style>
-        <p:txBody>
-          <a:bodyPr lIns="68568" tIns="34284" rIns="68568" bIns="34284" rtlCol="0" anchor="ctr"/>
-          <a:lstStyle/>
-          <a:p>
-            <a:pPr algn="ctr"/>
-            <a:r>
-              <a:rPr lang="en-US" sz="4400" b="1" dirty="0" smtClean="0">
-                <a:solidFill>
-                  <a:schemeClr val="accent3">
-                    <a:lumMod val="20000"/>
-                    <a:lumOff val="80000"/>
-                  </a:schemeClr>
-                </a:solidFill>
-              </a:rPr>
-              <a:t>Conclusions and Future Work</a:t>
-            </a:r>
-            <a:endParaRPr lang="en-US" sz="4400" b="1" dirty="0">
+              <a:t>Features</a:t>
+            </a:r>
+            <a:endParaRPr lang="en-US" sz="4400" dirty="0">
               <a:solidFill>
                 <a:schemeClr val="accent3">
                   <a:lumMod val="20000"/>
                   <a:lumOff val="80000"/>
                 </a:schemeClr>
               </a:solidFill>
+              <a:latin typeface="Roboto Medium" charset="0"/>
+              <a:ea typeface="Roboto Medium" charset="0"/>
+              <a:cs typeface="Roboto Medium" charset="0"/>
             </a:endParaRPr>
           </a:p>
         </p:txBody>
@@ -5635,10 +5411,10 @@
         </p:nvGrpSpPr>
         <p:grpSpPr>
           <a:xfrm>
-            <a:off x="29120312" y="3631073"/>
-            <a:ext cx="13266824" cy="9857303"/>
-            <a:chOff x="1360733" y="13041463"/>
-            <a:chExt cx="13260013" cy="4613226"/>
+            <a:off x="1389529" y="3630144"/>
+            <a:ext cx="13295011" cy="3939729"/>
+            <a:chOff x="29008915" y="5216291"/>
+            <a:chExt cx="13251759" cy="2058363"/>
           </a:xfrm>
         </p:grpSpPr>
         <p:sp>
@@ -5649,7 +5425,7 @@
           </p:nvSpPr>
           <p:spPr>
             <a:xfrm>
-              <a:off x="1368987" y="13041463"/>
+              <a:off x="29008915" y="5216291"/>
               <a:ext cx="13251759" cy="467817"/>
             </a:xfrm>
             <a:prstGeom prst="rect">
@@ -5682,30 +5458,36 @@
             <a:p>
               <a:pPr algn="ctr"/>
               <a:r>
-                <a:rPr lang="en-US" sz="4400" b="1" dirty="0" smtClean="0">
+                <a:rPr lang="en-US" sz="4400" dirty="0" smtClean="0">
                   <a:solidFill>
                     <a:schemeClr val="accent3">
                       <a:lumMod val="20000"/>
                       <a:lumOff val="80000"/>
                     </a:schemeClr>
                   </a:solidFill>
+                  <a:latin typeface="Roboto Medium" charset="0"/>
+                  <a:ea typeface="Roboto Medium" charset="0"/>
+                  <a:cs typeface="Roboto Medium" charset="0"/>
                 </a:rPr>
-                <a:t>Context</a:t>
+                <a:t>Abstract</a:t>
               </a:r>
-              <a:endParaRPr lang="en-US" sz="4400" b="1" dirty="0">
+              <a:endParaRPr lang="en-US" sz="4400" dirty="0">
                 <a:solidFill>
                   <a:schemeClr val="accent3">
                     <a:lumMod val="20000"/>
                     <a:lumOff val="80000"/>
                   </a:schemeClr>
                 </a:solidFill>
+                <a:latin typeface="Roboto Medium" charset="0"/>
+                <a:ea typeface="Roboto Medium" charset="0"/>
+                <a:cs typeface="Roboto Medium" charset="0"/>
               </a:endParaRPr>
             </a:p>
           </p:txBody>
         </p:sp>
         <p:sp>
           <p:nvSpPr>
-            <p:cNvPr id="11" name="Text Box 190"/>
+            <p:cNvPr id="46" name="Text Box 190"/>
             <p:cNvSpPr txBox="1">
               <a:spLocks noChangeArrowheads="1"/>
             </p:cNvSpPr>
@@ -5713,8 +5495,8 @@
           </p:nvSpPr>
           <p:spPr bwMode="auto">
             <a:xfrm>
-              <a:off x="1360733" y="13686812"/>
-              <a:ext cx="13260013" cy="3967877"/>
+              <a:off x="29008915" y="5658912"/>
+              <a:ext cx="13251759" cy="1615742"/>
             </a:xfrm>
             <a:prstGeom prst="rect">
               <a:avLst/>
@@ -5836,11 +5618,65 @@
             <a:p>
               <a:pPr defTabSz="914400" eaLnBrk="1" hangingPunct="1"/>
               <a:r>
-                <a:rPr lang="en-US" sz="3600" dirty="0"/>
-                <a:t>The current dedicated time clocks used by Gordon Food Services cost upwards of 2000USD per unit. Replacing these units will a 300USD tablet, software, and mount package will permit cost savings by eliminating costly hardware replacements and software licensing for the dedicated time clocks.</a:t>
+                <a:rPr lang="en-US" sz="3600" dirty="0" smtClean="0">
+                  <a:latin typeface="Roboto" charset="0"/>
+                  <a:ea typeface="Roboto" charset="0"/>
+                  <a:cs typeface="Roboto" charset="0"/>
+                </a:rPr>
+                <a:t>Gordon </a:t>
+              </a:r>
+              <a:r>
+                <a:rPr lang="en-US" sz="3600" dirty="0">
+                  <a:latin typeface="Roboto" charset="0"/>
+                  <a:ea typeface="Roboto" charset="0"/>
+                  <a:cs typeface="Roboto" charset="0"/>
+                </a:rPr>
+                <a:t>Food </a:t>
+              </a:r>
+              <a:r>
+                <a:rPr lang="en-US" sz="3600" dirty="0" smtClean="0">
+                  <a:latin typeface="Roboto" charset="0"/>
+                  <a:ea typeface="Roboto" charset="0"/>
+                  <a:cs typeface="Roboto" charset="0"/>
+                </a:rPr>
+                <a:t>Service uses wall mounted timeclocks which cost $1,800 to $2,000 </a:t>
+              </a:r>
+              <a:r>
+                <a:rPr lang="en-US" sz="3600" dirty="0">
+                  <a:latin typeface="Roboto" charset="0"/>
+                  <a:ea typeface="Roboto" charset="0"/>
+                  <a:cs typeface="Roboto" charset="0"/>
+                </a:rPr>
+                <a:t>per </a:t>
+              </a:r>
+              <a:r>
+                <a:rPr lang="en-US" sz="3600" dirty="0" smtClean="0">
+                  <a:latin typeface="Roboto" charset="0"/>
+                  <a:ea typeface="Roboto" charset="0"/>
+                  <a:cs typeface="Roboto" charset="0"/>
+                </a:rPr>
+                <a:t>unit for hourly employees across 130 distribution centers. By replacing current timeclocks with $300 tablet</a:t>
+              </a:r>
+              <a:r>
+                <a:rPr lang="en-US" sz="3600" dirty="0">
+                  <a:latin typeface="Roboto" charset="0"/>
+                  <a:ea typeface="Roboto" charset="0"/>
+                  <a:cs typeface="Roboto" charset="0"/>
+                </a:rPr>
+                <a:t>, software, and mount </a:t>
+              </a:r>
+              <a:r>
+                <a:rPr lang="en-US" sz="3600" dirty="0" smtClean="0">
+                  <a:latin typeface="Roboto" charset="0"/>
+                  <a:ea typeface="Roboto" charset="0"/>
+                  <a:cs typeface="Roboto" charset="0"/>
+                </a:rPr>
+                <a:t>package for a potential savings of $200,000.</a:t>
               </a:r>
               <a:endParaRPr lang="en-US" sz="3600" dirty="0">
-                <a:latin typeface="+mn-lt"/>
+                <a:latin typeface="Roboto" charset="0"/>
+                <a:ea typeface="Roboto" charset="0"/>
+                <a:cs typeface="Roboto" charset="0"/>
               </a:endParaRPr>
             </a:p>
           </p:txBody>
@@ -5848,154 +5684,13 @@
       </p:grpSp>
       <p:sp>
         <p:nvSpPr>
-          <p:cNvPr id="15" name="Text Box 194"/>
-          <p:cNvSpPr txBox="1">
-            <a:spLocks noChangeArrowheads="1"/>
-          </p:cNvSpPr>
-          <p:nvPr/>
-        </p:nvSpPr>
-        <p:spPr bwMode="auto">
-          <a:xfrm>
-            <a:off x="15320212" y="18380796"/>
-            <a:ext cx="13258800" cy="13166004"/>
-          </a:xfrm>
-          <a:prstGeom prst="rect">
-            <a:avLst/>
-          </a:prstGeom>
-          <a:solidFill>
-            <a:schemeClr val="bg1"/>
-          </a:solidFill>
-          <a:ln w="12700">
-            <a:solidFill>
-              <a:schemeClr val="accent1">
-                <a:lumMod val="75000"/>
-              </a:schemeClr>
-            </a:solidFill>
-          </a:ln>
-          <a:effectLst/>
-        </p:spPr>
-        <p:txBody>
-          <a:bodyPr lIns="137137" tIns="137137" rIns="137137" bIns="137137">
-            <a:noAutofit/>
-          </a:bodyPr>
-          <a:lstStyle>
-            <a:lvl1pPr eaLnBrk="0" hangingPunct="0">
-              <a:defRPr sz="2200">
-                <a:solidFill>
-                  <a:schemeClr val="tx1"/>
-                </a:solidFill>
-                <a:latin typeface="Arial" charset="0"/>
-              </a:defRPr>
-            </a:lvl1pPr>
-            <a:lvl2pPr marL="742950" indent="-285750" eaLnBrk="0" hangingPunct="0">
-              <a:defRPr sz="2200">
-                <a:solidFill>
-                  <a:schemeClr val="tx1"/>
-                </a:solidFill>
-                <a:latin typeface="Arial" charset="0"/>
-              </a:defRPr>
-            </a:lvl2pPr>
-            <a:lvl3pPr marL="1143000" indent="-228600" eaLnBrk="0" hangingPunct="0">
-              <a:defRPr sz="2200">
-                <a:solidFill>
-                  <a:schemeClr val="tx1"/>
-                </a:solidFill>
-                <a:latin typeface="Arial" charset="0"/>
-              </a:defRPr>
-            </a:lvl3pPr>
-            <a:lvl4pPr marL="1600200" indent="-228600" eaLnBrk="0" hangingPunct="0">
-              <a:defRPr sz="2200">
-                <a:solidFill>
-                  <a:schemeClr val="tx1"/>
-                </a:solidFill>
-                <a:latin typeface="Arial" charset="0"/>
-              </a:defRPr>
-            </a:lvl4pPr>
-            <a:lvl5pPr marL="2057400" indent="-228600" eaLnBrk="0" hangingPunct="0">
-              <a:defRPr sz="2200">
-                <a:solidFill>
-                  <a:schemeClr val="tx1"/>
-                </a:solidFill>
-                <a:latin typeface="Arial" charset="0"/>
-              </a:defRPr>
-            </a:lvl5pPr>
-            <a:lvl6pPr marL="2514600" indent="-228600" eaLnBrk="0" fontAlgn="base" hangingPunct="0">
-              <a:spcBef>
-                <a:spcPct val="0"/>
-              </a:spcBef>
-              <a:spcAft>
-                <a:spcPct val="0"/>
-              </a:spcAft>
-              <a:defRPr sz="2200">
-                <a:solidFill>
-                  <a:schemeClr val="tx1"/>
-                </a:solidFill>
-                <a:latin typeface="Arial" charset="0"/>
-              </a:defRPr>
-            </a:lvl6pPr>
-            <a:lvl7pPr marL="2971800" indent="-228600" eaLnBrk="0" fontAlgn="base" hangingPunct="0">
-              <a:spcBef>
-                <a:spcPct val="0"/>
-              </a:spcBef>
-              <a:spcAft>
-                <a:spcPct val="0"/>
-              </a:spcAft>
-              <a:defRPr sz="2200">
-                <a:solidFill>
-                  <a:schemeClr val="tx1"/>
-                </a:solidFill>
-                <a:latin typeface="Arial" charset="0"/>
-              </a:defRPr>
-            </a:lvl7pPr>
-            <a:lvl8pPr marL="3429000" indent="-228600" eaLnBrk="0" fontAlgn="base" hangingPunct="0">
-              <a:spcBef>
-                <a:spcPct val="0"/>
-              </a:spcBef>
-              <a:spcAft>
-                <a:spcPct val="0"/>
-              </a:spcAft>
-              <a:defRPr sz="2200">
-                <a:solidFill>
-                  <a:schemeClr val="tx1"/>
-                </a:solidFill>
-                <a:latin typeface="Arial" charset="0"/>
-              </a:defRPr>
-            </a:lvl8pPr>
-            <a:lvl9pPr marL="3886200" indent="-228600" eaLnBrk="0" fontAlgn="base" hangingPunct="0">
-              <a:spcBef>
-                <a:spcPct val="0"/>
-              </a:spcBef>
-              <a:spcAft>
-                <a:spcPct val="0"/>
-              </a:spcAft>
-              <a:defRPr sz="2200">
-                <a:solidFill>
-                  <a:schemeClr val="tx1"/>
-                </a:solidFill>
-                <a:latin typeface="Arial" charset="0"/>
-              </a:defRPr>
-            </a:lvl9pPr>
-          </a:lstStyle>
-          <a:p>
-            <a:pPr eaLnBrk="1" hangingPunct="1"/>
-            <a:r>
-              <a:rPr lang="en-US" sz="3200" dirty="0">
-                <a:latin typeface="Calibri" pitchFamily="34" charset="0"/>
-              </a:rPr>
-              <a:t> </a:t>
-            </a:r>
-          </a:p>
-        </p:txBody>
-      </p:sp>
-      <p:sp>
-        <p:nvSpPr>
           <p:cNvPr id="45" name="Rectangle 44"/>
           <p:cNvSpPr/>
           <p:nvPr/>
         </p:nvSpPr>
         <p:spPr>
           <a:xfrm>
-            <a:off x="15320212" y="17458528"/>
+            <a:off x="15648070" y="8755088"/>
             <a:ext cx="13258800" cy="914400"/>
           </a:xfrm>
           <a:prstGeom prst="rect">
@@ -6028,16 +5723,30 @@
           <a:p>
             <a:pPr algn="ctr"/>
             <a:r>
-              <a:rPr lang="en-US" sz="4400" b="1" dirty="0">
+              <a:rPr lang="en-US" sz="4400" dirty="0" smtClean="0">
                 <a:solidFill>
                   <a:schemeClr val="accent3">
                     <a:lumMod val="20000"/>
                     <a:lumOff val="80000"/>
                   </a:schemeClr>
                 </a:solidFill>
+                <a:latin typeface="Roboto Medium" charset="0"/>
+                <a:ea typeface="Roboto Medium" charset="0"/>
+                <a:cs typeface="Roboto Medium" charset="0"/>
               </a:rPr>
-              <a:t>Results</a:t>
-            </a:r>
+              <a:t>Options Screen</a:t>
+            </a:r>
+            <a:endParaRPr lang="en-US" sz="4400" dirty="0">
+              <a:solidFill>
+                <a:schemeClr val="accent3">
+                  <a:lumMod val="20000"/>
+                  <a:lumOff val="80000"/>
+                </a:schemeClr>
+              </a:solidFill>
+              <a:latin typeface="Roboto Medium" charset="0"/>
+              <a:ea typeface="Roboto Medium" charset="0"/>
+              <a:cs typeface="Roboto Medium" charset="0"/>
+            </a:endParaRPr>
           </a:p>
         </p:txBody>
       </p:sp>
@@ -6091,8 +5800,8 @@
         </p:nvSpPr>
         <p:spPr bwMode="auto">
           <a:xfrm>
-            <a:off x="1363575" y="22021800"/>
-            <a:ext cx="13274847" cy="9525000"/>
+            <a:off x="1783434" y="16269626"/>
+            <a:ext cx="12649200" cy="6838283"/>
           </a:xfrm>
           <a:prstGeom prst="rect">
             <a:avLst/>
@@ -6217,14 +5926,215 @@
               <a:buChar char="•"/>
             </a:pPr>
             <a:r>
-              <a:rPr lang="en-US" sz="3600" dirty="0" smtClean="0"/>
-              <a:t>Native </a:t>
-            </a:r>
-            <a:r>
-              <a:rPr lang="en-US" sz="3600" dirty="0"/>
-              <a:t>Android app, with backwards compatibility for Android API 17, Android 4.2 Jelly Bean. </a:t>
-            </a:r>
-            <a:endParaRPr lang="en-US" sz="3600" dirty="0" smtClean="0"/>
+              <a:rPr lang="en-US" sz="3200" dirty="0" smtClean="0">
+                <a:latin typeface="Roboto" charset="0"/>
+                <a:ea typeface="Roboto" charset="0"/>
+                <a:cs typeface="Roboto" charset="0"/>
+              </a:rPr>
+              <a:t>Time Clock functionality:</a:t>
+            </a:r>
+          </a:p>
+          <a:p>
+            <a:pPr marL="1314450" lvl="1" indent="-571500" defTabSz="913839" eaLnBrk="1" hangingPunct="1">
+              <a:buFont typeface="Arial" charset="0"/>
+              <a:buChar char="•"/>
+            </a:pPr>
+            <a:r>
+              <a:rPr lang="en-US" sz="3200" dirty="0" smtClean="0">
+                <a:latin typeface="Roboto" charset="0"/>
+                <a:ea typeface="Roboto" charset="0"/>
+                <a:cs typeface="Roboto" charset="0"/>
+              </a:rPr>
+              <a:t>"</a:t>
+            </a:r>
+            <a:r>
+              <a:rPr lang="en-US" sz="3200" dirty="0">
+                <a:latin typeface="Roboto" charset="0"/>
+                <a:ea typeface="Roboto" charset="0"/>
+                <a:cs typeface="Roboto" charset="0"/>
+              </a:rPr>
+              <a:t>F1" = Start </a:t>
+            </a:r>
+            <a:r>
+              <a:rPr lang="en-US" sz="3200" dirty="0" smtClean="0">
+                <a:latin typeface="Roboto" charset="0"/>
+                <a:ea typeface="Roboto" charset="0"/>
+                <a:cs typeface="Roboto" charset="0"/>
+              </a:rPr>
+              <a:t>day</a:t>
+            </a:r>
+          </a:p>
+          <a:p>
+            <a:pPr marL="1314450" lvl="1" indent="-571500" defTabSz="913839" eaLnBrk="1" hangingPunct="1">
+              <a:buFont typeface="Arial" charset="0"/>
+              <a:buChar char="•"/>
+            </a:pPr>
+            <a:r>
+              <a:rPr lang="en-US" sz="3200" dirty="0" smtClean="0">
+                <a:latin typeface="Roboto" charset="0"/>
+                <a:ea typeface="Roboto" charset="0"/>
+                <a:cs typeface="Roboto" charset="0"/>
+              </a:rPr>
+              <a:t>"F2</a:t>
+            </a:r>
+            <a:r>
+              <a:rPr lang="en-US" sz="3200" dirty="0">
+                <a:latin typeface="Roboto" charset="0"/>
+                <a:ea typeface="Roboto" charset="0"/>
+                <a:cs typeface="Roboto" charset="0"/>
+              </a:rPr>
+              <a:t>" = Start </a:t>
+            </a:r>
+            <a:r>
+              <a:rPr lang="en-US" sz="3200" dirty="0" smtClean="0">
+                <a:latin typeface="Roboto" charset="0"/>
+                <a:ea typeface="Roboto" charset="0"/>
+                <a:cs typeface="Roboto" charset="0"/>
+              </a:rPr>
+              <a:t>Break</a:t>
+            </a:r>
+          </a:p>
+          <a:p>
+            <a:pPr marL="1314450" lvl="1" indent="-571500" defTabSz="913839" eaLnBrk="1" hangingPunct="1">
+              <a:buFont typeface="Arial" charset="0"/>
+              <a:buChar char="•"/>
+            </a:pPr>
+            <a:r>
+              <a:rPr lang="en-US" sz="3200" dirty="0" smtClean="0">
+                <a:latin typeface="Roboto" charset="0"/>
+                <a:ea typeface="Roboto" charset="0"/>
+                <a:cs typeface="Roboto" charset="0"/>
+              </a:rPr>
+              <a:t>"F3</a:t>
+            </a:r>
+            <a:r>
+              <a:rPr lang="en-US" sz="3200" dirty="0">
+                <a:latin typeface="Roboto" charset="0"/>
+                <a:ea typeface="Roboto" charset="0"/>
+                <a:cs typeface="Roboto" charset="0"/>
+              </a:rPr>
+              <a:t>" = Start </a:t>
+            </a:r>
+            <a:r>
+              <a:rPr lang="en-US" sz="3200" dirty="0" smtClean="0">
+                <a:latin typeface="Roboto" charset="0"/>
+                <a:ea typeface="Roboto" charset="0"/>
+                <a:cs typeface="Roboto" charset="0"/>
+              </a:rPr>
+              <a:t>Lunch</a:t>
+            </a:r>
+          </a:p>
+          <a:p>
+            <a:pPr marL="1314450" lvl="1" indent="-571500" defTabSz="913839" eaLnBrk="1" hangingPunct="1">
+              <a:buFont typeface="Arial" charset="0"/>
+              <a:buChar char="•"/>
+            </a:pPr>
+            <a:r>
+              <a:rPr lang="en-US" sz="3200" dirty="0" smtClean="0">
+                <a:latin typeface="Roboto" charset="0"/>
+                <a:ea typeface="Roboto" charset="0"/>
+                <a:cs typeface="Roboto" charset="0"/>
+              </a:rPr>
+              <a:t>"F4</a:t>
+            </a:r>
+            <a:r>
+              <a:rPr lang="en-US" sz="3200" dirty="0">
+                <a:latin typeface="Roboto" charset="0"/>
+                <a:ea typeface="Roboto" charset="0"/>
+                <a:cs typeface="Roboto" charset="0"/>
+              </a:rPr>
+              <a:t>" = Job </a:t>
+            </a:r>
+            <a:r>
+              <a:rPr lang="en-US" sz="3200" dirty="0" smtClean="0">
+                <a:latin typeface="Roboto" charset="0"/>
+                <a:ea typeface="Roboto" charset="0"/>
+                <a:cs typeface="Roboto" charset="0"/>
+              </a:rPr>
+              <a:t>Change</a:t>
+            </a:r>
+          </a:p>
+          <a:p>
+            <a:pPr marL="1314450" lvl="1" indent="-571500" defTabSz="913839" eaLnBrk="1" hangingPunct="1">
+              <a:buFont typeface="Arial" charset="0"/>
+              <a:buChar char="•"/>
+            </a:pPr>
+            <a:r>
+              <a:rPr lang="en-US" sz="3200" dirty="0" smtClean="0">
+                <a:latin typeface="Roboto" charset="0"/>
+                <a:ea typeface="Roboto" charset="0"/>
+                <a:cs typeface="Roboto" charset="0"/>
+              </a:rPr>
+              <a:t>"F5</a:t>
+            </a:r>
+            <a:r>
+              <a:rPr lang="en-US" sz="3200" dirty="0">
+                <a:latin typeface="Roboto" charset="0"/>
+                <a:ea typeface="Roboto" charset="0"/>
+                <a:cs typeface="Roboto" charset="0"/>
+              </a:rPr>
+              <a:t>" = End </a:t>
+            </a:r>
+            <a:r>
+              <a:rPr lang="en-US" sz="3200" dirty="0" smtClean="0">
+                <a:latin typeface="Roboto" charset="0"/>
+                <a:ea typeface="Roboto" charset="0"/>
+                <a:cs typeface="Roboto" charset="0"/>
+              </a:rPr>
+              <a:t>Day</a:t>
+            </a:r>
+          </a:p>
+          <a:p>
+            <a:pPr marL="1314450" lvl="1" indent="-571500" defTabSz="913839" eaLnBrk="1" hangingPunct="1">
+              <a:buFont typeface="Arial" charset="0"/>
+              <a:buChar char="•"/>
+            </a:pPr>
+            <a:r>
+              <a:rPr lang="en-US" sz="3200" dirty="0" smtClean="0">
+                <a:latin typeface="Roboto" charset="0"/>
+                <a:ea typeface="Roboto" charset="0"/>
+                <a:cs typeface="Roboto" charset="0"/>
+              </a:rPr>
+              <a:t>"F6</a:t>
+            </a:r>
+            <a:r>
+              <a:rPr lang="en-US" sz="3200" dirty="0">
+                <a:latin typeface="Roboto" charset="0"/>
+                <a:ea typeface="Roboto" charset="0"/>
+                <a:cs typeface="Roboto" charset="0"/>
+              </a:rPr>
+              <a:t>" = End </a:t>
+            </a:r>
+            <a:r>
+              <a:rPr lang="en-US" sz="3200" dirty="0" smtClean="0">
+                <a:latin typeface="Roboto" charset="0"/>
+                <a:ea typeface="Roboto" charset="0"/>
+                <a:cs typeface="Roboto" charset="0"/>
+              </a:rPr>
+              <a:t>Break</a:t>
+            </a:r>
+          </a:p>
+          <a:p>
+            <a:pPr marL="1314450" lvl="1" indent="-571500" defTabSz="913839" eaLnBrk="1" hangingPunct="1">
+              <a:buFont typeface="Arial" charset="0"/>
+              <a:buChar char="•"/>
+            </a:pPr>
+            <a:r>
+              <a:rPr lang="en-US" sz="3200" dirty="0" smtClean="0">
+                <a:latin typeface="Roboto" charset="0"/>
+                <a:ea typeface="Roboto" charset="0"/>
+                <a:cs typeface="Roboto" charset="0"/>
+              </a:rPr>
+              <a:t>"F7</a:t>
+            </a:r>
+            <a:r>
+              <a:rPr lang="en-US" sz="3200" dirty="0">
+                <a:latin typeface="Roboto" charset="0"/>
+                <a:ea typeface="Roboto" charset="0"/>
+                <a:cs typeface="Roboto" charset="0"/>
+              </a:rPr>
+              <a:t>" = End Lunch</a:t>
+            </a:r>
           </a:p>
           <a:p>
             <a:pPr marL="571500" indent="-571500" defTabSz="913839" eaLnBrk="1" hangingPunct="1">
@@ -6232,16 +6142,28 @@
               <a:buChar char="•"/>
             </a:pPr>
             <a:r>
-              <a:rPr lang="en-US" sz="3600" dirty="0" smtClean="0"/>
-              <a:t>Offline </a:t>
-            </a:r>
-            <a:r>
-              <a:rPr lang="en-US" sz="3600" dirty="0"/>
-              <a:t>functionality is backed using a local Realm database to store cached </a:t>
-            </a:r>
-            <a:r>
-              <a:rPr lang="en-US" sz="3600" dirty="0" smtClean="0"/>
-              <a:t>punches</a:t>
+              <a:rPr lang="en-US" sz="3200" dirty="0" smtClean="0">
+                <a:latin typeface="Roboto" charset="0"/>
+                <a:ea typeface="Roboto" charset="0"/>
+                <a:cs typeface="Roboto" charset="0"/>
+              </a:rPr>
+              <a:t>Manual input </a:t>
+            </a:r>
+            <a:r>
+              <a:rPr lang="mr-IN" sz="3200" dirty="0" smtClean="0">
+                <a:latin typeface="Roboto" charset="0"/>
+                <a:ea typeface="Roboto" charset="0"/>
+                <a:cs typeface="Roboto" charset="0"/>
+              </a:rPr>
+              <a:t>–</a:t>
+            </a:r>
+            <a:r>
+              <a:rPr lang="en-US" sz="3200" dirty="0" smtClean="0">
+                <a:latin typeface="Roboto" charset="0"/>
+                <a:ea typeface="Roboto" charset="0"/>
+                <a:cs typeface="Roboto" charset="0"/>
+              </a:rPr>
+              <a:t>Physical Scanner or Keyboard(debugging)</a:t>
             </a:r>
           </a:p>
           <a:p>
@@ -6250,18 +6172,26 @@
               <a:buChar char="•"/>
             </a:pPr>
             <a:r>
-              <a:rPr lang="en-US" sz="3600" dirty="0" smtClean="0"/>
-              <a:t>Configuration using Android </a:t>
-            </a:r>
-            <a:r>
-              <a:rPr lang="en-US" sz="3600" dirty="0" err="1"/>
+              <a:rPr lang="en-US" sz="3200" dirty="0" smtClean="0">
+                <a:latin typeface="Roboto" charset="0"/>
+                <a:ea typeface="Roboto" charset="0"/>
+                <a:cs typeface="Roboto" charset="0"/>
+              </a:rPr>
+              <a:t>Persistent Configuration - </a:t>
+            </a:r>
+            <a:r>
+              <a:rPr lang="en-US" sz="3200" dirty="0" err="1" smtClean="0">
+                <a:latin typeface="Roboto" charset="0"/>
+                <a:ea typeface="Roboto" charset="0"/>
+                <a:cs typeface="Roboto" charset="0"/>
+              </a:rPr>
               <a:t>SharedPreferences</a:t>
             </a:r>
-            <a:r>
-              <a:rPr lang="en-US" sz="3600" dirty="0"/>
-              <a:t> to hold passwords and API information. </a:t>
-            </a:r>
-            <a:endParaRPr lang="en-US" sz="3600" dirty="0"/>
+            <a:endParaRPr lang="en-US" sz="3200" dirty="0" smtClean="0">
+              <a:latin typeface="Roboto" charset="0"/>
+              <a:ea typeface="Roboto" charset="0"/>
+              <a:cs typeface="Roboto" charset="0"/>
+            </a:endParaRPr>
           </a:p>
           <a:p>
             <a:pPr marL="571500" indent="-571500" defTabSz="913839" eaLnBrk="1" hangingPunct="1">
@@ -6269,14 +6199,13 @@
               <a:buChar char="•"/>
             </a:pPr>
             <a:r>
-              <a:rPr lang="en-US" sz="3600" dirty="0" smtClean="0"/>
-              <a:t>Network </a:t>
-            </a:r>
-            <a:r>
-              <a:rPr lang="en-US" sz="3600" dirty="0"/>
-              <a:t>connectivity is achieved through the Retrofit library, using the Jackson JSON Parser to translate between Java objects and JSON. </a:t>
-            </a:r>
-            <a:endParaRPr lang="en-US" sz="3600" dirty="0"/>
+              <a:rPr lang="en-US" sz="3200" dirty="0" smtClean="0">
+                <a:latin typeface="Roboto" charset="0"/>
+                <a:ea typeface="Roboto" charset="0"/>
+                <a:cs typeface="Roboto" charset="0"/>
+              </a:rPr>
+              <a:t>Offline disconnected functionality</a:t>
+            </a:r>
           </a:p>
           <a:p>
             <a:pPr marL="571500" indent="-571500" defTabSz="913839" eaLnBrk="1" hangingPunct="1">
@@ -6284,19 +6213,45 @@
               <a:buChar char="•"/>
             </a:pPr>
             <a:r>
-              <a:rPr lang="en-US" sz="3600" dirty="0" smtClean="0"/>
-              <a:t>Image downloading and caching is </a:t>
-            </a:r>
-            <a:r>
-              <a:rPr lang="en-US" sz="3600" dirty="0"/>
-              <a:t>handling using the Picasso </a:t>
-            </a:r>
-            <a:r>
-              <a:rPr lang="en-US" sz="3600" dirty="0" smtClean="0"/>
-              <a:t>library</a:t>
-            </a:r>
+              <a:rPr lang="en-US" sz="3200" dirty="0" smtClean="0">
+                <a:latin typeface="Roboto" charset="0"/>
+                <a:ea typeface="Roboto" charset="0"/>
+                <a:cs typeface="Roboto" charset="0"/>
+              </a:rPr>
+              <a:t>Personalized Options Screen (fig. 1)</a:t>
+            </a:r>
+          </a:p>
+          <a:p>
+            <a:pPr marL="571500" indent="-571500" defTabSz="913839" eaLnBrk="1" hangingPunct="1">
+              <a:buFont typeface="Arial" charset="0"/>
+              <a:buChar char="•"/>
+            </a:pPr>
+            <a:endParaRPr lang="en-US" sz="3200" dirty="0" smtClean="0">
+              <a:latin typeface="Roboto" charset="0"/>
+              <a:ea typeface="Roboto" charset="0"/>
+              <a:cs typeface="Roboto" charset="0"/>
+            </a:endParaRPr>
+          </a:p>
+          <a:p>
+            <a:pPr marL="571500" indent="-571500" defTabSz="913839" eaLnBrk="1" hangingPunct="1">
+              <a:buFont typeface="Arial" charset="0"/>
+              <a:buChar char="•"/>
+            </a:pPr>
+            <a:endParaRPr lang="en-US" sz="3200" dirty="0" smtClean="0">
+              <a:latin typeface="Roboto" charset="0"/>
+              <a:ea typeface="Roboto" charset="0"/>
+              <a:cs typeface="Roboto" charset="0"/>
+            </a:endParaRPr>
+          </a:p>
+          <a:p>
+            <a:pPr marL="1314450" lvl="1" indent="-571500" defTabSz="913839" eaLnBrk="1" hangingPunct="1">
+              <a:buFont typeface="Arial" charset="0"/>
+              <a:buChar char="•"/>
+            </a:pPr>
             <a:endParaRPr lang="en-US" sz="3200" dirty="0">
-              <a:latin typeface="Calibri" pitchFamily="34" charset="0"/>
+              <a:latin typeface="Roboto" charset="0"/>
+              <a:ea typeface="Roboto" charset="0"/>
+              <a:cs typeface="Roboto" charset="0"/>
             </a:endParaRPr>
           </a:p>
         </p:txBody>
@@ -6309,7 +6264,7 @@
         </p:nvSpPr>
         <p:spPr>
           <a:xfrm>
-            <a:off x="1371600" y="20916900"/>
+            <a:off x="15701232" y="18511718"/>
             <a:ext cx="13258800" cy="914400"/>
           </a:xfrm>
           <a:prstGeom prst="rect">
@@ -6352,1425 +6307,6 @@
               </a:rPr>
               <a:t>Implementation</a:t>
             </a:r>
-          </a:p>
-        </p:txBody>
-      </p:sp>
-      <p:grpSp>
-        <p:nvGrpSpPr>
-          <p:cNvPr id="87" name="Group 86"/>
-          <p:cNvGrpSpPr>
-            <a:grpSpLocks noChangeAspect="1"/>
-          </p:cNvGrpSpPr>
-          <p:nvPr/>
-        </p:nvGrpSpPr>
-        <p:grpSpPr>
-          <a:xfrm>
-            <a:off x="15607091" y="25128562"/>
-            <a:ext cx="12618720" cy="2251391"/>
-            <a:chOff x="1371600" y="1812174"/>
-            <a:chExt cx="8345671" cy="1386673"/>
-          </a:xfrm>
-        </p:grpSpPr>
-        <p:pic>
-          <p:nvPicPr>
-            <p:cNvPr id="88" name="Picture 87"/>
-            <p:cNvPicPr>
-              <a:picLocks noChangeAspect="1"/>
-            </p:cNvPicPr>
-            <p:nvPr/>
-          </p:nvPicPr>
-          <p:blipFill>
-            <a:blip r:embed="rId3" cstate="print">
-              <a:extLst>
-                <a:ext uri="{28A0092B-C50C-407E-A947-70E740481C1C}">
-                  <a14:useLocalDpi xmlns:a14="http://schemas.microsoft.com/office/drawing/2010/main"/>
-                </a:ext>
-              </a:extLst>
-            </a:blip>
-            <a:stretch>
-              <a:fillRect/>
-            </a:stretch>
-          </p:blipFill>
-          <p:spPr>
-            <a:xfrm>
-              <a:off x="5226641" y="1812174"/>
-              <a:ext cx="2090057" cy="1371600"/>
-            </a:xfrm>
-            <a:prstGeom prst="rect">
-              <a:avLst/>
-            </a:prstGeom>
-          </p:spPr>
-        </p:pic>
-        <p:pic>
-          <p:nvPicPr>
-            <p:cNvPr id="89" name="Picture 88"/>
-            <p:cNvPicPr>
-              <a:picLocks noChangeAspect="1"/>
-            </p:cNvPicPr>
-            <p:nvPr/>
-          </p:nvPicPr>
-          <p:blipFill>
-            <a:blip r:embed="rId4" cstate="print">
-              <a:extLst>
-                <a:ext uri="{28A0092B-C50C-407E-A947-70E740481C1C}">
-                  <a14:useLocalDpi xmlns:a14="http://schemas.microsoft.com/office/drawing/2010/main"/>
-                </a:ext>
-              </a:extLst>
-            </a:blip>
-            <a:stretch>
-              <a:fillRect/>
-            </a:stretch>
-          </p:blipFill>
-          <p:spPr>
-            <a:xfrm>
-              <a:off x="7627214" y="1812174"/>
-              <a:ext cx="2090057" cy="1371600"/>
-            </a:xfrm>
-            <a:prstGeom prst="rect">
-              <a:avLst/>
-            </a:prstGeom>
-          </p:spPr>
-        </p:pic>
-        <p:pic>
-          <p:nvPicPr>
-            <p:cNvPr id="90" name="Picture 89"/>
-            <p:cNvPicPr>
-              <a:picLocks noChangeAspect="1"/>
-            </p:cNvPicPr>
-            <p:nvPr/>
-          </p:nvPicPr>
-          <p:blipFill>
-            <a:blip r:embed="rId5" cstate="print">
-              <a:extLst>
-                <a:ext uri="{28A0092B-C50C-407E-A947-70E740481C1C}">
-                  <a14:useLocalDpi xmlns:a14="http://schemas.microsoft.com/office/drawing/2010/main"/>
-                </a:ext>
-              </a:extLst>
-            </a:blip>
-            <a:stretch>
-              <a:fillRect/>
-            </a:stretch>
-          </p:blipFill>
-          <p:spPr>
-            <a:xfrm>
-              <a:off x="2839951" y="1827247"/>
-              <a:ext cx="2090057" cy="1371600"/>
-            </a:xfrm>
-            <a:prstGeom prst="rect">
-              <a:avLst/>
-            </a:prstGeom>
-          </p:spPr>
-        </p:pic>
-        <p:pic>
-          <p:nvPicPr>
-            <p:cNvPr id="91" name="Picture 90"/>
-            <p:cNvPicPr>
-              <a:picLocks noChangeAspect="1"/>
-            </p:cNvPicPr>
-            <p:nvPr/>
-          </p:nvPicPr>
-          <p:blipFill>
-            <a:blip r:embed="rId6" cstate="print">
-              <a:extLst>
-                <a:ext uri="{28A0092B-C50C-407E-A947-70E740481C1C}">
-                  <a14:useLocalDpi xmlns:a14="http://schemas.microsoft.com/office/drawing/2010/main"/>
-                </a:ext>
-              </a:extLst>
-            </a:blip>
-            <a:stretch>
-              <a:fillRect/>
-            </a:stretch>
-          </p:blipFill>
-          <p:spPr>
-            <a:xfrm>
-              <a:off x="1371600" y="1812175"/>
-              <a:ext cx="1171718" cy="1371600"/>
-            </a:xfrm>
-            <a:prstGeom prst="rect">
-              <a:avLst/>
-            </a:prstGeom>
-          </p:spPr>
-        </p:pic>
-      </p:grpSp>
-      <p:grpSp>
-        <p:nvGrpSpPr>
-          <p:cNvPr id="92" name="Group 91"/>
-          <p:cNvGrpSpPr>
-            <a:grpSpLocks noChangeAspect="1"/>
-          </p:cNvGrpSpPr>
-          <p:nvPr/>
-        </p:nvGrpSpPr>
-        <p:grpSpPr>
-          <a:xfrm>
-            <a:off x="15636239" y="27630452"/>
-            <a:ext cx="12618720" cy="1998289"/>
-            <a:chOff x="1359131" y="2661050"/>
-            <a:chExt cx="9048442" cy="1432902"/>
-          </a:xfrm>
-        </p:grpSpPr>
-        <p:pic>
-          <p:nvPicPr>
-            <p:cNvPr id="93" name="Picture 92"/>
-            <p:cNvPicPr>
-              <a:picLocks noChangeAspect="1"/>
-            </p:cNvPicPr>
-            <p:nvPr/>
-          </p:nvPicPr>
-          <p:blipFill>
-            <a:blip r:embed="rId7" cstate="print">
-              <a:extLst>
-                <a:ext uri="{28A0092B-C50C-407E-A947-70E740481C1C}">
-                  <a14:useLocalDpi xmlns:a14="http://schemas.microsoft.com/office/drawing/2010/main"/>
-                </a:ext>
-              </a:extLst>
-            </a:blip>
-            <a:stretch>
-              <a:fillRect/>
-            </a:stretch>
-          </p:blipFill>
-          <p:spPr>
-            <a:xfrm>
-              <a:off x="1359131" y="2661050"/>
-              <a:ext cx="2112489" cy="1420004"/>
-            </a:xfrm>
-            <a:prstGeom prst="rect">
-              <a:avLst/>
-            </a:prstGeom>
-          </p:spPr>
-        </p:pic>
-        <p:pic>
-          <p:nvPicPr>
-            <p:cNvPr id="94" name="Picture 93"/>
-            <p:cNvPicPr>
-              <a:picLocks noChangeAspect="1"/>
-            </p:cNvPicPr>
-            <p:nvPr/>
-          </p:nvPicPr>
-          <p:blipFill>
-            <a:blip r:embed="rId8" cstate="print">
-              <a:extLst>
-                <a:ext uri="{28A0092B-C50C-407E-A947-70E740481C1C}">
-                  <a14:useLocalDpi xmlns:a14="http://schemas.microsoft.com/office/drawing/2010/main"/>
-                </a:ext>
-              </a:extLst>
-            </a:blip>
-            <a:stretch>
-              <a:fillRect/>
-            </a:stretch>
-          </p:blipFill>
-          <p:spPr>
-            <a:xfrm>
-              <a:off x="3696389" y="2669231"/>
-              <a:ext cx="2143782" cy="1424721"/>
-            </a:xfrm>
-            <a:prstGeom prst="rect">
-              <a:avLst/>
-            </a:prstGeom>
-          </p:spPr>
-        </p:pic>
-        <p:pic>
-          <p:nvPicPr>
-            <p:cNvPr id="95" name="Picture 94"/>
-            <p:cNvPicPr>
-              <a:picLocks noChangeAspect="1"/>
-            </p:cNvPicPr>
-            <p:nvPr/>
-          </p:nvPicPr>
-          <p:blipFill>
-            <a:blip r:embed="rId9" cstate="print">
-              <a:extLst>
-                <a:ext uri="{28A0092B-C50C-407E-A947-70E740481C1C}">
-                  <a14:useLocalDpi xmlns:a14="http://schemas.microsoft.com/office/drawing/2010/main"/>
-                </a:ext>
-              </a:extLst>
-            </a:blip>
-            <a:stretch>
-              <a:fillRect/>
-            </a:stretch>
-          </p:blipFill>
-          <p:spPr>
-            <a:xfrm>
-              <a:off x="5998983" y="2669231"/>
-              <a:ext cx="2126039" cy="1411823"/>
-            </a:xfrm>
-            <a:prstGeom prst="rect">
-              <a:avLst/>
-            </a:prstGeom>
-          </p:spPr>
-        </p:pic>
-        <p:pic>
-          <p:nvPicPr>
-            <p:cNvPr id="96" name="Picture 95"/>
-            <p:cNvPicPr>
-              <a:picLocks noChangeAspect="1"/>
-            </p:cNvPicPr>
-            <p:nvPr/>
-          </p:nvPicPr>
-          <p:blipFill>
-            <a:blip r:embed="rId10" cstate="print">
-              <a:extLst>
-                <a:ext uri="{28A0092B-C50C-407E-A947-70E740481C1C}">
-                  <a14:useLocalDpi xmlns:a14="http://schemas.microsoft.com/office/drawing/2010/main"/>
-                </a:ext>
-              </a:extLst>
-            </a:blip>
-            <a:stretch>
-              <a:fillRect/>
-            </a:stretch>
-          </p:blipFill>
-          <p:spPr>
-            <a:xfrm>
-              <a:off x="8283834" y="2670758"/>
-              <a:ext cx="2123739" cy="1410296"/>
-            </a:xfrm>
-            <a:prstGeom prst="rect">
-              <a:avLst/>
-            </a:prstGeom>
-          </p:spPr>
-        </p:pic>
-      </p:grpSp>
-      <p:sp>
-        <p:nvSpPr>
-          <p:cNvPr id="130" name="TextBox 129"/>
-          <p:cNvSpPr txBox="1"/>
-          <p:nvPr/>
-        </p:nvSpPr>
-        <p:spPr>
-          <a:xfrm>
-            <a:off x="29400065" y="12544771"/>
-            <a:ext cx="12707319" cy="1569660"/>
-          </a:xfrm>
-          <a:prstGeom prst="rect">
-            <a:avLst/>
-          </a:prstGeom>
-          <a:noFill/>
-        </p:spPr>
-        <p:txBody>
-          <a:bodyPr wrap="square" rtlCol="0">
-            <a:spAutoFit/>
-          </a:bodyPr>
-          <a:lstStyle/>
-          <a:p>
-            <a:r>
-              <a:rPr lang="en-US" sz="3200" b="1" dirty="0"/>
-              <a:t>Figure 4: Results for several different styles and images. </a:t>
-            </a:r>
-            <a:r>
-              <a:rPr lang="en-US" sz="3200" b="1" dirty="0" smtClean="0"/>
-              <a:t> Results captured after 450 iterations of the algorithm. Uses α/β </a:t>
-            </a:r>
-            <a:r>
-              <a:rPr lang="en-US" sz="3200" b="1" dirty="0"/>
-              <a:t>ratio on the scale of 10</a:t>
-            </a:r>
-            <a:r>
-              <a:rPr lang="en-US" sz="3200" b="1" baseline="30000" dirty="0"/>
-              <a:t>-2</a:t>
-            </a:r>
-            <a:r>
-              <a:rPr lang="en-US" sz="3200" b="1" dirty="0"/>
-              <a:t>. Overall results are </a:t>
-            </a:r>
-            <a:r>
-              <a:rPr lang="en-US" sz="3200" b="1" dirty="0" smtClean="0"/>
-              <a:t>successful, </a:t>
-            </a:r>
-            <a:r>
-              <a:rPr lang="en-US" sz="3200" b="1" dirty="0"/>
-              <a:t>but there are cases that do not </a:t>
-            </a:r>
-            <a:r>
-              <a:rPr lang="en-US" sz="3200" b="1" dirty="0" smtClean="0"/>
-              <a:t>work well.</a:t>
-            </a:r>
-            <a:endParaRPr lang="en-US" sz="3200" b="1" dirty="0"/>
-          </a:p>
-        </p:txBody>
-      </p:sp>
-      <p:sp>
-        <p:nvSpPr>
-          <p:cNvPr id="3" name="TextBox 2"/>
-          <p:cNvSpPr txBox="1"/>
-          <p:nvPr/>
-        </p:nvSpPr>
-        <p:spPr>
-          <a:xfrm>
-            <a:off x="15709777" y="29748540"/>
-            <a:ext cx="12560423" cy="1569660"/>
-          </a:xfrm>
-          <a:prstGeom prst="rect">
-            <a:avLst/>
-          </a:prstGeom>
-          <a:noFill/>
-        </p:spPr>
-        <p:txBody>
-          <a:bodyPr wrap="square" rtlCol="0">
-            <a:spAutoFit/>
-          </a:bodyPr>
-          <a:lstStyle/>
-          <a:p>
-            <a:r>
-              <a:rPr lang="en-US" sz="3200" b="1" dirty="0"/>
-              <a:t>Figure 3: </a:t>
-            </a:r>
-            <a:r>
-              <a:rPr lang="en-US" sz="3200" b="1" dirty="0" smtClean="0"/>
-              <a:t>Original </a:t>
-            </a:r>
-            <a:r>
-              <a:rPr lang="en-US" sz="3200" b="1" dirty="0"/>
-              <a:t>method </a:t>
-            </a:r>
-            <a:r>
-              <a:rPr lang="en-US" sz="3200" b="1" dirty="0" smtClean="0"/>
-              <a:t>(second from right) </a:t>
-            </a:r>
-            <a:r>
-              <a:rPr lang="en-US" sz="3200" b="1" dirty="0"/>
-              <a:t>and enhanced method </a:t>
-            </a:r>
-            <a:r>
-              <a:rPr lang="en-US" sz="3200" b="1" dirty="0" smtClean="0"/>
-              <a:t>(far right</a:t>
-            </a:r>
-            <a:r>
-              <a:rPr lang="en-US" sz="3200" b="1" dirty="0"/>
-              <a:t>). </a:t>
-            </a:r>
-            <a:r>
-              <a:rPr lang="en-US" sz="3200" b="1" dirty="0" smtClean="0"/>
-              <a:t> Artifacts from original </a:t>
-            </a:r>
-            <a:r>
-              <a:rPr lang="en-US" sz="3200" b="1" dirty="0"/>
-              <a:t>style image are less </a:t>
-            </a:r>
-            <a:r>
-              <a:rPr lang="en-US" sz="3200" b="1" dirty="0" smtClean="0"/>
-              <a:t>apparent, </a:t>
-            </a:r>
-            <a:r>
-              <a:rPr lang="en-US" sz="3200" b="1" dirty="0"/>
-              <a:t>and </a:t>
-            </a:r>
-            <a:r>
-              <a:rPr lang="en-US" sz="3200" b="1" dirty="0" smtClean="0"/>
-              <a:t>colors </a:t>
-            </a:r>
-            <a:r>
-              <a:rPr lang="en-US" sz="3200" b="1" dirty="0"/>
-              <a:t>resemble the content image more than the style image.</a:t>
-            </a:r>
-          </a:p>
-        </p:txBody>
-      </p:sp>
-      <p:graphicFrame>
-        <p:nvGraphicFramePr>
-          <p:cNvPr id="6" name="Table 5"/>
-          <p:cNvGraphicFramePr>
-            <a:graphicFrameLocks noGrp="1"/>
-          </p:cNvGraphicFramePr>
-          <p:nvPr>
-            <p:extLst>
-              <p:ext uri="{D42A27DB-BD31-4B8C-83A1-F6EECF244321}">
-                <p14:modId xmlns:p14="http://schemas.microsoft.com/office/powerpoint/2010/main" val="866544744"/>
-              </p:ext>
-            </p:extLst>
-          </p:nvPr>
-        </p:nvGraphicFramePr>
-        <p:xfrm>
-          <a:off x="29268824" y="28650753"/>
-          <a:ext cx="13250777" cy="2905620"/>
-        </p:xfrm>
-        <a:graphic>
-          <a:graphicData uri="http://schemas.openxmlformats.org/drawingml/2006/table">
-            <a:tbl>
-              <a:tblPr firstRow="1" firstCol="1" bandRow="1"/>
-              <a:tblGrid>
-                <a:gridCol w="13250777">
-                  <a:extLst>
-                    <a:ext uri="{9D8B030D-6E8A-4147-A177-3AD203B41FA5}">
-                      <a16:colId xmlns:a16="http://schemas.microsoft.com/office/drawing/2014/main" xmlns="" val="20000"/>
-                    </a:ext>
-                  </a:extLst>
-                </a:gridCol>
-              </a:tblGrid>
-              <a:tr h="262890">
-                <a:tc>
-                  <a:txBody>
-                    <a:bodyPr/>
-                    <a:lstStyle/>
-                    <a:p>
-                      <a:pPr marL="0" marR="0">
-                        <a:spcBef>
-                          <a:spcPts val="0"/>
-                        </a:spcBef>
-                        <a:spcAft>
-                          <a:spcPts val="0"/>
-                        </a:spcAft>
-                      </a:pPr>
-                      <a:r>
-                        <a:rPr lang="en-US" sz="1600" dirty="0">
-                          <a:effectLst/>
-                          <a:latin typeface="+mn-lt"/>
-                          <a:ea typeface="Times New Roman" charset="0"/>
-                        </a:rPr>
-                        <a:t>J. Schmidhuber, "Deep learning in neural networks: An overview," </a:t>
-                      </a:r>
-                      <a:r>
-                        <a:rPr lang="en-US" sz="1600" i="1" dirty="0">
-                          <a:effectLst/>
-                          <a:latin typeface="+mn-lt"/>
-                          <a:ea typeface="Times New Roman" charset="0"/>
-                        </a:rPr>
-                        <a:t>Neural Networks, </a:t>
-                      </a:r>
-                      <a:r>
-                        <a:rPr lang="en-US" sz="1600" dirty="0">
-                          <a:effectLst/>
-                          <a:latin typeface="+mn-lt"/>
-                          <a:ea typeface="Times New Roman" charset="0"/>
-                        </a:rPr>
-                        <a:t>vol. 61, no. 0893-6080, pp. 85-117, 2015. </a:t>
-                      </a:r>
-                    </a:p>
-                  </a:txBody>
-                  <a:tcPr marL="9525" marR="9525" marT="9525" marB="9525">
-                    <a:lnL w="12700" cap="flat" cmpd="sng" algn="ctr">
-                      <a:solidFill>
-                        <a:schemeClr val="tx1"/>
-                      </a:solidFill>
-                      <a:prstDash val="solid"/>
-                      <a:round/>
-                      <a:headEnd type="none" w="med" len="med"/>
-                      <a:tailEnd type="none" w="med" len="med"/>
-                    </a:lnL>
-                    <a:lnR w="12700" cap="flat" cmpd="sng" algn="ctr">
-                      <a:solidFill>
-                        <a:schemeClr val="tx1"/>
-                      </a:solidFill>
-                      <a:prstDash val="solid"/>
-                      <a:round/>
-                      <a:headEnd type="none" w="med" len="med"/>
-                      <a:tailEnd type="none" w="med" len="med"/>
-                    </a:lnR>
-                    <a:lnT w="12700" cap="flat" cmpd="sng" algn="ctr">
-                      <a:solidFill>
-                        <a:schemeClr val="tx1"/>
-                      </a:solidFill>
-                      <a:prstDash val="solid"/>
-                      <a:round/>
-                      <a:headEnd type="none" w="med" len="med"/>
-                      <a:tailEnd type="none" w="med" len="med"/>
-                    </a:lnT>
-                    <a:lnB>
-                      <a:noFill/>
-                    </a:lnB>
-                    <a:solidFill>
-                      <a:srgbClr val="FFFFFF"/>
-                    </a:solidFill>
-                  </a:tcPr>
-                </a:tc>
-                <a:extLst>
-                  <a:ext uri="{0D108BD9-81ED-4DB2-BD59-A6C34878D82A}">
-                    <a16:rowId xmlns:a16="http://schemas.microsoft.com/office/drawing/2014/main" xmlns="" val="10000"/>
-                  </a:ext>
-                </a:extLst>
-              </a:tr>
-              <a:tr h="280635">
-                <a:tc>
-                  <a:txBody>
-                    <a:bodyPr/>
-                    <a:lstStyle/>
-                    <a:p>
-                      <a:pPr marL="0" marR="0">
-                        <a:spcBef>
-                          <a:spcPts val="0"/>
-                        </a:spcBef>
-                        <a:spcAft>
-                          <a:spcPts val="0"/>
-                        </a:spcAft>
-                      </a:pPr>
-                      <a:r>
-                        <a:rPr lang="en-US" sz="1600" dirty="0">
-                          <a:effectLst/>
-                          <a:latin typeface="+mn-lt"/>
-                          <a:ea typeface="Times New Roman" charset="0"/>
-                        </a:rPr>
-                        <a:t>A. Z. Karen Simonyan, "Very Deep Convolutional Networks for Large-Scale Image Recognition," </a:t>
-                      </a:r>
-                      <a:r>
-                        <a:rPr lang="en-US" sz="1600" i="1" dirty="0">
-                          <a:effectLst/>
-                          <a:latin typeface="+mn-lt"/>
-                          <a:ea typeface="Times New Roman" charset="0"/>
-                        </a:rPr>
-                        <a:t>Computing Research Repository, </a:t>
-                      </a:r>
-                      <a:r>
-                        <a:rPr lang="en-US" sz="1600" dirty="0">
-                          <a:effectLst/>
-                          <a:latin typeface="+mn-lt"/>
-                          <a:ea typeface="Times New Roman" charset="0"/>
-                        </a:rPr>
-                        <a:t>no. 1409.1556, 2104. </a:t>
-                      </a:r>
-                    </a:p>
-                  </a:txBody>
-                  <a:tcPr marL="9525" marR="9525" marT="9525" marB="9525">
-                    <a:lnL w="12700" cap="flat" cmpd="sng" algn="ctr">
-                      <a:solidFill>
-                        <a:schemeClr val="tx1"/>
-                      </a:solidFill>
-                      <a:prstDash val="solid"/>
-                      <a:round/>
-                      <a:headEnd type="none" w="med" len="med"/>
-                      <a:tailEnd type="none" w="med" len="med"/>
-                    </a:lnL>
-                    <a:lnR w="12700" cap="flat" cmpd="sng" algn="ctr">
-                      <a:solidFill>
-                        <a:schemeClr val="tx1"/>
-                      </a:solidFill>
-                      <a:prstDash val="solid"/>
-                      <a:round/>
-                      <a:headEnd type="none" w="med" len="med"/>
-                      <a:tailEnd type="none" w="med" len="med"/>
-                    </a:lnR>
-                    <a:lnT>
-                      <a:noFill/>
-                    </a:lnT>
-                    <a:lnB>
-                      <a:noFill/>
-                    </a:lnB>
-                    <a:solidFill>
-                      <a:srgbClr val="FFFFFF"/>
-                    </a:solidFill>
-                  </a:tcPr>
-                </a:tc>
-                <a:extLst>
-                  <a:ext uri="{0D108BD9-81ED-4DB2-BD59-A6C34878D82A}">
-                    <a16:rowId xmlns:a16="http://schemas.microsoft.com/office/drawing/2014/main" xmlns="" val="10001"/>
-                  </a:ext>
-                </a:extLst>
-              </a:tr>
-              <a:tr h="506730">
-                <a:tc>
-                  <a:txBody>
-                    <a:bodyPr/>
-                    <a:lstStyle/>
-                    <a:p>
-                      <a:pPr marL="0" marR="0">
-                        <a:spcBef>
-                          <a:spcPts val="0"/>
-                        </a:spcBef>
-                        <a:spcAft>
-                          <a:spcPts val="0"/>
-                        </a:spcAft>
-                      </a:pPr>
-                      <a:r>
-                        <a:rPr lang="en-US" sz="1600" dirty="0">
-                          <a:effectLst/>
-                          <a:latin typeface="+mn-lt"/>
-                          <a:ea typeface="Times New Roman" charset="0"/>
-                        </a:rPr>
-                        <a:t>A. Karpathy, "CS231n Convolutional Neural Networks for Visual Recognition," [Online]. Available: http://cs231n.github.io/convolutional-networks/. [Accessed 2016].</a:t>
-                      </a:r>
-                    </a:p>
-                  </a:txBody>
-                  <a:tcPr marL="9525" marR="9525" marT="9525" marB="9525">
-                    <a:lnL w="12700" cap="flat" cmpd="sng" algn="ctr">
-                      <a:solidFill>
-                        <a:schemeClr val="tx1"/>
-                      </a:solidFill>
-                      <a:prstDash val="solid"/>
-                      <a:round/>
-                      <a:headEnd type="none" w="med" len="med"/>
-                      <a:tailEnd type="none" w="med" len="med"/>
-                    </a:lnL>
-                    <a:lnR w="12700" cap="flat" cmpd="sng" algn="ctr">
-                      <a:solidFill>
-                        <a:schemeClr val="tx1"/>
-                      </a:solidFill>
-                      <a:prstDash val="solid"/>
-                      <a:round/>
-                      <a:headEnd type="none" w="med" len="med"/>
-                      <a:tailEnd type="none" w="med" len="med"/>
-                    </a:lnR>
-                    <a:lnT>
-                      <a:noFill/>
-                    </a:lnT>
-                    <a:lnB>
-                      <a:noFill/>
-                    </a:lnB>
-                    <a:solidFill>
-                      <a:srgbClr val="FFFFFF"/>
-                    </a:solidFill>
-                  </a:tcPr>
-                </a:tc>
-                <a:extLst>
-                  <a:ext uri="{0D108BD9-81ED-4DB2-BD59-A6C34878D82A}">
-                    <a16:rowId xmlns:a16="http://schemas.microsoft.com/office/drawing/2014/main" xmlns="" val="10002"/>
-                  </a:ext>
-                </a:extLst>
-              </a:tr>
-              <a:tr h="280635">
-                <a:tc>
-                  <a:txBody>
-                    <a:bodyPr/>
-                    <a:lstStyle/>
-                    <a:p>
-                      <a:pPr marL="0" marR="0">
-                        <a:spcBef>
-                          <a:spcPts val="0"/>
-                        </a:spcBef>
-                        <a:spcAft>
-                          <a:spcPts val="0"/>
-                        </a:spcAft>
-                      </a:pPr>
-                      <a:r>
-                        <a:rPr lang="en-US" sz="1600" dirty="0">
-                          <a:effectLst/>
-                          <a:latin typeface="+mn-lt"/>
-                          <a:ea typeface="Times New Roman" charset="0"/>
-                        </a:rPr>
-                        <a:t>A. E. a. M. B. Leon Gatys, "A Neural Algorithm of Artistic Style," </a:t>
-                      </a:r>
-                      <a:r>
-                        <a:rPr lang="en-US" sz="1600" i="1" dirty="0">
-                          <a:effectLst/>
-                          <a:latin typeface="+mn-lt"/>
-                          <a:ea typeface="Times New Roman" charset="0"/>
-                        </a:rPr>
-                        <a:t>Journal of Vision, </a:t>
-                      </a:r>
-                      <a:r>
-                        <a:rPr lang="en-US" sz="1600" dirty="0">
-                          <a:effectLst/>
-                          <a:latin typeface="+mn-lt"/>
-                          <a:ea typeface="Times New Roman" charset="0"/>
-                        </a:rPr>
-                        <a:t>vol. 16, no. 12, p. 326, 2015. </a:t>
-                      </a:r>
-                    </a:p>
-                  </a:txBody>
-                  <a:tcPr marL="9525" marR="9525" marT="9525" marB="9525">
-                    <a:lnL w="12700" cap="flat" cmpd="sng" algn="ctr">
-                      <a:solidFill>
-                        <a:schemeClr val="tx1"/>
-                      </a:solidFill>
-                      <a:prstDash val="solid"/>
-                      <a:round/>
-                      <a:headEnd type="none" w="med" len="med"/>
-                      <a:tailEnd type="none" w="med" len="med"/>
-                    </a:lnL>
-                    <a:lnR w="12700" cap="flat" cmpd="sng" algn="ctr">
-                      <a:solidFill>
-                        <a:schemeClr val="tx1"/>
-                      </a:solidFill>
-                      <a:prstDash val="solid"/>
-                      <a:round/>
-                      <a:headEnd type="none" w="med" len="med"/>
-                      <a:tailEnd type="none" w="med" len="med"/>
-                    </a:lnR>
-                    <a:lnT>
-                      <a:noFill/>
-                    </a:lnT>
-                    <a:lnB>
-                      <a:noFill/>
-                    </a:lnB>
-                    <a:solidFill>
-                      <a:srgbClr val="FFFFFF"/>
-                    </a:solidFill>
-                  </a:tcPr>
-                </a:tc>
-                <a:extLst>
-                  <a:ext uri="{0D108BD9-81ED-4DB2-BD59-A6C34878D82A}">
-                    <a16:rowId xmlns:a16="http://schemas.microsoft.com/office/drawing/2014/main" xmlns="" val="10003"/>
-                  </a:ext>
-                </a:extLst>
-              </a:tr>
-              <a:tr h="506730">
-                <a:tc>
-                  <a:txBody>
-                    <a:bodyPr/>
-                    <a:lstStyle/>
-                    <a:p>
-                      <a:pPr marL="0" marR="0">
-                        <a:spcBef>
-                          <a:spcPts val="0"/>
-                        </a:spcBef>
-                        <a:spcAft>
-                          <a:spcPts val="0"/>
-                        </a:spcAft>
-                      </a:pPr>
-                      <a:r>
-                        <a:rPr lang="en-US" sz="1600" dirty="0">
-                          <a:effectLst/>
-                          <a:latin typeface="+mn-lt"/>
-                          <a:ea typeface="Times New Roman" charset="0"/>
-                        </a:rPr>
-                        <a:t>A. E. a. M. B. Leon Gatys, "Image Style Transfer Using Convolutional Neural Networks," in </a:t>
-                      </a:r>
-                      <a:r>
-                        <a:rPr lang="en-US" sz="1600" i="1" dirty="0">
-                          <a:effectLst/>
-                          <a:latin typeface="+mn-lt"/>
-                          <a:ea typeface="Times New Roman" charset="0"/>
-                        </a:rPr>
-                        <a:t>The IEEE Conference on Computer Vision and Pattern Recognition</a:t>
-                      </a:r>
-                      <a:r>
-                        <a:rPr lang="en-US" sz="1600" dirty="0">
-                          <a:effectLst/>
-                          <a:latin typeface="+mn-lt"/>
-                          <a:ea typeface="Times New Roman" charset="0"/>
-                        </a:rPr>
-                        <a:t>, 2016. </a:t>
-                      </a:r>
-                    </a:p>
-                  </a:txBody>
-                  <a:tcPr marL="9525" marR="9525" marT="9525" marB="9525">
-                    <a:lnL w="12700" cap="flat" cmpd="sng" algn="ctr">
-                      <a:solidFill>
-                        <a:schemeClr val="tx1"/>
-                      </a:solidFill>
-                      <a:prstDash val="solid"/>
-                      <a:round/>
-                      <a:headEnd type="none" w="med" len="med"/>
-                      <a:tailEnd type="none" w="med" len="med"/>
-                    </a:lnL>
-                    <a:lnR w="12700" cap="flat" cmpd="sng" algn="ctr">
-                      <a:solidFill>
-                        <a:schemeClr val="tx1"/>
-                      </a:solidFill>
-                      <a:prstDash val="solid"/>
-                      <a:round/>
-                      <a:headEnd type="none" w="med" len="med"/>
-                      <a:tailEnd type="none" w="med" len="med"/>
-                    </a:lnR>
-                    <a:lnT>
-                      <a:noFill/>
-                    </a:lnT>
-                    <a:lnB>
-                      <a:noFill/>
-                    </a:lnB>
-                    <a:solidFill>
-                      <a:srgbClr val="FFFFFF"/>
-                    </a:solidFill>
-                  </a:tcPr>
-                </a:tc>
-                <a:extLst>
-                  <a:ext uri="{0D108BD9-81ED-4DB2-BD59-A6C34878D82A}">
-                    <a16:rowId xmlns:a16="http://schemas.microsoft.com/office/drawing/2014/main" xmlns="" val="10004"/>
-                  </a:ext>
-                </a:extLst>
-              </a:tr>
-              <a:tr h="280635">
-                <a:tc>
-                  <a:txBody>
-                    <a:bodyPr/>
-                    <a:lstStyle/>
-                    <a:p>
-                      <a:pPr marL="0" marR="0">
-                        <a:spcBef>
-                          <a:spcPts val="0"/>
-                        </a:spcBef>
-                        <a:spcAft>
-                          <a:spcPts val="0"/>
-                        </a:spcAft>
-                      </a:pPr>
-                      <a:r>
-                        <a:rPr lang="en-US" sz="1600" dirty="0">
-                          <a:effectLst/>
-                          <a:latin typeface="+mn-lt"/>
-                          <a:ea typeface="Times New Roman" charset="0"/>
-                        </a:rPr>
-                        <a:t>R. K. K. a. C. F. Collobert, "Torch7: A matlab-like environment for machine learning.," in </a:t>
-                      </a:r>
-                      <a:r>
-                        <a:rPr lang="en-US" sz="1600" i="1" dirty="0">
-                          <a:effectLst/>
-                          <a:latin typeface="+mn-lt"/>
-                          <a:ea typeface="Times New Roman" charset="0"/>
-                        </a:rPr>
-                        <a:t>BigLearn, NIPS Workshop</a:t>
-                      </a:r>
-                      <a:r>
-                        <a:rPr lang="en-US" sz="1600" dirty="0">
-                          <a:effectLst/>
-                          <a:latin typeface="+mn-lt"/>
-                          <a:ea typeface="Times New Roman" charset="0"/>
-                        </a:rPr>
-                        <a:t>, 2011. </a:t>
-                      </a:r>
-                    </a:p>
-                  </a:txBody>
-                  <a:tcPr marL="9525" marR="9525" marT="9525" marB="9525">
-                    <a:lnL w="12700" cap="flat" cmpd="sng" algn="ctr">
-                      <a:solidFill>
-                        <a:schemeClr val="tx1"/>
-                      </a:solidFill>
-                      <a:prstDash val="solid"/>
-                      <a:round/>
-                      <a:headEnd type="none" w="med" len="med"/>
-                      <a:tailEnd type="none" w="med" len="med"/>
-                    </a:lnL>
-                    <a:lnR w="12700" cap="flat" cmpd="sng" algn="ctr">
-                      <a:solidFill>
-                        <a:schemeClr val="tx1"/>
-                      </a:solidFill>
-                      <a:prstDash val="solid"/>
-                      <a:round/>
-                      <a:headEnd type="none" w="med" len="med"/>
-                      <a:tailEnd type="none" w="med" len="med"/>
-                    </a:lnR>
-                    <a:lnT>
-                      <a:noFill/>
-                    </a:lnT>
-                    <a:lnB>
-                      <a:noFill/>
-                    </a:lnB>
-                    <a:solidFill>
-                      <a:srgbClr val="FFFFFF"/>
-                    </a:solidFill>
-                  </a:tcPr>
-                </a:tc>
-                <a:extLst>
-                  <a:ext uri="{0D108BD9-81ED-4DB2-BD59-A6C34878D82A}">
-                    <a16:rowId xmlns:a16="http://schemas.microsoft.com/office/drawing/2014/main" xmlns="" val="10005"/>
-                  </a:ext>
-                </a:extLst>
-              </a:tr>
-              <a:tr h="280635">
-                <a:tc>
-                  <a:txBody>
-                    <a:bodyPr/>
-                    <a:lstStyle/>
-                    <a:p>
-                      <a:pPr marL="0" marR="0">
-                        <a:spcBef>
-                          <a:spcPts val="0"/>
-                        </a:spcBef>
-                        <a:spcAft>
-                          <a:spcPts val="0"/>
-                        </a:spcAft>
-                      </a:pPr>
-                      <a:r>
-                        <a:rPr lang="en-US" sz="1600" dirty="0">
-                          <a:effectLst/>
-                          <a:latin typeface="+mn-lt"/>
-                          <a:ea typeface="Times New Roman" charset="0"/>
-                        </a:rPr>
-                        <a:t>V. A. P. a. I. D. R. Carl Yuheng Ren, "gSLICr: SLIC superpixels at over 250Hz," 2015.</a:t>
-                      </a:r>
-                    </a:p>
-                  </a:txBody>
-                  <a:tcPr marL="9525" marR="9525" marT="9525" marB="9525">
-                    <a:lnL w="12700" cap="flat" cmpd="sng" algn="ctr">
-                      <a:solidFill>
-                        <a:schemeClr val="tx1"/>
-                      </a:solidFill>
-                      <a:prstDash val="solid"/>
-                      <a:round/>
-                      <a:headEnd type="none" w="med" len="med"/>
-                      <a:tailEnd type="none" w="med" len="med"/>
-                    </a:lnL>
-                    <a:lnR w="12700" cap="flat" cmpd="sng" algn="ctr">
-                      <a:solidFill>
-                        <a:schemeClr val="tx1"/>
-                      </a:solidFill>
-                      <a:prstDash val="solid"/>
-                      <a:round/>
-                      <a:headEnd type="none" w="med" len="med"/>
-                      <a:tailEnd type="none" w="med" len="med"/>
-                    </a:lnR>
-                    <a:lnT>
-                      <a:noFill/>
-                    </a:lnT>
-                    <a:lnB>
-                      <a:noFill/>
-                    </a:lnB>
-                    <a:solidFill>
-                      <a:srgbClr val="FFFFFF"/>
-                    </a:solidFill>
-                  </a:tcPr>
-                </a:tc>
-                <a:extLst>
-                  <a:ext uri="{0D108BD9-81ED-4DB2-BD59-A6C34878D82A}">
-                    <a16:rowId xmlns:a16="http://schemas.microsoft.com/office/drawing/2014/main" xmlns="" val="10006"/>
-                  </a:ext>
-                </a:extLst>
-              </a:tr>
-              <a:tr h="506730">
-                <a:tc>
-                  <a:txBody>
-                    <a:bodyPr/>
-                    <a:lstStyle/>
-                    <a:p>
-                      <a:pPr marL="0" marR="0">
-                        <a:spcBef>
-                          <a:spcPts val="0"/>
-                        </a:spcBef>
-                        <a:spcAft>
-                          <a:spcPts val="0"/>
-                        </a:spcAft>
-                      </a:pPr>
-                      <a:r>
-                        <a:rPr lang="en-US" sz="1600" dirty="0">
-                          <a:effectLst/>
-                          <a:latin typeface="+mn-lt"/>
-                          <a:ea typeface="Times New Roman" charset="0"/>
-                        </a:rPr>
-                        <a:t>R. a. S. A. a. S. K. a. L. A. a. F. P. a. S. S. Achanta, "SLIC Superpixels Compared to State-of-the-Art Superpixel Methods," </a:t>
-                      </a:r>
-                      <a:r>
-                        <a:rPr lang="en-US" sz="1600" i="1" dirty="0">
-                          <a:effectLst/>
-                          <a:latin typeface="+mn-lt"/>
-                          <a:ea typeface="Times New Roman" charset="0"/>
-                        </a:rPr>
-                        <a:t>IEEE Trans. Pattern Anal. Mach. Intel., </a:t>
-                      </a:r>
-                      <a:r>
-                        <a:rPr lang="en-US" sz="1600" dirty="0">
-                          <a:effectLst/>
-                          <a:latin typeface="+mn-lt"/>
-                          <a:ea typeface="Times New Roman" charset="0"/>
-                        </a:rPr>
-                        <a:t>vol. 34, no. 11, pp. 2274-2282, Nov 2012. </a:t>
-                      </a:r>
-                    </a:p>
-                  </a:txBody>
-                  <a:tcPr marL="9525" marR="9525" marT="9525" marB="9525">
-                    <a:lnL w="12700" cap="flat" cmpd="sng" algn="ctr">
-                      <a:solidFill>
-                        <a:schemeClr val="tx1"/>
-                      </a:solidFill>
-                      <a:prstDash val="solid"/>
-                      <a:round/>
-                      <a:headEnd type="none" w="med" len="med"/>
-                      <a:tailEnd type="none" w="med" len="med"/>
-                    </a:lnL>
-                    <a:lnR w="12700" cap="flat" cmpd="sng" algn="ctr">
-                      <a:solidFill>
-                        <a:schemeClr val="tx1"/>
-                      </a:solidFill>
-                      <a:prstDash val="solid"/>
-                      <a:round/>
-                      <a:headEnd type="none" w="med" len="med"/>
-                      <a:tailEnd type="none" w="med" len="med"/>
-                    </a:lnR>
-                    <a:lnT>
-                      <a:noFill/>
-                    </a:lnT>
-                    <a:lnB w="12700" cap="flat" cmpd="sng" algn="ctr">
-                      <a:solidFill>
-                        <a:schemeClr val="tx1"/>
-                      </a:solidFill>
-                      <a:prstDash val="solid"/>
-                      <a:round/>
-                      <a:headEnd type="none" w="med" len="med"/>
-                      <a:tailEnd type="none" w="med" len="med"/>
-                    </a:lnB>
-                    <a:solidFill>
-                      <a:srgbClr val="FFFFFF"/>
-                    </a:solidFill>
-                  </a:tcPr>
-                </a:tc>
-                <a:extLst>
-                  <a:ext uri="{0D108BD9-81ED-4DB2-BD59-A6C34878D82A}">
-                    <a16:rowId xmlns:a16="http://schemas.microsoft.com/office/drawing/2014/main" xmlns="" val="10007"/>
-                  </a:ext>
-                </a:extLst>
-              </a:tr>
-            </a:tbl>
-          </a:graphicData>
-        </a:graphic>
-      </p:graphicFrame>
-      <p:sp>
-        <p:nvSpPr>
-          <p:cNvPr id="97" name="Rectangle 96"/>
-          <p:cNvSpPr/>
-          <p:nvPr/>
-        </p:nvSpPr>
-        <p:spPr>
-          <a:xfrm>
-            <a:off x="29260800" y="27964951"/>
-            <a:ext cx="13258800" cy="685800"/>
-          </a:xfrm>
-          <a:prstGeom prst="rect">
-            <a:avLst/>
-          </a:prstGeom>
-          <a:solidFill>
-            <a:schemeClr val="tx1"/>
-          </a:solidFill>
-          <a:ln w="12700"/>
-        </p:spPr>
-        <p:style>
-          <a:lnRef idx="2">
-            <a:schemeClr val="accent1">
-              <a:shade val="50000"/>
-            </a:schemeClr>
-          </a:lnRef>
-          <a:fillRef idx="1">
-            <a:schemeClr val="accent1"/>
-          </a:fillRef>
-          <a:effectRef idx="0">
-            <a:schemeClr val="accent1"/>
-          </a:effectRef>
-          <a:fontRef idx="minor">
-            <a:schemeClr val="lt1"/>
-          </a:fontRef>
-        </p:style>
-        <p:txBody>
-          <a:bodyPr lIns="68568" tIns="34284" rIns="68568" bIns="34284" rtlCol="0" anchor="ctr"/>
-          <a:lstStyle/>
-          <a:p>
-            <a:pPr algn="ctr"/>
-            <a:r>
-              <a:rPr lang="en-US" sz="4400" b="1" dirty="0">
-                <a:solidFill>
-                  <a:schemeClr val="accent3">
-                    <a:lumMod val="20000"/>
-                    <a:lumOff val="80000"/>
-                  </a:schemeClr>
-                </a:solidFill>
-              </a:rPr>
-              <a:t>References</a:t>
-            </a:r>
-          </a:p>
-        </p:txBody>
-      </p:sp>
-      <p:sp>
-        <p:nvSpPr>
-          <p:cNvPr id="18" name="Rectangle 4"/>
-          <p:cNvSpPr>
-            <a:spLocks noChangeArrowheads="1"/>
-          </p:cNvSpPr>
-          <p:nvPr/>
-        </p:nvSpPr>
-        <p:spPr bwMode="auto">
-          <a:xfrm>
-            <a:off x="29260800" y="21928015"/>
-            <a:ext cx="13258800" cy="5732585"/>
-          </a:xfrm>
-          <a:prstGeom prst="rect">
-            <a:avLst/>
-          </a:prstGeom>
-          <a:ln/>
-        </p:spPr>
-        <p:style>
-          <a:lnRef idx="2">
-            <a:schemeClr val="dk1"/>
-          </a:lnRef>
-          <a:fillRef idx="1">
-            <a:schemeClr val="lt1"/>
-          </a:fillRef>
-          <a:effectRef idx="0">
-            <a:schemeClr val="dk1"/>
-          </a:effectRef>
-          <a:fontRef idx="minor">
-            <a:schemeClr val="dk1"/>
-          </a:fontRef>
-        </p:style>
-        <p:txBody>
-          <a:bodyPr vert="horz" wrap="square" lIns="91440" tIns="45720" rIns="91440" bIns="45720" numCol="1" anchor="ctr" anchorCtr="0" compatLnSpc="1">
-            <a:prstTxWarp prst="textNoShape">
-              <a:avLst/>
-            </a:prstTxWarp>
-            <a:noAutofit/>
-          </a:bodyPr>
-          <a:lstStyle/>
-          <a:p>
-            <a:pPr marR="0" lvl="0" algn="just" defTabSz="913839" eaLnBrk="0" fontAlgn="base" hangingPunct="0">
-              <a:lnSpc>
-                <a:spcPct val="100000"/>
-              </a:lnSpc>
-              <a:spcBef>
-                <a:spcPct val="0"/>
-              </a:spcBef>
-              <a:spcAft>
-                <a:spcPct val="0"/>
-              </a:spcAft>
-              <a:buClrTx/>
-              <a:buSzTx/>
-              <a:buFontTx/>
-              <a:buNone/>
-              <a:tabLst/>
-            </a:pPr>
-            <a:r>
-              <a:rPr lang="en-US" altLang="en-US" sz="3200" dirty="0" smtClean="0">
-                <a:solidFill>
-                  <a:schemeClr val="tx1"/>
-                </a:solidFill>
-              </a:rPr>
-              <a:t>This project used Torch </a:t>
-            </a:r>
-            <a:r>
-              <a:rPr lang="en-US" altLang="en-US" sz="3200" dirty="0">
-                <a:solidFill>
-                  <a:schemeClr val="tx1"/>
-                </a:solidFill>
-              </a:rPr>
-              <a:t>and </a:t>
-            </a:r>
-            <a:r>
-              <a:rPr lang="en-US" altLang="en-US" sz="3200" dirty="0" err="1" smtClean="0">
-                <a:solidFill>
-                  <a:schemeClr val="tx1"/>
-                </a:solidFill>
-              </a:rPr>
-              <a:t>Lua</a:t>
-            </a:r>
-            <a:r>
-              <a:rPr lang="en-US" altLang="en-US" sz="3200" dirty="0" smtClean="0">
-                <a:solidFill>
-                  <a:schemeClr val="tx1"/>
-                </a:solidFill>
-              </a:rPr>
-              <a:t> </a:t>
-            </a:r>
-            <a:r>
-              <a:rPr lang="en-US" altLang="en-US" sz="3200" dirty="0">
-                <a:solidFill>
-                  <a:schemeClr val="tx1"/>
-                </a:solidFill>
-              </a:rPr>
-              <a:t>to </a:t>
-            </a:r>
-            <a:r>
-              <a:rPr lang="en-US" altLang="en-US" sz="3200" dirty="0" smtClean="0">
-                <a:solidFill>
-                  <a:schemeClr val="tx1"/>
-                </a:solidFill>
-              </a:rPr>
-              <a:t>develop an enhanced version </a:t>
-            </a:r>
-            <a:r>
-              <a:rPr lang="en-US" altLang="en-US" sz="3200" dirty="0">
-                <a:solidFill>
-                  <a:schemeClr val="tx1"/>
-                </a:solidFill>
-              </a:rPr>
-              <a:t>of </a:t>
-            </a:r>
-            <a:r>
-              <a:rPr lang="en-US" altLang="en-US" sz="3200" dirty="0" smtClean="0">
-                <a:solidFill>
-                  <a:schemeClr val="tx1"/>
-                </a:solidFill>
-              </a:rPr>
-              <a:t>a new algorithm </a:t>
-            </a:r>
-            <a:r>
-              <a:rPr lang="en-US" altLang="en-US" sz="3200" dirty="0">
-                <a:solidFill>
-                  <a:schemeClr val="tx1"/>
-                </a:solidFill>
-              </a:rPr>
-              <a:t>for transferring artistic </a:t>
-            </a:r>
-            <a:r>
-              <a:rPr lang="en-US" altLang="en-US" sz="3200" dirty="0" smtClean="0">
-                <a:solidFill>
-                  <a:schemeClr val="tx1"/>
-                </a:solidFill>
-              </a:rPr>
-              <a:t>style.  The improved algorithm uses image segmentation </a:t>
-            </a:r>
-            <a:r>
-              <a:rPr lang="en-US" altLang="en-US" sz="3200" dirty="0">
-                <a:solidFill>
-                  <a:schemeClr val="tx1"/>
-                </a:solidFill>
-              </a:rPr>
-              <a:t>to </a:t>
-            </a:r>
-            <a:r>
-              <a:rPr lang="en-US" altLang="en-US" sz="3200" dirty="0" smtClean="0">
-                <a:solidFill>
-                  <a:schemeClr val="tx1"/>
-                </a:solidFill>
-              </a:rPr>
-              <a:t>generate weight </a:t>
-            </a:r>
-            <a:r>
-              <a:rPr lang="en-US" altLang="en-US" sz="3200" dirty="0">
-                <a:solidFill>
-                  <a:schemeClr val="tx1"/>
-                </a:solidFill>
-              </a:rPr>
-              <a:t>masks for </a:t>
-            </a:r>
-            <a:r>
-              <a:rPr lang="en-US" altLang="en-US" sz="3200" dirty="0" smtClean="0">
-                <a:solidFill>
-                  <a:schemeClr val="tx1"/>
-                </a:solidFill>
-              </a:rPr>
-              <a:t>each style layer,  producing images more faithful </a:t>
-            </a:r>
-            <a:r>
-              <a:rPr lang="en-US" altLang="en-US" sz="3200" dirty="0">
-                <a:solidFill>
-                  <a:schemeClr val="tx1"/>
-                </a:solidFill>
-              </a:rPr>
-              <a:t>to the content image, while still </a:t>
-            </a:r>
-            <a:r>
-              <a:rPr lang="en-US" altLang="en-US" sz="3200" dirty="0" smtClean="0">
-                <a:solidFill>
-                  <a:schemeClr val="tx1"/>
-                </a:solidFill>
-              </a:rPr>
-              <a:t>incorporating the target </a:t>
-            </a:r>
-            <a:r>
-              <a:rPr lang="en-US" altLang="en-US" sz="3200" dirty="0">
-                <a:solidFill>
-                  <a:schemeClr val="tx1"/>
-                </a:solidFill>
-              </a:rPr>
-              <a:t>style. </a:t>
-            </a:r>
-            <a:r>
-              <a:rPr lang="en-US" altLang="en-US" sz="3200" dirty="0" smtClean="0">
-                <a:solidFill>
-                  <a:schemeClr val="tx1"/>
-                </a:solidFill>
-              </a:rPr>
-              <a:t>The </a:t>
-            </a:r>
-            <a:r>
-              <a:rPr lang="en-US" altLang="en-US" sz="3200" dirty="0">
-                <a:solidFill>
-                  <a:schemeClr val="tx1"/>
-                </a:solidFill>
-              </a:rPr>
-              <a:t>project was successful at </a:t>
-            </a:r>
-            <a:r>
-              <a:rPr lang="en-US" altLang="en-US" sz="3200" dirty="0" smtClean="0">
-                <a:solidFill>
-                  <a:schemeClr val="tx1"/>
-                </a:solidFill>
-              </a:rPr>
-              <a:t>improving the artistic style transfer algorithm, but can still be improved. </a:t>
-            </a:r>
-            <a:r>
-              <a:rPr lang="en-US" altLang="en-US" sz="3200" dirty="0">
-                <a:solidFill>
-                  <a:schemeClr val="tx1"/>
-                </a:solidFill>
-              </a:rPr>
-              <a:t>Ideally, </a:t>
-            </a:r>
-            <a:r>
-              <a:rPr lang="en-US" altLang="en-US" sz="3200" dirty="0" smtClean="0">
-                <a:solidFill>
-                  <a:schemeClr val="tx1"/>
-                </a:solidFill>
-              </a:rPr>
-              <a:t>it would use two </a:t>
-            </a:r>
-            <a:r>
-              <a:rPr lang="en-US" altLang="en-US" sz="3200" dirty="0">
-                <a:solidFill>
-                  <a:schemeClr val="tx1"/>
-                </a:solidFill>
-              </a:rPr>
-              <a:t>sets of masks, one for the content image and one for the style image. The segments of the style image would then be used to identify regions with similar textures in the content image and allow the algorithm to perform a more directed style transfer. Another </a:t>
-            </a:r>
-            <a:r>
-              <a:rPr lang="en-US" altLang="en-US" sz="3200" dirty="0" smtClean="0">
-                <a:solidFill>
-                  <a:schemeClr val="tx1"/>
-                </a:solidFill>
-              </a:rPr>
-              <a:t>possible improvement </a:t>
-            </a:r>
-            <a:r>
-              <a:rPr lang="en-US" altLang="en-US" sz="3200" dirty="0">
-                <a:solidFill>
-                  <a:schemeClr val="tx1"/>
-                </a:solidFill>
-              </a:rPr>
-              <a:t>would be </a:t>
-            </a:r>
-            <a:r>
-              <a:rPr lang="en-US" altLang="en-US" sz="3200" dirty="0" smtClean="0">
-                <a:solidFill>
-                  <a:schemeClr val="tx1"/>
-                </a:solidFill>
-              </a:rPr>
-              <a:t>utilize a </a:t>
-            </a:r>
-            <a:r>
-              <a:rPr lang="en-US" altLang="en-US" sz="3200" dirty="0">
-                <a:solidFill>
-                  <a:schemeClr val="tx1"/>
-                </a:solidFill>
-              </a:rPr>
-              <a:t>CNN </a:t>
-            </a:r>
-            <a:r>
-              <a:rPr lang="en-US" altLang="en-US" sz="3200" dirty="0" smtClean="0">
-                <a:solidFill>
-                  <a:schemeClr val="tx1"/>
-                </a:solidFill>
-              </a:rPr>
-              <a:t>model specifically </a:t>
-            </a:r>
-            <a:r>
-              <a:rPr lang="en-US" altLang="en-US" sz="3200" dirty="0">
-                <a:solidFill>
-                  <a:schemeClr val="tx1"/>
-                </a:solidFill>
-              </a:rPr>
-              <a:t>trained on artwork </a:t>
-            </a:r>
-            <a:r>
-              <a:rPr lang="en-US" altLang="en-US" sz="3200" dirty="0" smtClean="0">
-                <a:solidFill>
-                  <a:schemeClr val="tx1"/>
-                </a:solidFill>
-              </a:rPr>
-              <a:t>classification.</a:t>
-            </a:r>
-            <a:endParaRPr lang="en-US" altLang="en-US" sz="3200" dirty="0">
-              <a:solidFill>
-                <a:schemeClr val="tx1"/>
-              </a:solidFill>
-            </a:endParaRPr>
-          </a:p>
-          <a:p>
-            <a:pPr marL="0" marR="0" lvl="0" indent="0" algn="l" defTabSz="914400" rtl="0" eaLnBrk="0" fontAlgn="base" latinLnBrk="0" hangingPunct="0">
-              <a:lnSpc>
-                <a:spcPct val="100000"/>
-              </a:lnSpc>
-              <a:spcBef>
-                <a:spcPct val="0"/>
-              </a:spcBef>
-              <a:spcAft>
-                <a:spcPct val="0"/>
-              </a:spcAft>
-              <a:buClrTx/>
-              <a:buSzTx/>
-              <a:buFontTx/>
-              <a:buNone/>
-              <a:tabLst/>
-            </a:pPr>
-            <a:endParaRPr kumimoji="0" lang="en-US" altLang="en-US" sz="1800" b="0" i="0" u="none" strike="noStrike" cap="none" normalizeH="0" baseline="0" dirty="0">
-              <a:ln>
-                <a:noFill/>
-              </a:ln>
-              <a:solidFill>
-                <a:schemeClr val="tx1"/>
-              </a:solidFill>
-              <a:effectLst/>
-              <a:latin typeface="Arial" charset="0"/>
-            </a:endParaRPr>
           </a:p>
         </p:txBody>
       </p:sp>
@@ -7830,395 +6366,6 @@
           </a:p>
         </p:txBody>
       </p:sp>
-      <p:sp>
-        <p:nvSpPr>
-          <p:cNvPr id="133" name="Rectangle 7"/>
-          <p:cNvSpPr>
-            <a:spLocks noChangeArrowheads="1"/>
-          </p:cNvSpPr>
-          <p:nvPr/>
-        </p:nvSpPr>
-        <p:spPr bwMode="auto">
-          <a:xfrm>
-            <a:off x="15320211" y="18380796"/>
-            <a:ext cx="13258801" cy="6739898"/>
-          </a:xfrm>
-          <a:prstGeom prst="rect">
-            <a:avLst/>
-          </a:prstGeom>
-          <a:noFill/>
-          <a:ln>
-            <a:noFill/>
-          </a:ln>
-          <a:effectLst/>
-          <a:extLst>
-            <a:ext uri="{909E8E84-426E-40DD-AFC4-6F175D3DCCD1}">
-              <a14:hiddenFill xmlns:a14="http://schemas.microsoft.com/office/drawing/2010/main">
-                <a:solidFill>
-                  <a:schemeClr val="accent1"/>
-                </a:solidFill>
-              </a14:hiddenFill>
-            </a:ext>
-            <a:ext uri="{91240B29-F687-4F45-9708-019B960494DF}">
-              <a14:hiddenLine xmlns:a14="http://schemas.microsoft.com/office/drawing/2010/main" w="9525">
-                <a:solidFill>
-                  <a:schemeClr val="tx1"/>
-                </a:solidFill>
-                <a:miter lim="800000"/>
-                <a:headEnd/>
-                <a:tailEnd/>
-              </a14:hiddenLine>
-            </a:ext>
-            <a:ext uri="{AF507438-7753-43E0-B8FC-AC1667EBCBE1}">
-              <a14:hiddenEffects xmlns:a14="http://schemas.microsoft.com/office/drawing/2010/main">
-                <a:effectLst>
-                  <a:outerShdw blurRad="63500" dist="38099" dir="2700000" algn="ctr" rotWithShape="0">
-                    <a:schemeClr val="bg2">
-                      <a:alpha val="74998"/>
-                    </a:schemeClr>
-                  </a:outerShdw>
-                </a:effectLst>
-              </a14:hiddenEffects>
-            </a:ext>
-          </a:extLst>
-        </p:spPr>
-        <p:txBody>
-          <a:bodyPr vert="horz" wrap="square" lIns="91440" tIns="45720" rIns="91440" bIns="45720" numCol="1" anchor="t" anchorCtr="0" compatLnSpc="1">
-            <a:prstTxWarp prst="textNoShape">
-              <a:avLst/>
-            </a:prstTxWarp>
-            <a:noAutofit/>
-          </a:bodyPr>
-          <a:lstStyle/>
-          <a:p>
-            <a:pPr marL="0" marR="0" lvl="0" indent="0" algn="l" defTabSz="914400" rtl="0" eaLnBrk="0" fontAlgn="base" latinLnBrk="0" hangingPunct="0">
-              <a:lnSpc>
-                <a:spcPct val="100000"/>
-              </a:lnSpc>
-              <a:spcBef>
-                <a:spcPct val="0"/>
-              </a:spcBef>
-              <a:spcAft>
-                <a:spcPct val="0"/>
-              </a:spcAft>
-              <a:buClrTx/>
-              <a:buSzTx/>
-              <a:buFontTx/>
-              <a:buNone/>
-              <a:tabLst/>
-            </a:pPr>
-            <a:r>
-              <a:rPr kumimoji="0" lang="en-US" altLang="en-US" sz="3600" b="0" i="0" u="none" strike="noStrike" cap="none" normalizeH="0" baseline="0" dirty="0" smtClean="0">
-                <a:ln>
-                  <a:noFill/>
-                </a:ln>
-                <a:solidFill>
-                  <a:schemeClr val="tx1"/>
-                </a:solidFill>
-                <a:effectLst/>
-              </a:rPr>
-              <a:t>Meets</a:t>
-            </a:r>
-            <a:r>
-              <a:rPr kumimoji="0" lang="en-US" altLang="en-US" sz="3600" b="0" i="0" u="none" strike="noStrike" cap="none" normalizeH="0" dirty="0" smtClean="0">
-                <a:ln>
-                  <a:noFill/>
-                </a:ln>
-                <a:solidFill>
-                  <a:schemeClr val="tx1"/>
-                </a:solidFill>
-                <a:effectLst/>
-              </a:rPr>
-              <a:t> goals established for the project:</a:t>
-            </a:r>
-          </a:p>
-          <a:p>
-            <a:pPr marL="1314450" lvl="1" indent="-571500" defTabSz="913839" fontAlgn="base">
-              <a:spcBef>
-                <a:spcPct val="0"/>
-              </a:spcBef>
-              <a:spcAft>
-                <a:spcPct val="0"/>
-              </a:spcAft>
-              <a:buFont typeface="Arial" panose="020B0604020202020204" pitchFamily="34" charset="0"/>
-              <a:buChar char="•"/>
-            </a:pPr>
-            <a:r>
-              <a:rPr lang="en-US" altLang="en-US" sz="3600" dirty="0"/>
-              <a:t>G</a:t>
-            </a:r>
-            <a:r>
-              <a:rPr lang="en-US" altLang="en-US" sz="3600" dirty="0" smtClean="0"/>
-              <a:t>enerates </a:t>
-            </a:r>
-            <a:r>
-              <a:rPr lang="en-US" altLang="en-US" sz="3600" dirty="0"/>
-              <a:t>new </a:t>
-            </a:r>
-            <a:r>
-              <a:rPr lang="en-US" altLang="en-US" sz="3600" dirty="0" smtClean="0"/>
-              <a:t>image similar to designated style image</a:t>
-            </a:r>
-          </a:p>
-          <a:p>
-            <a:pPr marL="1314450" lvl="1" indent="-571500" defTabSz="913839" fontAlgn="base">
-              <a:spcBef>
-                <a:spcPct val="0"/>
-              </a:spcBef>
-              <a:spcAft>
-                <a:spcPct val="0"/>
-              </a:spcAft>
-              <a:buFont typeface="Arial" panose="020B0604020202020204" pitchFamily="34" charset="0"/>
-              <a:buChar char="•"/>
-            </a:pPr>
-            <a:r>
-              <a:rPr lang="en-US" altLang="en-US" sz="3600" dirty="0" smtClean="0"/>
-              <a:t>Produces observable improvement over original method</a:t>
-            </a:r>
-            <a:endParaRPr lang="en-US" altLang="en-US" sz="3600" dirty="0"/>
-          </a:p>
-          <a:p>
-            <a:pPr marL="1314450" lvl="1" indent="-571500" defTabSz="913839" fontAlgn="base">
-              <a:spcBef>
-                <a:spcPct val="0"/>
-              </a:spcBef>
-              <a:spcAft>
-                <a:spcPct val="0"/>
-              </a:spcAft>
-              <a:buFont typeface="Arial" panose="020B0604020202020204" pitchFamily="34" charset="0"/>
-              <a:buChar char="•"/>
-            </a:pPr>
-            <a:r>
-              <a:rPr lang="en-US" altLang="en-US" sz="3600" dirty="0" smtClean="0"/>
-              <a:t>Maintains </a:t>
-            </a:r>
-            <a:r>
-              <a:rPr lang="en-US" altLang="en-US" sz="3600" dirty="0"/>
-              <a:t>higher content </a:t>
-            </a:r>
-            <a:r>
-              <a:rPr lang="en-US" altLang="en-US" sz="3600" dirty="0" smtClean="0"/>
-              <a:t>fidelity</a:t>
-            </a:r>
-          </a:p>
-          <a:p>
-            <a:pPr marL="1314450" lvl="1" indent="-571500" defTabSz="913839" fontAlgn="base">
-              <a:spcBef>
-                <a:spcPct val="0"/>
-              </a:spcBef>
-              <a:spcAft>
-                <a:spcPct val="0"/>
-              </a:spcAft>
-              <a:buFont typeface="Arial" panose="020B0604020202020204" pitchFamily="34" charset="0"/>
-              <a:buChar char="•"/>
-            </a:pPr>
-            <a:r>
-              <a:rPr lang="en-US" altLang="en-US" sz="3600" dirty="0" smtClean="0"/>
-              <a:t>Using different number of segments allows for varied output</a:t>
-            </a:r>
-          </a:p>
-          <a:p>
-            <a:pPr marR="0" lvl="0" algn="l" defTabSz="914400" rtl="0" eaLnBrk="0" fontAlgn="base" latinLnBrk="0" hangingPunct="0">
-              <a:lnSpc>
-                <a:spcPct val="100000"/>
-              </a:lnSpc>
-              <a:spcBef>
-                <a:spcPct val="0"/>
-              </a:spcBef>
-              <a:spcAft>
-                <a:spcPct val="0"/>
-              </a:spcAft>
-              <a:buClrTx/>
-              <a:buSzTx/>
-              <a:tabLst/>
-            </a:pPr>
-            <a:r>
-              <a:rPr lang="en-US" altLang="en-US" sz="3600" dirty="0" smtClean="0"/>
-              <a:t>E</a:t>
-            </a:r>
-            <a:r>
-              <a:rPr kumimoji="0" lang="en-US" altLang="en-US" sz="3600" b="0" i="0" u="none" strike="noStrike" cap="none" normalizeH="0" baseline="0" dirty="0" smtClean="0">
-                <a:ln>
-                  <a:noFill/>
-                </a:ln>
-                <a:solidFill>
-                  <a:schemeClr val="tx1"/>
-                </a:solidFill>
-                <a:effectLst/>
-              </a:rPr>
-              <a:t>nhanced </a:t>
-            </a:r>
-            <a:r>
-              <a:rPr kumimoji="0" lang="en-US" altLang="en-US" sz="3600" b="0" i="0" u="none" strike="noStrike" cap="none" normalizeH="0" baseline="0" dirty="0">
-                <a:ln>
-                  <a:noFill/>
-                </a:ln>
-                <a:solidFill>
-                  <a:schemeClr val="tx1"/>
-                </a:solidFill>
-                <a:effectLst/>
-              </a:rPr>
-              <a:t>version </a:t>
-            </a:r>
-            <a:r>
-              <a:rPr kumimoji="0" lang="en-US" altLang="en-US" sz="3600" b="0" i="0" u="none" strike="noStrike" cap="none" normalizeH="0" baseline="0" dirty="0" smtClean="0">
-                <a:ln>
-                  <a:noFill/>
-                </a:ln>
-                <a:solidFill>
-                  <a:schemeClr val="tx1"/>
-                </a:solidFill>
-                <a:effectLst/>
-              </a:rPr>
-              <a:t>stylizes </a:t>
-            </a:r>
-            <a:r>
-              <a:rPr kumimoji="0" lang="en-US" altLang="en-US" sz="3600" b="0" i="0" u="none" strike="noStrike" cap="none" normalizeH="0" baseline="0" dirty="0">
-                <a:ln>
-                  <a:noFill/>
-                </a:ln>
-                <a:solidFill>
-                  <a:schemeClr val="tx1"/>
-                </a:solidFill>
-                <a:effectLst/>
-              </a:rPr>
-              <a:t>images into the target </a:t>
-            </a:r>
-            <a:r>
-              <a:rPr kumimoji="0" lang="en-US" altLang="en-US" sz="3600" b="0" i="0" u="none" strike="noStrike" cap="none" normalizeH="0" baseline="0" dirty="0" smtClean="0">
-                <a:ln>
-                  <a:noFill/>
-                </a:ln>
-                <a:solidFill>
-                  <a:schemeClr val="tx1"/>
-                </a:solidFill>
-                <a:effectLst/>
-              </a:rPr>
-              <a:t>style:</a:t>
-            </a:r>
-          </a:p>
-          <a:p>
-            <a:pPr marL="1314450" marR="0" lvl="1" indent="-571500" defTabSz="913839" fontAlgn="base">
-              <a:lnSpc>
-                <a:spcPct val="100000"/>
-              </a:lnSpc>
-              <a:spcBef>
-                <a:spcPct val="0"/>
-              </a:spcBef>
-              <a:spcAft>
-                <a:spcPct val="0"/>
-              </a:spcAft>
-              <a:buClrTx/>
-              <a:buSzTx/>
-              <a:buFont typeface="Arial" panose="020B0604020202020204" pitchFamily="34" charset="0"/>
-              <a:buChar char="•"/>
-              <a:tabLst/>
-            </a:pPr>
-            <a:r>
-              <a:rPr lang="en-US" altLang="en-US" sz="3600" dirty="0" smtClean="0"/>
-              <a:t>Colors </a:t>
-            </a:r>
-            <a:r>
-              <a:rPr lang="en-US" altLang="en-US" sz="3600" dirty="0"/>
-              <a:t>are truer to the content </a:t>
-            </a:r>
-            <a:r>
-              <a:rPr lang="en-US" altLang="en-US" sz="3600" dirty="0" smtClean="0"/>
-              <a:t>image than the original</a:t>
-            </a:r>
-          </a:p>
-          <a:p>
-            <a:pPr marL="1314450" marR="0" lvl="1" indent="-571500" defTabSz="913839" fontAlgn="base">
-              <a:lnSpc>
-                <a:spcPct val="100000"/>
-              </a:lnSpc>
-              <a:spcBef>
-                <a:spcPct val="0"/>
-              </a:spcBef>
-              <a:spcAft>
-                <a:spcPct val="0"/>
-              </a:spcAft>
-              <a:buClrTx/>
-              <a:buSzTx/>
-              <a:buFont typeface="Arial" panose="020B0604020202020204" pitchFamily="34" charset="0"/>
-              <a:buChar char="•"/>
-              <a:tabLst/>
-            </a:pPr>
-            <a:r>
-              <a:rPr lang="en-US" altLang="en-US" sz="3600" dirty="0" smtClean="0"/>
-              <a:t> Artifacts from </a:t>
-            </a:r>
-            <a:r>
-              <a:rPr lang="en-US" altLang="en-US" sz="3600" dirty="0"/>
-              <a:t>the style image are less </a:t>
-            </a:r>
-            <a:r>
-              <a:rPr lang="en-US" altLang="en-US" sz="3600" dirty="0" smtClean="0"/>
-              <a:t>likely to occur</a:t>
-            </a:r>
-          </a:p>
-          <a:p>
-            <a:pPr marR="0" lvl="0" algn="l" defTabSz="914400" rtl="0" eaLnBrk="0" fontAlgn="base" latinLnBrk="0" hangingPunct="0">
-              <a:lnSpc>
-                <a:spcPct val="100000"/>
-              </a:lnSpc>
-              <a:spcBef>
-                <a:spcPct val="0"/>
-              </a:spcBef>
-              <a:spcAft>
-                <a:spcPct val="0"/>
-              </a:spcAft>
-              <a:buClrTx/>
-              <a:buSzTx/>
-              <a:tabLst/>
-            </a:pPr>
-            <a:r>
-              <a:rPr lang="en-US" altLang="en-US" sz="3600" dirty="0" smtClean="0"/>
-              <a:t>Other differences:</a:t>
-            </a:r>
-          </a:p>
-          <a:p>
-            <a:pPr marL="1314450" lvl="1" indent="-571500" defTabSz="913839" fontAlgn="base">
-              <a:spcBef>
-                <a:spcPct val="0"/>
-              </a:spcBef>
-              <a:spcAft>
-                <a:spcPct val="0"/>
-              </a:spcAft>
-              <a:buFont typeface="Arial" panose="020B0604020202020204" pitchFamily="34" charset="0"/>
-              <a:buChar char="•"/>
-            </a:pPr>
-            <a:r>
-              <a:rPr lang="en-US" altLang="en-US" sz="3600" dirty="0" smtClean="0"/>
-              <a:t>Optimizes spatial configuration faster for the same style and content mage than the original algorithm</a:t>
-            </a:r>
-          </a:p>
-          <a:p>
-            <a:pPr marL="1314450" lvl="1" indent="-571500" defTabSz="913839" fontAlgn="base">
-              <a:spcBef>
-                <a:spcPct val="0"/>
-              </a:spcBef>
-              <a:spcAft>
-                <a:spcPct val="0"/>
-              </a:spcAft>
-              <a:buFont typeface="Arial" panose="020B0604020202020204" pitchFamily="34" charset="0"/>
-              <a:buChar char="•"/>
-            </a:pPr>
-            <a:r>
-              <a:rPr lang="en-US" altLang="en-US" sz="3600" dirty="0" smtClean="0"/>
-              <a:t>However, mask calculation slows algorithm (O(n</a:t>
-            </a:r>
-            <a:r>
-              <a:rPr lang="en-US" altLang="en-US" sz="3600" baseline="30000" dirty="0" smtClean="0"/>
-              <a:t>2</a:t>
-            </a:r>
-            <a:r>
-              <a:rPr lang="en-US" altLang="en-US" sz="3600" dirty="0" smtClean="0"/>
-              <a:t>) operation)</a:t>
-            </a:r>
-          </a:p>
-        </p:txBody>
-      </p:sp>
       <p:pic>
         <p:nvPicPr>
           <p:cNvPr id="22" name="Picture 21"/>
@@ -8227,8 +6374,42 @@
           </p:cNvPicPr>
           <p:nvPr/>
         </p:nvPicPr>
+        <p:blipFill rotWithShape="1">
+          <a:blip r:embed="rId3">
+            <a:extLst>
+              <a:ext uri="{28A0092B-C50C-407E-A947-70E740481C1C}">
+                <a14:useLocalDpi xmlns:a14="http://schemas.microsoft.com/office/drawing/2010/main" val="0"/>
+              </a:ext>
+            </a:extLst>
+          </a:blip>
+          <a:srcRect t="8597" r="8849"/>
+          <a:stretch/>
+        </p:blipFill>
+        <p:spPr>
+          <a:xfrm>
+            <a:off x="15653235" y="9751658"/>
+            <a:ext cx="13212258" cy="7320671"/>
+          </a:xfrm>
+          <a:prstGeom prst="rect">
+            <a:avLst/>
+          </a:prstGeom>
+          <a:ln>
+            <a:solidFill>
+              <a:schemeClr val="accent2"/>
+            </a:solidFill>
+          </a:ln>
+        </p:spPr>
+      </p:pic>
+      <p:pic>
+        <p:nvPicPr>
+          <p:cNvPr id="7" name="Picture 6"/>
+          <p:cNvPicPr>
+            <a:picLocks noChangeAspect="1"/>
+          </p:cNvPicPr>
+          <p:nvPr/>
+        </p:nvPicPr>
         <p:blipFill>
-          <a:blip r:embed="rId11">
+          <a:blip r:embed="rId4">
             <a:extLst>
               <a:ext uri="{28A0092B-C50C-407E-A947-70E740481C1C}">
                 <a14:useLocalDpi xmlns:a14="http://schemas.microsoft.com/office/drawing/2010/main" val="0"/>
@@ -8241,12 +6422,784 @@
         </p:blipFill>
         <p:spPr>
           <a:xfrm>
-            <a:off x="1371600" y="12515930"/>
-            <a:ext cx="13165714" cy="7405714"/>
+            <a:off x="1371600" y="1014507"/>
+            <a:ext cx="5715000" cy="1782579"/>
           </a:xfrm>
           <a:prstGeom prst="rect">
             <a:avLst/>
           </a:prstGeom>
+        </p:spPr>
+      </p:pic>
+      <p:sp>
+        <p:nvSpPr>
+          <p:cNvPr id="38" name="Text Box 192"/>
+          <p:cNvSpPr txBox="1">
+            <a:spLocks noChangeArrowheads="1"/>
+          </p:cNvSpPr>
+          <p:nvPr/>
+        </p:nvSpPr>
+        <p:spPr bwMode="auto">
+          <a:xfrm>
+            <a:off x="1416599" y="11039639"/>
+            <a:ext cx="13213801" cy="1774206"/>
+          </a:xfrm>
+          <a:prstGeom prst="rect">
+            <a:avLst/>
+          </a:prstGeom>
+          <a:solidFill>
+            <a:schemeClr val="bg1"/>
+          </a:solidFill>
+          <a:ln w="12700">
+            <a:solidFill>
+              <a:schemeClr val="accent1">
+                <a:lumMod val="75000"/>
+              </a:schemeClr>
+            </a:solidFill>
+          </a:ln>
+          <a:effectLst/>
+        </p:spPr>
+        <p:txBody>
+          <a:bodyPr wrap="square" lIns="137160" tIns="137137" rIns="137137" bIns="137137">
+            <a:noAutofit/>
+          </a:bodyPr>
+          <a:lstStyle>
+            <a:lvl1pPr eaLnBrk="0" hangingPunct="0">
+              <a:defRPr sz="2200">
+                <a:solidFill>
+                  <a:schemeClr val="tx1"/>
+                </a:solidFill>
+                <a:latin typeface="Arial" charset="0"/>
+              </a:defRPr>
+            </a:lvl1pPr>
+            <a:lvl2pPr marL="742950" indent="-285750" eaLnBrk="0" hangingPunct="0">
+              <a:defRPr sz="2200">
+                <a:solidFill>
+                  <a:schemeClr val="tx1"/>
+                </a:solidFill>
+                <a:latin typeface="Arial" charset="0"/>
+              </a:defRPr>
+            </a:lvl2pPr>
+            <a:lvl3pPr marL="1143000" indent="-228600" eaLnBrk="0" hangingPunct="0">
+              <a:defRPr sz="2200">
+                <a:solidFill>
+                  <a:schemeClr val="tx1"/>
+                </a:solidFill>
+                <a:latin typeface="Arial" charset="0"/>
+              </a:defRPr>
+            </a:lvl3pPr>
+            <a:lvl4pPr marL="1600200" indent="-228600" eaLnBrk="0" hangingPunct="0">
+              <a:defRPr sz="2200">
+                <a:solidFill>
+                  <a:schemeClr val="tx1"/>
+                </a:solidFill>
+                <a:latin typeface="Arial" charset="0"/>
+              </a:defRPr>
+            </a:lvl4pPr>
+            <a:lvl5pPr marL="2057400" indent="-228600" eaLnBrk="0" hangingPunct="0">
+              <a:defRPr sz="2200">
+                <a:solidFill>
+                  <a:schemeClr val="tx1"/>
+                </a:solidFill>
+                <a:latin typeface="Arial" charset="0"/>
+              </a:defRPr>
+            </a:lvl5pPr>
+            <a:lvl6pPr marL="2514600" indent="-228600" eaLnBrk="0" fontAlgn="base" hangingPunct="0">
+              <a:spcBef>
+                <a:spcPct val="0"/>
+              </a:spcBef>
+              <a:spcAft>
+                <a:spcPct val="0"/>
+              </a:spcAft>
+              <a:defRPr sz="2200">
+                <a:solidFill>
+                  <a:schemeClr val="tx1"/>
+                </a:solidFill>
+                <a:latin typeface="Arial" charset="0"/>
+              </a:defRPr>
+            </a:lvl6pPr>
+            <a:lvl7pPr marL="2971800" indent="-228600" eaLnBrk="0" fontAlgn="base" hangingPunct="0">
+              <a:spcBef>
+                <a:spcPct val="0"/>
+              </a:spcBef>
+              <a:spcAft>
+                <a:spcPct val="0"/>
+              </a:spcAft>
+              <a:defRPr sz="2200">
+                <a:solidFill>
+                  <a:schemeClr val="tx1"/>
+                </a:solidFill>
+                <a:latin typeface="Arial" charset="0"/>
+              </a:defRPr>
+            </a:lvl7pPr>
+            <a:lvl8pPr marL="3429000" indent="-228600" eaLnBrk="0" fontAlgn="base" hangingPunct="0">
+              <a:spcBef>
+                <a:spcPct val="0"/>
+              </a:spcBef>
+              <a:spcAft>
+                <a:spcPct val="0"/>
+              </a:spcAft>
+              <a:defRPr sz="2200">
+                <a:solidFill>
+                  <a:schemeClr val="tx1"/>
+                </a:solidFill>
+                <a:latin typeface="Arial" charset="0"/>
+              </a:defRPr>
+            </a:lvl8pPr>
+            <a:lvl9pPr marL="3886200" indent="-228600" eaLnBrk="0" fontAlgn="base" hangingPunct="0">
+              <a:spcBef>
+                <a:spcPct val="0"/>
+              </a:spcBef>
+              <a:spcAft>
+                <a:spcPct val="0"/>
+              </a:spcAft>
+              <a:defRPr sz="2200">
+                <a:solidFill>
+                  <a:schemeClr val="tx1"/>
+                </a:solidFill>
+                <a:latin typeface="Arial" charset="0"/>
+              </a:defRPr>
+            </a:lvl9pPr>
+          </a:lstStyle>
+          <a:p>
+            <a:pPr marL="571500" indent="-571500" defTabSz="913839" eaLnBrk="1" hangingPunct="1">
+              <a:buFont typeface="Arial" charset="0"/>
+              <a:buChar char="•"/>
+            </a:pPr>
+            <a:r>
+              <a:rPr lang="en-US" sz="3200" dirty="0" smtClean="0">
+                <a:latin typeface="Roboto" charset="0"/>
+                <a:ea typeface="Roboto" charset="0"/>
+                <a:cs typeface="Roboto" charset="0"/>
+              </a:rPr>
+              <a:t>AngularJS Web Application</a:t>
+            </a:r>
+          </a:p>
+          <a:p>
+            <a:pPr marL="571500" indent="-571500" defTabSz="913839" eaLnBrk="1" hangingPunct="1">
+              <a:buFont typeface="Arial" charset="0"/>
+              <a:buChar char="•"/>
+            </a:pPr>
+            <a:r>
+              <a:rPr lang="en-US" sz="3200" dirty="0" smtClean="0">
+                <a:latin typeface="Roboto" charset="0"/>
+                <a:ea typeface="Roboto" charset="0"/>
+                <a:cs typeface="Roboto" charset="0"/>
+              </a:rPr>
+              <a:t>Native (Java) Android Application</a:t>
+            </a:r>
+            <a:endParaRPr lang="en-US" sz="3200" dirty="0">
+              <a:latin typeface="Roboto" charset="0"/>
+              <a:ea typeface="Roboto" charset="0"/>
+              <a:cs typeface="Roboto" charset="0"/>
+            </a:endParaRPr>
+          </a:p>
+        </p:txBody>
+      </p:sp>
+      <p:sp>
+        <p:nvSpPr>
+          <p:cNvPr id="41" name="Rectangle 40"/>
+          <p:cNvSpPr/>
+          <p:nvPr/>
+        </p:nvSpPr>
+        <p:spPr>
+          <a:xfrm>
+            <a:off x="1371600" y="10125239"/>
+            <a:ext cx="13258800" cy="914400"/>
+          </a:xfrm>
+          <a:prstGeom prst="rect">
+            <a:avLst/>
+          </a:prstGeom>
+          <a:solidFill>
+            <a:schemeClr val="tx1"/>
+          </a:solidFill>
+          <a:ln w="12700"/>
+        </p:spPr>
+        <p:style>
+          <a:lnRef idx="2">
+            <a:schemeClr val="accent1">
+              <a:shade val="50000"/>
+            </a:schemeClr>
+          </a:lnRef>
+          <a:fillRef idx="1">
+            <a:schemeClr val="accent1"/>
+          </a:fillRef>
+          <a:effectRef idx="0">
+            <a:schemeClr val="accent1"/>
+          </a:effectRef>
+          <a:fontRef idx="minor">
+            <a:schemeClr val="lt1"/>
+          </a:fontRef>
+        </p:style>
+        <p:txBody>
+          <a:bodyPr lIns="68568" tIns="34284" rIns="68568" bIns="34284" rtlCol="0" anchor="ctr"/>
+          <a:lstStyle/>
+          <a:p>
+            <a:pPr algn="ctr"/>
+            <a:r>
+              <a:rPr lang="en-US" sz="4400" b="1" dirty="0" smtClean="0">
+                <a:solidFill>
+                  <a:schemeClr val="accent3">
+                    <a:lumMod val="20000"/>
+                    <a:lumOff val="80000"/>
+                  </a:schemeClr>
+                </a:solidFill>
+              </a:rPr>
+              <a:t>Initial Software Options</a:t>
+            </a:r>
+            <a:endParaRPr lang="en-US" sz="4400" b="1" dirty="0">
+              <a:solidFill>
+                <a:schemeClr val="accent3">
+                  <a:lumMod val="20000"/>
+                  <a:lumOff val="80000"/>
+                </a:schemeClr>
+              </a:solidFill>
+            </a:endParaRPr>
+          </a:p>
+        </p:txBody>
+      </p:sp>
+      <p:sp>
+        <p:nvSpPr>
+          <p:cNvPr id="42" name="Text Box 192"/>
+          <p:cNvSpPr txBox="1">
+            <a:spLocks noChangeArrowheads="1"/>
+          </p:cNvSpPr>
+          <p:nvPr/>
+        </p:nvSpPr>
+        <p:spPr bwMode="auto">
+          <a:xfrm>
+            <a:off x="29888329" y="11954039"/>
+            <a:ext cx="12631271" cy="6812883"/>
+          </a:xfrm>
+          <a:prstGeom prst="rect">
+            <a:avLst/>
+          </a:prstGeom>
+          <a:solidFill>
+            <a:schemeClr val="bg1"/>
+          </a:solidFill>
+          <a:ln w="12700">
+            <a:solidFill>
+              <a:schemeClr val="accent1">
+                <a:lumMod val="75000"/>
+              </a:schemeClr>
+            </a:solidFill>
+          </a:ln>
+          <a:effectLst/>
+        </p:spPr>
+        <p:txBody>
+          <a:bodyPr wrap="square" lIns="137160" tIns="137137" rIns="137137" bIns="137137">
+            <a:noAutofit/>
+          </a:bodyPr>
+          <a:lstStyle>
+            <a:lvl1pPr eaLnBrk="0" hangingPunct="0">
+              <a:defRPr sz="2200">
+                <a:solidFill>
+                  <a:schemeClr val="tx1"/>
+                </a:solidFill>
+                <a:latin typeface="Arial" charset="0"/>
+              </a:defRPr>
+            </a:lvl1pPr>
+            <a:lvl2pPr marL="742950" indent="-285750" eaLnBrk="0" hangingPunct="0">
+              <a:defRPr sz="2200">
+                <a:solidFill>
+                  <a:schemeClr val="tx1"/>
+                </a:solidFill>
+                <a:latin typeface="Arial" charset="0"/>
+              </a:defRPr>
+            </a:lvl2pPr>
+            <a:lvl3pPr marL="1143000" indent="-228600" eaLnBrk="0" hangingPunct="0">
+              <a:defRPr sz="2200">
+                <a:solidFill>
+                  <a:schemeClr val="tx1"/>
+                </a:solidFill>
+                <a:latin typeface="Arial" charset="0"/>
+              </a:defRPr>
+            </a:lvl3pPr>
+            <a:lvl4pPr marL="1600200" indent="-228600" eaLnBrk="0" hangingPunct="0">
+              <a:defRPr sz="2200">
+                <a:solidFill>
+                  <a:schemeClr val="tx1"/>
+                </a:solidFill>
+                <a:latin typeface="Arial" charset="0"/>
+              </a:defRPr>
+            </a:lvl4pPr>
+            <a:lvl5pPr marL="2057400" indent="-228600" eaLnBrk="0" hangingPunct="0">
+              <a:defRPr sz="2200">
+                <a:solidFill>
+                  <a:schemeClr val="tx1"/>
+                </a:solidFill>
+                <a:latin typeface="Arial" charset="0"/>
+              </a:defRPr>
+            </a:lvl5pPr>
+            <a:lvl6pPr marL="2514600" indent="-228600" eaLnBrk="0" fontAlgn="base" hangingPunct="0">
+              <a:spcBef>
+                <a:spcPct val="0"/>
+              </a:spcBef>
+              <a:spcAft>
+                <a:spcPct val="0"/>
+              </a:spcAft>
+              <a:defRPr sz="2200">
+                <a:solidFill>
+                  <a:schemeClr val="tx1"/>
+                </a:solidFill>
+                <a:latin typeface="Arial" charset="0"/>
+              </a:defRPr>
+            </a:lvl6pPr>
+            <a:lvl7pPr marL="2971800" indent="-228600" eaLnBrk="0" fontAlgn="base" hangingPunct="0">
+              <a:spcBef>
+                <a:spcPct val="0"/>
+              </a:spcBef>
+              <a:spcAft>
+                <a:spcPct val="0"/>
+              </a:spcAft>
+              <a:defRPr sz="2200">
+                <a:solidFill>
+                  <a:schemeClr val="tx1"/>
+                </a:solidFill>
+                <a:latin typeface="Arial" charset="0"/>
+              </a:defRPr>
+            </a:lvl7pPr>
+            <a:lvl8pPr marL="3429000" indent="-228600" eaLnBrk="0" fontAlgn="base" hangingPunct="0">
+              <a:spcBef>
+                <a:spcPct val="0"/>
+              </a:spcBef>
+              <a:spcAft>
+                <a:spcPct val="0"/>
+              </a:spcAft>
+              <a:defRPr sz="2200">
+                <a:solidFill>
+                  <a:schemeClr val="tx1"/>
+                </a:solidFill>
+                <a:latin typeface="Arial" charset="0"/>
+              </a:defRPr>
+            </a:lvl8pPr>
+            <a:lvl9pPr marL="3886200" indent="-228600" eaLnBrk="0" fontAlgn="base" hangingPunct="0">
+              <a:spcBef>
+                <a:spcPct val="0"/>
+              </a:spcBef>
+              <a:spcAft>
+                <a:spcPct val="0"/>
+              </a:spcAft>
+              <a:defRPr sz="2200">
+                <a:solidFill>
+                  <a:schemeClr val="tx1"/>
+                </a:solidFill>
+                <a:latin typeface="Arial" charset="0"/>
+              </a:defRPr>
+            </a:lvl9pPr>
+          </a:lstStyle>
+          <a:p>
+            <a:pPr marL="571500" indent="-571500" defTabSz="913839" eaLnBrk="1" hangingPunct="1">
+              <a:buFont typeface="Arial" charset="0"/>
+              <a:buChar char="•"/>
+            </a:pPr>
+            <a:r>
+              <a:rPr lang="en-US" sz="3600" dirty="0" smtClean="0">
+                <a:latin typeface="Roboto" charset="0"/>
+                <a:ea typeface="Roboto" charset="0"/>
+                <a:cs typeface="Roboto" charset="0"/>
+              </a:rPr>
+              <a:t>Native </a:t>
+            </a:r>
+            <a:r>
+              <a:rPr lang="en-US" sz="3600" dirty="0">
+                <a:latin typeface="Roboto" charset="0"/>
+                <a:ea typeface="Roboto" charset="0"/>
+                <a:cs typeface="Roboto" charset="0"/>
+              </a:rPr>
+              <a:t>Android app, with backwards compatibility for Android API 17, Android 4.2 Jelly Bean. </a:t>
+            </a:r>
+            <a:endParaRPr lang="en-US" sz="3600" dirty="0" smtClean="0">
+              <a:latin typeface="Roboto" charset="0"/>
+              <a:ea typeface="Roboto" charset="0"/>
+              <a:cs typeface="Roboto" charset="0"/>
+            </a:endParaRPr>
+          </a:p>
+          <a:p>
+            <a:pPr marL="571500" indent="-571500" defTabSz="913839" eaLnBrk="1" hangingPunct="1">
+              <a:buFont typeface="Arial" charset="0"/>
+              <a:buChar char="•"/>
+            </a:pPr>
+            <a:r>
+              <a:rPr lang="en-US" sz="3600" dirty="0" smtClean="0">
+                <a:latin typeface="Roboto" charset="0"/>
+                <a:ea typeface="Roboto" charset="0"/>
+                <a:cs typeface="Roboto" charset="0"/>
+              </a:rPr>
+              <a:t>Offline </a:t>
+            </a:r>
+            <a:r>
+              <a:rPr lang="en-US" sz="3600" dirty="0">
+                <a:latin typeface="Roboto" charset="0"/>
+                <a:ea typeface="Roboto" charset="0"/>
+                <a:cs typeface="Roboto" charset="0"/>
+              </a:rPr>
+              <a:t>functionality is backed using a local Realm database to store cached </a:t>
+            </a:r>
+            <a:r>
+              <a:rPr lang="en-US" sz="3600" dirty="0" smtClean="0">
+                <a:latin typeface="Roboto" charset="0"/>
+                <a:ea typeface="Roboto" charset="0"/>
+                <a:cs typeface="Roboto" charset="0"/>
+              </a:rPr>
+              <a:t>punches</a:t>
+            </a:r>
+          </a:p>
+          <a:p>
+            <a:pPr marL="571500" indent="-571500" defTabSz="913839" eaLnBrk="1" hangingPunct="1">
+              <a:buFont typeface="Arial" charset="0"/>
+              <a:buChar char="•"/>
+            </a:pPr>
+            <a:r>
+              <a:rPr lang="en-US" sz="3600" dirty="0" smtClean="0">
+                <a:latin typeface="Roboto" charset="0"/>
+                <a:ea typeface="Roboto" charset="0"/>
+                <a:cs typeface="Roboto" charset="0"/>
+              </a:rPr>
+              <a:t>Configuration using Android </a:t>
+            </a:r>
+            <a:r>
+              <a:rPr lang="en-US" sz="3600" dirty="0">
+                <a:latin typeface="Roboto" charset="0"/>
+                <a:ea typeface="Roboto" charset="0"/>
+                <a:cs typeface="Roboto" charset="0"/>
+              </a:rPr>
+              <a:t>s</a:t>
+            </a:r>
+            <a:r>
+              <a:rPr lang="en-US" sz="3600" dirty="0" smtClean="0">
+                <a:latin typeface="Roboto" charset="0"/>
+                <a:ea typeface="Roboto" charset="0"/>
+                <a:cs typeface="Roboto" charset="0"/>
+              </a:rPr>
+              <a:t>hared preferences </a:t>
+            </a:r>
+            <a:r>
+              <a:rPr lang="en-US" sz="3600" dirty="0">
+                <a:latin typeface="Roboto" charset="0"/>
+                <a:ea typeface="Roboto" charset="0"/>
+                <a:cs typeface="Roboto" charset="0"/>
+              </a:rPr>
+              <a:t>to hold passwords and API information. </a:t>
+            </a:r>
+          </a:p>
+          <a:p>
+            <a:pPr marL="571500" indent="-571500" defTabSz="913839" eaLnBrk="1" hangingPunct="1">
+              <a:buFont typeface="Arial" charset="0"/>
+              <a:buChar char="•"/>
+            </a:pPr>
+            <a:r>
+              <a:rPr lang="en-US" sz="3600" dirty="0" smtClean="0">
+                <a:latin typeface="Roboto" charset="0"/>
+                <a:ea typeface="Roboto" charset="0"/>
+                <a:cs typeface="Roboto" charset="0"/>
+              </a:rPr>
+              <a:t>Network </a:t>
+            </a:r>
+            <a:r>
+              <a:rPr lang="en-US" sz="3600" dirty="0">
+                <a:latin typeface="Roboto" charset="0"/>
+                <a:ea typeface="Roboto" charset="0"/>
+                <a:cs typeface="Roboto" charset="0"/>
+              </a:rPr>
+              <a:t>connectivity is achieved through the Retrofit library, using the Jackson JSON Parser to translate between Java objects and JSON. </a:t>
+            </a:r>
+          </a:p>
+          <a:p>
+            <a:pPr marL="571500" indent="-571500" defTabSz="913839" eaLnBrk="1" hangingPunct="1">
+              <a:buFont typeface="Arial" charset="0"/>
+              <a:buChar char="•"/>
+            </a:pPr>
+            <a:r>
+              <a:rPr lang="en-US" sz="3600" dirty="0" smtClean="0">
+                <a:latin typeface="Roboto" charset="0"/>
+                <a:ea typeface="Roboto" charset="0"/>
+                <a:cs typeface="Roboto" charset="0"/>
+              </a:rPr>
+              <a:t>Image downloading and caching is </a:t>
+            </a:r>
+            <a:r>
+              <a:rPr lang="en-US" sz="3600" dirty="0">
+                <a:latin typeface="Roboto" charset="0"/>
+                <a:ea typeface="Roboto" charset="0"/>
+                <a:cs typeface="Roboto" charset="0"/>
+              </a:rPr>
+              <a:t>handling using the Picasso </a:t>
+            </a:r>
+            <a:r>
+              <a:rPr lang="en-US" sz="3600" dirty="0" smtClean="0">
+                <a:latin typeface="Roboto" charset="0"/>
+                <a:ea typeface="Roboto" charset="0"/>
+                <a:cs typeface="Roboto" charset="0"/>
+              </a:rPr>
+              <a:t>library</a:t>
+            </a:r>
+            <a:endParaRPr lang="en-US" sz="3200" dirty="0">
+              <a:latin typeface="Roboto" charset="0"/>
+              <a:ea typeface="Roboto" charset="0"/>
+              <a:cs typeface="Roboto" charset="0"/>
+            </a:endParaRPr>
+          </a:p>
+        </p:txBody>
+      </p:sp>
+      <p:sp>
+        <p:nvSpPr>
+          <p:cNvPr id="43" name="Rectangle 42"/>
+          <p:cNvSpPr/>
+          <p:nvPr/>
+        </p:nvSpPr>
+        <p:spPr>
+          <a:xfrm>
+            <a:off x="29870400" y="11039639"/>
+            <a:ext cx="12616002" cy="963857"/>
+          </a:xfrm>
+          <a:prstGeom prst="rect">
+            <a:avLst/>
+          </a:prstGeom>
+          <a:solidFill>
+            <a:schemeClr val="tx1"/>
+          </a:solidFill>
+          <a:ln w="12700"/>
+        </p:spPr>
+        <p:style>
+          <a:lnRef idx="2">
+            <a:schemeClr val="accent1">
+              <a:shade val="50000"/>
+            </a:schemeClr>
+          </a:lnRef>
+          <a:fillRef idx="1">
+            <a:schemeClr val="accent1"/>
+          </a:fillRef>
+          <a:effectRef idx="0">
+            <a:schemeClr val="accent1"/>
+          </a:effectRef>
+          <a:fontRef idx="minor">
+            <a:schemeClr val="lt1"/>
+          </a:fontRef>
+        </p:style>
+        <p:txBody>
+          <a:bodyPr lIns="68568" tIns="34284" rIns="68568" bIns="34284" rtlCol="0" anchor="ctr"/>
+          <a:lstStyle/>
+          <a:p>
+            <a:pPr algn="ctr"/>
+            <a:r>
+              <a:rPr lang="en-US" sz="4400" dirty="0">
+                <a:solidFill>
+                  <a:schemeClr val="accent3">
+                    <a:lumMod val="20000"/>
+                    <a:lumOff val="80000"/>
+                  </a:schemeClr>
+                </a:solidFill>
+                <a:latin typeface="Roboto Medium" charset="0"/>
+                <a:ea typeface="Roboto Medium" charset="0"/>
+                <a:cs typeface="Roboto Medium" charset="0"/>
+              </a:rPr>
+              <a:t>Implementation</a:t>
+            </a:r>
+          </a:p>
+        </p:txBody>
+      </p:sp>
+      <p:sp>
+        <p:nvSpPr>
+          <p:cNvPr id="44" name="Text Box 192"/>
+          <p:cNvSpPr txBox="1">
+            <a:spLocks noChangeArrowheads="1"/>
+          </p:cNvSpPr>
+          <p:nvPr/>
+        </p:nvSpPr>
+        <p:spPr bwMode="auto">
+          <a:xfrm>
+            <a:off x="20447742" y="17243527"/>
+            <a:ext cx="3719237" cy="1014823"/>
+          </a:xfrm>
+          <a:prstGeom prst="rect">
+            <a:avLst/>
+          </a:prstGeom>
+          <a:ln>
+            <a:noFill/>
+          </a:ln>
+        </p:spPr>
+        <p:style>
+          <a:lnRef idx="2">
+            <a:schemeClr val="accent1"/>
+          </a:lnRef>
+          <a:fillRef idx="1">
+            <a:schemeClr val="lt1"/>
+          </a:fillRef>
+          <a:effectRef idx="0">
+            <a:schemeClr val="accent1"/>
+          </a:effectRef>
+          <a:fontRef idx="minor">
+            <a:schemeClr val="dk1"/>
+          </a:fontRef>
+        </p:style>
+        <p:txBody>
+          <a:bodyPr wrap="square" lIns="137160" tIns="137137" rIns="137137" bIns="137137">
+            <a:noAutofit/>
+          </a:bodyPr>
+          <a:lstStyle>
+            <a:lvl1pPr eaLnBrk="0" hangingPunct="0">
+              <a:defRPr sz="2200">
+                <a:solidFill>
+                  <a:schemeClr val="tx1"/>
+                </a:solidFill>
+                <a:latin typeface="Arial" charset="0"/>
+              </a:defRPr>
+            </a:lvl1pPr>
+            <a:lvl2pPr marL="742950" indent="-285750" eaLnBrk="0" hangingPunct="0">
+              <a:defRPr sz="2200">
+                <a:solidFill>
+                  <a:schemeClr val="tx1"/>
+                </a:solidFill>
+                <a:latin typeface="Arial" charset="0"/>
+              </a:defRPr>
+            </a:lvl2pPr>
+            <a:lvl3pPr marL="1143000" indent="-228600" eaLnBrk="0" hangingPunct="0">
+              <a:defRPr sz="2200">
+                <a:solidFill>
+                  <a:schemeClr val="tx1"/>
+                </a:solidFill>
+                <a:latin typeface="Arial" charset="0"/>
+              </a:defRPr>
+            </a:lvl3pPr>
+            <a:lvl4pPr marL="1600200" indent="-228600" eaLnBrk="0" hangingPunct="0">
+              <a:defRPr sz="2200">
+                <a:solidFill>
+                  <a:schemeClr val="tx1"/>
+                </a:solidFill>
+                <a:latin typeface="Arial" charset="0"/>
+              </a:defRPr>
+            </a:lvl4pPr>
+            <a:lvl5pPr marL="2057400" indent="-228600" eaLnBrk="0" hangingPunct="0">
+              <a:defRPr sz="2200">
+                <a:solidFill>
+                  <a:schemeClr val="tx1"/>
+                </a:solidFill>
+                <a:latin typeface="Arial" charset="0"/>
+              </a:defRPr>
+            </a:lvl5pPr>
+            <a:lvl6pPr marL="2514600" indent="-228600" eaLnBrk="0" fontAlgn="base" hangingPunct="0">
+              <a:spcBef>
+                <a:spcPct val="0"/>
+              </a:spcBef>
+              <a:spcAft>
+                <a:spcPct val="0"/>
+              </a:spcAft>
+              <a:defRPr sz="2200">
+                <a:solidFill>
+                  <a:schemeClr val="tx1"/>
+                </a:solidFill>
+                <a:latin typeface="Arial" charset="0"/>
+              </a:defRPr>
+            </a:lvl6pPr>
+            <a:lvl7pPr marL="2971800" indent="-228600" eaLnBrk="0" fontAlgn="base" hangingPunct="0">
+              <a:spcBef>
+                <a:spcPct val="0"/>
+              </a:spcBef>
+              <a:spcAft>
+                <a:spcPct val="0"/>
+              </a:spcAft>
+              <a:defRPr sz="2200">
+                <a:solidFill>
+                  <a:schemeClr val="tx1"/>
+                </a:solidFill>
+                <a:latin typeface="Arial" charset="0"/>
+              </a:defRPr>
+            </a:lvl7pPr>
+            <a:lvl8pPr marL="3429000" indent="-228600" eaLnBrk="0" fontAlgn="base" hangingPunct="0">
+              <a:spcBef>
+                <a:spcPct val="0"/>
+              </a:spcBef>
+              <a:spcAft>
+                <a:spcPct val="0"/>
+              </a:spcAft>
+              <a:defRPr sz="2200">
+                <a:solidFill>
+                  <a:schemeClr val="tx1"/>
+                </a:solidFill>
+                <a:latin typeface="Arial" charset="0"/>
+              </a:defRPr>
+            </a:lvl8pPr>
+            <a:lvl9pPr marL="3886200" indent="-228600" eaLnBrk="0" fontAlgn="base" hangingPunct="0">
+              <a:spcBef>
+                <a:spcPct val="0"/>
+              </a:spcBef>
+              <a:spcAft>
+                <a:spcPct val="0"/>
+              </a:spcAft>
+              <a:defRPr sz="2200">
+                <a:solidFill>
+                  <a:schemeClr val="tx1"/>
+                </a:solidFill>
+                <a:latin typeface="Arial" charset="0"/>
+              </a:defRPr>
+            </a:lvl9pPr>
+          </a:lstStyle>
+          <a:p>
+            <a:pPr marL="571500" marR="0" lvl="0" indent="-571500" algn="ctr" defTabSz="913839" eaLnBrk="1" fontAlgn="auto" latinLnBrk="0" hangingPunct="1">
+              <a:lnSpc>
+                <a:spcPct val="100000"/>
+              </a:lnSpc>
+              <a:spcBef>
+                <a:spcPts val="0"/>
+              </a:spcBef>
+              <a:spcAft>
+                <a:spcPts val="0"/>
+              </a:spcAft>
+              <a:buClrTx/>
+              <a:buSzTx/>
+              <a:buFont typeface="Arial" charset="0"/>
+              <a:buNone/>
+              <a:tabLst/>
+              <a:defRPr/>
+            </a:pPr>
+            <a:r>
+              <a:rPr lang="en-US" sz="2800" smtClean="0">
+                <a:latin typeface="Roboto" charset="0"/>
+                <a:ea typeface="Roboto" charset="0"/>
+                <a:cs typeface="Roboto" charset="0"/>
+              </a:rPr>
+              <a:t>Figure 1(phone)</a:t>
+            </a:r>
+            <a:endParaRPr lang="en-US" sz="2800" dirty="0" smtClean="0">
+              <a:latin typeface="Roboto" charset="0"/>
+              <a:ea typeface="Roboto" charset="0"/>
+              <a:cs typeface="Roboto" charset="0"/>
+            </a:endParaRPr>
+          </a:p>
+        </p:txBody>
+      </p:sp>
+      <p:pic>
+        <p:nvPicPr>
+          <p:cNvPr id="47" name="Picture 46"/>
+          <p:cNvPicPr>
+            <a:picLocks noChangeAspect="1"/>
+          </p:cNvPicPr>
+          <p:nvPr/>
+        </p:nvPicPr>
+        <p:blipFill rotWithShape="1">
+          <a:blip r:embed="rId5">
+            <a:extLst>
+              <a:ext uri="{28A0092B-C50C-407E-A947-70E740481C1C}">
+                <a14:useLocalDpi xmlns:a14="http://schemas.microsoft.com/office/drawing/2010/main" val="0"/>
+              </a:ext>
+            </a:extLst>
+          </a:blip>
+          <a:srcRect t="3168" b="6548"/>
+          <a:stretch/>
+        </p:blipFill>
+        <p:spPr>
+          <a:xfrm>
+            <a:off x="15701232" y="19475776"/>
+            <a:ext cx="13258800" cy="7197594"/>
+          </a:xfrm>
+          <a:prstGeom prst="rect">
+            <a:avLst/>
+          </a:prstGeom>
+          <a:ln>
+            <a:solidFill>
+              <a:schemeClr val="accent2"/>
+            </a:solidFill>
+          </a:ln>
         </p:spPr>
       </p:pic>
     </p:spTree>
@@ -8262,186 +7215,7 @@
   <p:timing>
     <p:tnLst>
       <p:par>
-        <p:cTn id="1" dur="indefinite" restart="never" nodeType="tmRoot">
-          <p:childTnLst>
-            <p:seq concurrent="1" nextAc="seek">
-              <p:cTn id="2" dur="indefinite" nodeType="mainSeq">
-                <p:childTnLst>
-                  <p:par>
-                    <p:cTn id="3" fill="hold">
-                      <p:stCondLst>
-                        <p:cond delay="indefinite"/>
-                        <p:cond evt="onBegin" delay="0">
-                          <p:tn val="2"/>
-                        </p:cond>
-                      </p:stCondLst>
-                      <p:childTnLst>
-                        <p:par>
-                          <p:cTn id="4" fill="hold">
-                            <p:stCondLst>
-                              <p:cond delay="0"/>
-                            </p:stCondLst>
-                            <p:childTnLst>
-                              <p:par>
-                                <p:cTn id="5" presetID="6" presetClass="emph" presetSubtype="0" fill="hold" nodeType="withEffect">
-                                  <p:stCondLst>
-                                    <p:cond delay="0"/>
-                                  </p:stCondLst>
-                                  <p:childTnLst>
-                                    <p:animScale>
-                                      <p:cBhvr>
-                                        <p:cTn id="6" dur="2000" fill="hold"/>
-                                        <p:tgtEl>
-                                          <p:spTgt spid="87"/>
-                                        </p:tgtEl>
-                                      </p:cBhvr>
-                                      <p:by x="125000" y="125000"/>
-                                    </p:animScale>
-                                  </p:childTnLst>
-                                </p:cTn>
-                              </p:par>
-                            </p:childTnLst>
-                          </p:cTn>
-                        </p:par>
-                      </p:childTnLst>
-                    </p:cTn>
-                  </p:par>
-                  <p:par>
-                    <p:cTn id="7" fill="hold">
-                      <p:stCondLst>
-                        <p:cond delay="indefinite"/>
-                      </p:stCondLst>
-                      <p:childTnLst>
-                        <p:par>
-                          <p:cTn id="8" fill="hold">
-                            <p:stCondLst>
-                              <p:cond delay="0"/>
-                            </p:stCondLst>
-                            <p:childTnLst>
-                              <p:par>
-                                <p:cTn id="9" presetID="6" presetClass="emph" presetSubtype="0" fill="hold" nodeType="clickEffect">
-                                  <p:stCondLst>
-                                    <p:cond delay="0"/>
-                                  </p:stCondLst>
-                                  <p:childTnLst>
-                                    <p:animScale>
-                                      <p:cBhvr>
-                                        <p:cTn id="10" dur="2000" fill="hold"/>
-                                        <p:tgtEl>
-                                          <p:spTgt spid="87"/>
-                                        </p:tgtEl>
-                                      </p:cBhvr>
-                                      <p:by x="80000" y="80000"/>
-                                    </p:animScale>
-                                  </p:childTnLst>
-                                </p:cTn>
-                              </p:par>
-                              <p:par>
-                                <p:cTn id="11" presetID="1" presetClass="entr" presetSubtype="0" fill="hold" nodeType="withEffect">
-                                  <p:stCondLst>
-                                    <p:cond delay="0"/>
-                                  </p:stCondLst>
-                                  <p:childTnLst>
-                                    <p:set>
-                                      <p:cBhvr>
-                                        <p:cTn id="12" dur="1" fill="hold">
-                                          <p:stCondLst>
-                                            <p:cond delay="0"/>
-                                          </p:stCondLst>
-                                        </p:cTn>
-                                        <p:tgtEl>
-                                          <p:spTgt spid="92"/>
-                                        </p:tgtEl>
-                                        <p:attrNameLst>
-                                          <p:attrName>style.visibility</p:attrName>
-                                        </p:attrNameLst>
-                                      </p:cBhvr>
-                                      <p:to>
-                                        <p:strVal val="visible"/>
-                                      </p:to>
-                                    </p:set>
-                                  </p:childTnLst>
-                                </p:cTn>
-                              </p:par>
-                              <p:par>
-                                <p:cTn id="13" presetID="6" presetClass="emph" presetSubtype="0" fill="hold" nodeType="withEffect">
-                                  <p:stCondLst>
-                                    <p:cond delay="0"/>
-                                  </p:stCondLst>
-                                  <p:childTnLst>
-                                    <p:animScale>
-                                      <p:cBhvr>
-                                        <p:cTn id="14" dur="2000" fill="hold"/>
-                                        <p:tgtEl>
-                                          <p:spTgt spid="92"/>
-                                        </p:tgtEl>
-                                      </p:cBhvr>
-                                      <p:by x="125000" y="125000"/>
-                                    </p:animScale>
-                                  </p:childTnLst>
-                                </p:cTn>
-                              </p:par>
-                            </p:childTnLst>
-                          </p:cTn>
-                        </p:par>
-                      </p:childTnLst>
-                    </p:cTn>
-                  </p:par>
-                  <p:par>
-                    <p:cTn id="15" fill="hold">
-                      <p:stCondLst>
-                        <p:cond delay="indefinite"/>
-                      </p:stCondLst>
-                      <p:childTnLst>
-                        <p:par>
-                          <p:cTn id="16" fill="hold">
-                            <p:stCondLst>
-                              <p:cond delay="0"/>
-                            </p:stCondLst>
-                            <p:childTnLst>
-                              <p:par>
-                                <p:cTn id="17" presetID="6" presetClass="emph" presetSubtype="0" fill="hold" nodeType="clickEffect">
-                                  <p:stCondLst>
-                                    <p:cond delay="0"/>
-                                  </p:stCondLst>
-                                  <p:childTnLst>
-                                    <p:animScale>
-                                      <p:cBhvr>
-                                        <p:cTn id="18" dur="2000" fill="hold"/>
-                                        <p:tgtEl>
-                                          <p:spTgt spid="92"/>
-                                        </p:tgtEl>
-                                      </p:cBhvr>
-                                      <p:by x="80000" y="80000"/>
-                                    </p:animScale>
-                                  </p:childTnLst>
-                                </p:cTn>
-                              </p:par>
-                            </p:childTnLst>
-                          </p:cTn>
-                        </p:par>
-                      </p:childTnLst>
-                    </p:cTn>
-                  </p:par>
-                </p:childTnLst>
-              </p:cTn>
-              <p:prevCondLst>
-                <p:cond evt="onPrev" delay="0">
-                  <p:tgtEl>
-                    <p:sldTgt/>
-                  </p:tgtEl>
-                </p:cond>
-              </p:prevCondLst>
-              <p:nextCondLst>
-                <p:cond evt="onNext" delay="0">
-                  <p:tgtEl>
-                    <p:sldTgt/>
-                  </p:tgtEl>
-                </p:cond>
-              </p:nextCondLst>
-            </p:seq>
-          </p:childTnLst>
-        </p:cTn>
+        <p:cTn id="1" dur="indefinite" restart="never" nodeType="tmRoot"/>
       </p:par>
     </p:tnLst>
   </p:timing>

</xml_diff>

<commit_message>
not sure what to include for deployment details - otherwise done
</commit_message>
<xml_diff>
--- a/GFSTimeClock/WIPposter.pptx
+++ b/GFSTimeClock/WIPposter.pptx
@@ -4816,8 +4816,8 @@
         </p:nvSpPr>
         <p:spPr bwMode="auto">
           <a:xfrm>
-            <a:off x="15654689" y="4610663"/>
-            <a:ext cx="13258801" cy="3046942"/>
+            <a:off x="15544800" y="4610663"/>
+            <a:ext cx="13258800" cy="3046942"/>
           </a:xfrm>
           <a:prstGeom prst="rect">
             <a:avLst/>
@@ -4986,7 +4986,7 @@
         </p:nvSpPr>
         <p:spPr>
           <a:xfrm>
-            <a:off x="15648070" y="3731431"/>
+            <a:off x="15544800" y="3731431"/>
             <a:ext cx="13258800" cy="914401"/>
           </a:xfrm>
           <a:prstGeom prst="rect">
@@ -5056,8 +5056,8 @@
         </p:nvSpPr>
         <p:spPr bwMode="auto">
           <a:xfrm>
-            <a:off x="29870400" y="4389597"/>
-            <a:ext cx="12649200" cy="3268007"/>
+            <a:off x="29626560" y="4389597"/>
+            <a:ext cx="13258800" cy="3268007"/>
           </a:xfrm>
           <a:prstGeom prst="rect">
             <a:avLst/>
@@ -5275,8 +5275,8 @@
         </p:nvSpPr>
         <p:spPr>
           <a:xfrm>
-            <a:off x="29870400" y="3630145"/>
-            <a:ext cx="12649200" cy="880659"/>
+            <a:off x="29626560" y="3630145"/>
+            <a:ext cx="13258800" cy="914400"/>
           </a:xfrm>
           <a:prstGeom prst="rect">
             <a:avLst/>
@@ -5343,8 +5343,8 @@
         </p:nvSpPr>
         <p:spPr>
           <a:xfrm>
-            <a:off x="1470707" y="13338466"/>
-            <a:ext cx="13204659" cy="914400"/>
+            <a:off x="1371600" y="13338466"/>
+            <a:ext cx="13258800" cy="914400"/>
           </a:xfrm>
           <a:prstGeom prst="rect">
             <a:avLst/>
@@ -5411,10 +5411,10 @@
         </p:nvGrpSpPr>
         <p:grpSpPr>
           <a:xfrm>
-            <a:off x="1389529" y="3630144"/>
-            <a:ext cx="13295011" cy="3939729"/>
-            <a:chOff x="29008915" y="5216291"/>
-            <a:chExt cx="13251759" cy="2058363"/>
+            <a:off x="1463040" y="3630140"/>
+            <a:ext cx="13258800" cy="3939733"/>
+            <a:chOff x="29008915" y="5216289"/>
+            <a:chExt cx="13251759" cy="2058365"/>
           </a:xfrm>
         </p:grpSpPr>
         <p:sp>
@@ -5425,8 +5425,8 @@
           </p:nvSpPr>
           <p:spPr>
             <a:xfrm>
-              <a:off x="29008915" y="5216291"/>
-              <a:ext cx="13251759" cy="467817"/>
+              <a:off x="29008915" y="5216289"/>
+              <a:ext cx="13251759" cy="477740"/>
             </a:xfrm>
             <a:prstGeom prst="rect">
               <a:avLst/>
@@ -5690,7 +5690,7 @@
         </p:nvSpPr>
         <p:spPr>
           <a:xfrm>
-            <a:off x="15648070" y="9458931"/>
+            <a:off x="15544800" y="9458931"/>
             <a:ext cx="13258800" cy="914400"/>
           </a:xfrm>
           <a:prstGeom prst="rect">
@@ -5800,8 +5800,8 @@
         </p:nvSpPr>
         <p:spPr bwMode="auto">
           <a:xfrm>
-            <a:off x="1471806" y="14252866"/>
-            <a:ext cx="13177244" cy="6838283"/>
+            <a:off x="1371600" y="14252866"/>
+            <a:ext cx="13258800" cy="6838283"/>
           </a:xfrm>
           <a:prstGeom prst="rect">
             <a:avLst/>
@@ -6264,8 +6264,8 @@
         </p:nvSpPr>
         <p:spPr>
           <a:xfrm>
-            <a:off x="15681021" y="18962193"/>
-            <a:ext cx="13232469" cy="914400"/>
+            <a:off x="15544800" y="18962193"/>
+            <a:ext cx="13258800" cy="914400"/>
           </a:xfrm>
           <a:prstGeom prst="rect">
             <a:avLst/>
@@ -6395,8 +6395,8 @@
         </p:blipFill>
         <p:spPr>
           <a:xfrm>
-            <a:off x="15654688" y="10406044"/>
-            <a:ext cx="13258802" cy="7320671"/>
+            <a:off x="15544800" y="10406044"/>
+            <a:ext cx="13258800" cy="7320670"/>
           </a:xfrm>
           <a:prstGeom prst="rect">
             <a:avLst/>
@@ -6448,8 +6448,8 @@
         </p:nvSpPr>
         <p:spPr bwMode="auto">
           <a:xfrm>
-            <a:off x="1385223" y="10373331"/>
-            <a:ext cx="13213801" cy="1774206"/>
+            <a:off x="1371600" y="10366809"/>
+            <a:ext cx="13258800" cy="1774206"/>
           </a:xfrm>
           <a:prstGeom prst="rect">
             <a:avLst/>
@@ -6611,7 +6611,7 @@
         </p:nvSpPr>
         <p:spPr>
           <a:xfrm>
-            <a:off x="1340224" y="9458931"/>
+            <a:off x="1371600" y="9458931"/>
             <a:ext cx="13258800" cy="914400"/>
           </a:xfrm>
           <a:prstGeom prst="rect">
@@ -6675,8 +6675,8 @@
         </p:nvSpPr>
         <p:spPr bwMode="auto">
           <a:xfrm>
-            <a:off x="29888329" y="10373330"/>
-            <a:ext cx="12631271" cy="10156413"/>
+            <a:off x="29626560" y="10373330"/>
+            <a:ext cx="13258800" cy="10156413"/>
           </a:xfrm>
           <a:prstGeom prst="rect">
             <a:avLst/>
@@ -6836,12 +6836,20 @@
               <a:t>Offline </a:t>
             </a:r>
             <a:r>
+              <a:rPr lang="en-US" sz="3600" dirty="0" smtClean="0">
+                <a:latin typeface="Roboto" charset="0"/>
+                <a:ea typeface="Roboto" charset="0"/>
+                <a:cs typeface="Roboto" charset="0"/>
+              </a:rPr>
+              <a:t>functionality </a:t>
+            </a:r>
+            <a:r>
               <a:rPr lang="en-US" sz="3600" dirty="0">
                 <a:latin typeface="Roboto" charset="0"/>
                 <a:ea typeface="Roboto" charset="0"/>
                 <a:cs typeface="Roboto" charset="0"/>
               </a:rPr>
-              <a:t>functionality is backed using a local Realm database to store cached </a:t>
+              <a:t>using a local Realm database to store cached </a:t>
             </a:r>
             <a:r>
               <a:rPr lang="en-US" sz="3600" dirty="0" smtClean="0">
@@ -6909,8 +6917,59 @@
                 <a:ea typeface="Roboto" charset="0"/>
                 <a:cs typeface="Roboto" charset="0"/>
               </a:rPr>
-              <a:t>connectivity is achieved through the Retrofit library, using the Jackson JSON Parser to translate between Java objects and JSON. </a:t>
-            </a:r>
+              <a:t>connectivity is achieved through the Retrofit </a:t>
+            </a:r>
+            <a:r>
+              <a:rPr lang="en-US" sz="3600" dirty="0" smtClean="0">
+                <a:latin typeface="Roboto" charset="0"/>
+                <a:ea typeface="Roboto" charset="0"/>
+                <a:cs typeface="Roboto" charset="0"/>
+              </a:rPr>
+              <a:t>library to build API calls.</a:t>
+            </a:r>
+          </a:p>
+          <a:p>
+            <a:pPr marL="571500" indent="-571500" defTabSz="913839" eaLnBrk="1" hangingPunct="1">
+              <a:buFont typeface="Arial" charset="0"/>
+              <a:buChar char="•"/>
+            </a:pPr>
+            <a:r>
+              <a:rPr lang="en-US" sz="3600" dirty="0" err="1" smtClean="0">
+                <a:latin typeface="Roboto" charset="0"/>
+                <a:ea typeface="Roboto" charset="0"/>
+                <a:cs typeface="Roboto" charset="0"/>
+              </a:rPr>
+              <a:t>FasterXML</a:t>
+            </a:r>
+            <a:r>
+              <a:rPr lang="en-US" sz="3600" dirty="0" smtClean="0">
+                <a:latin typeface="Roboto" charset="0"/>
+                <a:ea typeface="Roboto" charset="0"/>
+                <a:cs typeface="Roboto" charset="0"/>
+              </a:rPr>
+              <a:t>/Jackson is used to </a:t>
+            </a:r>
+            <a:r>
+              <a:rPr lang="en-US" sz="3600" dirty="0">
+                <a:latin typeface="Roboto" charset="0"/>
+                <a:ea typeface="Roboto" charset="0"/>
+                <a:cs typeface="Roboto" charset="0"/>
+              </a:rPr>
+              <a:t>translate between Java objects and JSON</a:t>
+            </a:r>
+            <a:r>
+              <a:rPr lang="en-US" sz="3600" dirty="0" smtClean="0">
+                <a:latin typeface="Roboto" charset="0"/>
+                <a:ea typeface="Roboto" charset="0"/>
+                <a:cs typeface="Roboto" charset="0"/>
+              </a:rPr>
+              <a:t>.</a:t>
+            </a:r>
+            <a:endParaRPr lang="en-US" sz="3600" dirty="0">
+              <a:latin typeface="Roboto" charset="0"/>
+              <a:ea typeface="Roboto" charset="0"/>
+              <a:cs typeface="Roboto" charset="0"/>
+            </a:endParaRPr>
           </a:p>
           <a:p>
             <a:pPr marL="571500" indent="-571500" defTabSz="913839" eaLnBrk="1" hangingPunct="1">
@@ -6957,8 +7016,8 @@
         </p:nvSpPr>
         <p:spPr>
           <a:xfrm>
-            <a:off x="29870400" y="9458931"/>
-            <a:ext cx="12616002" cy="963857"/>
+            <a:off x="29626560" y="9458931"/>
+            <a:ext cx="13258800" cy="914400"/>
           </a:xfrm>
           <a:prstGeom prst="rect">
             <a:avLst/>
@@ -7192,7 +7251,7 @@
         </p:blipFill>
         <p:spPr>
           <a:xfrm>
-            <a:off x="15681022" y="19876593"/>
+            <a:off x="15544800" y="19876593"/>
             <a:ext cx="13258800" cy="7353384"/>
           </a:xfrm>
           <a:prstGeom prst="rect">
@@ -7410,8 +7469,8 @@
         </p:nvSpPr>
         <p:spPr bwMode="auto">
           <a:xfrm>
-            <a:off x="29855131" y="22178999"/>
-            <a:ext cx="12631271" cy="6509175"/>
+            <a:off x="29626560" y="22178999"/>
+            <a:ext cx="13258800" cy="6509175"/>
           </a:xfrm>
           <a:prstGeom prst="rect">
             <a:avLst/>
@@ -7535,28 +7594,6 @@
               <a:buFont typeface="Arial" charset="0"/>
               <a:buChar char="•"/>
             </a:pPr>
-            <a:r>
-              <a:rPr lang="en-US" sz="3600" dirty="0" smtClean="0">
-                <a:latin typeface="Roboto" charset="0"/>
-                <a:ea typeface="Roboto" charset="0"/>
-                <a:cs typeface="Roboto" charset="0"/>
-              </a:rPr>
-              <a:t>Handoff code to GFS</a:t>
-            </a:r>
-          </a:p>
-          <a:p>
-            <a:pPr marL="571500" indent="-571500" defTabSz="913839" eaLnBrk="1" hangingPunct="1">
-              <a:buFont typeface="Arial" charset="0"/>
-              <a:buChar char="•"/>
-            </a:pPr>
-            <a:r>
-              <a:rPr lang="en-US" sz="3600" dirty="0" smtClean="0">
-                <a:latin typeface="Roboto" charset="0"/>
-                <a:ea typeface="Roboto" charset="0"/>
-                <a:cs typeface="Roboto" charset="0"/>
-              </a:rPr>
-              <a:t>Possible areas to explore prior to launch:</a:t>
-            </a:r>
             <a:endParaRPr lang="en-US" sz="3600" dirty="0" smtClean="0">
               <a:latin typeface="Roboto" charset="0"/>
               <a:ea typeface="Roboto" charset="0"/>
@@ -7564,6 +7601,25 @@
             </a:endParaRPr>
           </a:p>
           <a:p>
+            <a:pPr marL="571500" indent="-571500" defTabSz="913839" eaLnBrk="1" hangingPunct="1">
+              <a:buFont typeface="Arial" charset="0"/>
+              <a:buChar char="•"/>
+            </a:pPr>
+            <a:r>
+              <a:rPr lang="en-US" sz="3600" dirty="0" smtClean="0">
+                <a:latin typeface="Roboto" charset="0"/>
+                <a:ea typeface="Roboto" charset="0"/>
+                <a:cs typeface="Roboto" charset="0"/>
+              </a:rPr>
+              <a:t>Possible future areas to explore:</a:t>
+            </a:r>
+            <a:endParaRPr lang="en-US" sz="3600" dirty="0" smtClean="0">
+              <a:latin typeface="Roboto" charset="0"/>
+              <a:ea typeface="Roboto" charset="0"/>
+              <a:cs typeface="Roboto" charset="0"/>
+            </a:endParaRPr>
+          </a:p>
+          <a:p>
             <a:pPr marL="1314450" lvl="1" indent="-571500" defTabSz="913839" eaLnBrk="1" hangingPunct="1">
               <a:buFont typeface="Arial" charset="0"/>
               <a:buChar char="•"/>
@@ -7608,6 +7664,11 @@
               </a:rPr>
               <a:t> and sync frequency).</a:t>
             </a:r>
+            <a:endParaRPr lang="en-US" sz="3600" dirty="0" smtClean="0">
+              <a:latin typeface="Roboto" charset="0"/>
+              <a:ea typeface="Roboto" charset="0"/>
+              <a:cs typeface="Roboto" charset="0"/>
+            </a:endParaRPr>
           </a:p>
           <a:p>
             <a:pPr marL="1314450" lvl="1" indent="-571500" defTabSz="913839" eaLnBrk="1" hangingPunct="1">
@@ -7620,21 +7681,7 @@
                 <a:ea typeface="Roboto" charset="0"/>
                 <a:cs typeface="Roboto" charset="0"/>
               </a:rPr>
-              <a:t>Introduce test coverage</a:t>
-            </a:r>
-          </a:p>
-          <a:p>
-            <a:pPr marL="1314450" lvl="1" indent="-571500" defTabSz="913839" eaLnBrk="1" hangingPunct="1">
-              <a:buFont typeface="Arial" charset="0"/>
-              <a:buChar char="•"/>
-            </a:pPr>
-            <a:r>
-              <a:rPr lang="en-US" sz="3600" dirty="0" smtClean="0">
-                <a:latin typeface="Roboto" charset="0"/>
-                <a:ea typeface="Roboto" charset="0"/>
-                <a:cs typeface="Roboto" charset="0"/>
-              </a:rPr>
-              <a:t>3D print parametric mounting solution</a:t>
+              <a:t>3D printed mounting solution</a:t>
             </a:r>
             <a:endParaRPr lang="en-US" sz="3600" dirty="0" smtClean="0">
               <a:latin typeface="Roboto" charset="0"/>
@@ -7696,8 +7743,8 @@
         </p:nvSpPr>
         <p:spPr>
           <a:xfrm>
-            <a:off x="29837202" y="21264599"/>
-            <a:ext cx="12616002" cy="963857"/>
+            <a:off x="29626560" y="21264599"/>
+            <a:ext cx="13258800" cy="914400"/>
           </a:xfrm>
           <a:prstGeom prst="rect">
             <a:avLst/>
@@ -7766,8 +7813,8 @@
         </p:nvSpPr>
         <p:spPr bwMode="auto">
           <a:xfrm>
-            <a:off x="1503876" y="22919948"/>
-            <a:ext cx="12980474" cy="5768226"/>
+            <a:off x="1371600" y="22919948"/>
+            <a:ext cx="13258800" cy="5768226"/>
           </a:xfrm>
           <a:prstGeom prst="rect">
             <a:avLst/>
@@ -8287,8 +8334,8 @@
         </p:nvSpPr>
         <p:spPr>
           <a:xfrm>
-            <a:off x="1485946" y="22005549"/>
-            <a:ext cx="12964783" cy="963857"/>
+            <a:off x="1371600" y="22005549"/>
+            <a:ext cx="13258800" cy="914400"/>
           </a:xfrm>
           <a:prstGeom prst="rect">
             <a:avLst/>

</xml_diff>

<commit_message>
please review, ready for print otherwise
</commit_message>
<xml_diff>
--- a/GFSTimeClock/WIPposter.pptx
+++ b/GFSTimeClock/WIPposter.pptx
@@ -212,7 +212,7 @@
             <a:fld id="{0774E6B3-4EE3-434C-B9AF-BFD4E40BBE89}" type="datetimeFigureOut">
               <a:rPr lang="en-US" smtClean="0"/>
               <a:pPr/>
-              <a:t>4/11/17</a:t>
+              <a:t>4/12/17</a:t>
             </a:fld>
             <a:endParaRPr lang="en-US" dirty="0"/>
           </a:p>
@@ -789,7 +789,7 @@
             <a:fld id="{985D6BDF-9D0E-4E2B-85B8-D8F4790360C9}" type="datetimeFigureOut">
               <a:rPr lang="en-US" smtClean="0"/>
               <a:pPr/>
-              <a:t>4/11/17</a:t>
+              <a:t>4/12/17</a:t>
             </a:fld>
             <a:endParaRPr lang="en-US" dirty="0"/>
           </a:p>
@@ -994,7 +994,7 @@
             <a:fld id="{985D6BDF-9D0E-4E2B-85B8-D8F4790360C9}" type="datetimeFigureOut">
               <a:rPr lang="en-US" smtClean="0"/>
               <a:pPr/>
-              <a:t>4/11/17</a:t>
+              <a:t>4/12/17</a:t>
             </a:fld>
             <a:endParaRPr lang="en-US" dirty="0"/>
           </a:p>
@@ -1247,7 +1247,7 @@
             <a:fld id="{985D6BDF-9D0E-4E2B-85B8-D8F4790360C9}" type="datetimeFigureOut">
               <a:rPr lang="en-US" smtClean="0"/>
               <a:pPr/>
-              <a:t>4/11/17</a:t>
+              <a:t>4/12/17</a:t>
             </a:fld>
             <a:endParaRPr lang="en-US" dirty="0"/>
           </a:p>
@@ -1628,7 +1628,7 @@
             <a:fld id="{985D6BDF-9D0E-4E2B-85B8-D8F4790360C9}" type="datetimeFigureOut">
               <a:rPr lang="en-US" smtClean="0"/>
               <a:pPr/>
-              <a:t>4/11/17</a:t>
+              <a:t>4/12/17</a:t>
             </a:fld>
             <a:endParaRPr lang="en-US" dirty="0"/>
           </a:p>
@@ -1968,7 +1968,7 @@
             <a:fld id="{985D6BDF-9D0E-4E2B-85B8-D8F4790360C9}" type="datetimeFigureOut">
               <a:rPr lang="en-US" smtClean="0"/>
               <a:pPr/>
-              <a:t>4/11/17</a:t>
+              <a:t>4/12/17</a:t>
             </a:fld>
             <a:endParaRPr lang="en-US" dirty="0"/>
           </a:p>
@@ -2240,7 +2240,7 @@
             <a:fld id="{985D6BDF-9D0E-4E2B-85B8-D8F4790360C9}" type="datetimeFigureOut">
               <a:rPr lang="en-US" smtClean="0"/>
               <a:pPr/>
-              <a:t>4/11/17</a:t>
+              <a:t>4/12/17</a:t>
             </a:fld>
             <a:endParaRPr lang="en-US" dirty="0"/>
           </a:p>
@@ -2616,7 +2616,7 @@
             <a:fld id="{985D6BDF-9D0E-4E2B-85B8-D8F4790360C9}" type="datetimeFigureOut">
               <a:rPr lang="en-US" smtClean="0"/>
               <a:pPr/>
-              <a:t>4/11/17</a:t>
+              <a:t>4/12/17</a:t>
             </a:fld>
             <a:endParaRPr lang="en-US" dirty="0"/>
           </a:p>
@@ -2731,7 +2731,7 @@
             <a:fld id="{985D6BDF-9D0E-4E2B-85B8-D8F4790360C9}" type="datetimeFigureOut">
               <a:rPr lang="en-US" smtClean="0"/>
               <a:pPr/>
-              <a:t>4/11/17</a:t>
+              <a:t>4/12/17</a:t>
             </a:fld>
             <a:endParaRPr lang="en-US" dirty="0"/>
           </a:p>
@@ -2899,7 +2899,7 @@
             <a:fld id="{985D6BDF-9D0E-4E2B-85B8-D8F4790360C9}" type="datetimeFigureOut">
               <a:rPr lang="en-US" smtClean="0"/>
               <a:pPr/>
-              <a:t>4/11/17</a:t>
+              <a:t>4/12/17</a:t>
             </a:fld>
             <a:endParaRPr lang="en-US" dirty="0"/>
           </a:p>
@@ -3250,7 +3250,7 @@
             <a:fld id="{985D6BDF-9D0E-4E2B-85B8-D8F4790360C9}" type="datetimeFigureOut">
               <a:rPr lang="en-US" smtClean="0"/>
               <a:pPr/>
-              <a:t>4/11/17</a:t>
+              <a:t>4/12/17</a:t>
             </a:fld>
             <a:endParaRPr lang="en-US" dirty="0"/>
           </a:p>
@@ -3624,7 +3624,7 @@
             <a:fld id="{985D6BDF-9D0E-4E2B-85B8-D8F4790360C9}" type="datetimeFigureOut">
               <a:rPr lang="en-US" smtClean="0"/>
               <a:pPr/>
-              <a:t>4/11/17</a:t>
+              <a:t>4/12/17</a:t>
             </a:fld>
             <a:endParaRPr lang="en-US" dirty="0"/>
           </a:p>
@@ -3908,7 +3908,7 @@
             <a:fld id="{985D6BDF-9D0E-4E2B-85B8-D8F4790360C9}" type="datetimeFigureOut">
               <a:rPr lang="en-US" smtClean="0"/>
               <a:pPr/>
-              <a:t>4/11/17</a:t>
+              <a:t>4/12/17</a:t>
             </a:fld>
             <a:endParaRPr lang="en-US" dirty="0"/>
           </a:p>
@@ -4782,7 +4782,7 @@
                 <a:ea typeface="Roboto" charset="0"/>
                 <a:cs typeface="Roboto" charset="0"/>
               </a:rPr>
-              <a:t>Advisors: Dr. Robert Adams, GVSU Ron Hull, Ehsan Rahman, James Uhi li </a:t>
+              <a:t>| Advisors</a:t>
             </a:r>
             <a:r>
               <a:rPr lang="en-US" sz="4000" dirty="0" smtClean="0">
@@ -4793,7 +4793,29 @@
                 <a:ea typeface="Roboto" charset="0"/>
                 <a:cs typeface="Roboto" charset="0"/>
               </a:rPr>
-              <a:t>Gordon Food Service</a:t>
+              <a:t>: Dr. Robert Adams, </a:t>
+            </a:r>
+            <a:r>
+              <a:rPr lang="en-US" sz="4000" dirty="0" smtClean="0">
+                <a:solidFill>
+                  <a:schemeClr val="tx2"/>
+                </a:solidFill>
+                <a:latin typeface="Roboto" charset="0"/>
+                <a:ea typeface="Roboto" charset="0"/>
+                <a:cs typeface="Roboto" charset="0"/>
+              </a:rPr>
+              <a:t>GVSU | </a:t>
+            </a:r>
+            <a:r>
+              <a:rPr lang="en-US" sz="4000" dirty="0" smtClean="0">
+                <a:solidFill>
+                  <a:schemeClr val="tx2"/>
+                </a:solidFill>
+                <a:latin typeface="Roboto" charset="0"/>
+                <a:ea typeface="Roboto" charset="0"/>
+                <a:cs typeface="Roboto" charset="0"/>
+              </a:rPr>
+              <a:t>Ron Hull, Ehsan Rahman, James Uhi li Gordon Food Service</a:t>
             </a:r>
             <a:endParaRPr lang="en-US" sz="4000" dirty="0">
               <a:solidFill>
@@ -6833,15 +6855,7 @@
                 <a:ea typeface="Roboto" charset="0"/>
                 <a:cs typeface="Roboto" charset="0"/>
               </a:rPr>
-              <a:t>Offline </a:t>
-            </a:r>
-            <a:r>
-              <a:rPr lang="en-US" sz="3600" dirty="0" smtClean="0">
-                <a:latin typeface="Roboto" charset="0"/>
-                <a:ea typeface="Roboto" charset="0"/>
-                <a:cs typeface="Roboto" charset="0"/>
-              </a:rPr>
-              <a:t>functionality </a:t>
+              <a:t>Offline functionality </a:t>
             </a:r>
             <a:r>
               <a:rPr lang="en-US" sz="3600" dirty="0">
@@ -7594,6 +7608,14 @@
               <a:buFont typeface="Arial" charset="0"/>
               <a:buChar char="•"/>
             </a:pPr>
+            <a:r>
+              <a:rPr lang="en-US" sz="3600" dirty="0" smtClean="0">
+                <a:latin typeface="Roboto" charset="0"/>
+                <a:ea typeface="Roboto" charset="0"/>
+                <a:cs typeface="Roboto" charset="0"/>
+              </a:rPr>
+              <a:t>Deployment will require a few steps to be taken by GFS prior to going live:</a:t>
+            </a:r>
             <a:endParaRPr lang="en-US" sz="3600" dirty="0" smtClean="0">
               <a:latin typeface="Roboto" charset="0"/>
               <a:ea typeface="Roboto" charset="0"/>
@@ -7601,25 +7623,6 @@
             </a:endParaRPr>
           </a:p>
           <a:p>
-            <a:pPr marL="571500" indent="-571500" defTabSz="913839" eaLnBrk="1" hangingPunct="1">
-              <a:buFont typeface="Arial" charset="0"/>
-              <a:buChar char="•"/>
-            </a:pPr>
-            <a:r>
-              <a:rPr lang="en-US" sz="3600" dirty="0" smtClean="0">
-                <a:latin typeface="Roboto" charset="0"/>
-                <a:ea typeface="Roboto" charset="0"/>
-                <a:cs typeface="Roboto" charset="0"/>
-              </a:rPr>
-              <a:t>Possible future areas to explore:</a:t>
-            </a:r>
-            <a:endParaRPr lang="en-US" sz="3600" dirty="0" smtClean="0">
-              <a:latin typeface="Roboto" charset="0"/>
-              <a:ea typeface="Roboto" charset="0"/>
-              <a:cs typeface="Roboto" charset="0"/>
-            </a:endParaRPr>
-          </a:p>
-          <a:p>
             <a:pPr marL="1314450" lvl="1" indent="-571500" defTabSz="913839" eaLnBrk="1" hangingPunct="1">
               <a:buFont typeface="Arial" charset="0"/>
               <a:buChar char="•"/>
@@ -7664,11 +7667,6 @@
               </a:rPr>
               <a:t> and sync frequency).</a:t>
             </a:r>
-            <a:endParaRPr lang="en-US" sz="3600" dirty="0" smtClean="0">
-              <a:latin typeface="Roboto" charset="0"/>
-              <a:ea typeface="Roboto" charset="0"/>
-              <a:cs typeface="Roboto" charset="0"/>
-            </a:endParaRPr>
           </a:p>
           <a:p>
             <a:pPr marL="1314450" lvl="1" indent="-571500" defTabSz="913839" eaLnBrk="1" hangingPunct="1">
@@ -7683,17 +7681,34 @@
               </a:rPr>
               <a:t>3D printed mounting solution</a:t>
             </a:r>
-            <a:endParaRPr lang="en-US" sz="3600" dirty="0" smtClean="0">
-              <a:latin typeface="Roboto" charset="0"/>
-              <a:ea typeface="Roboto" charset="0"/>
-              <a:cs typeface="Roboto" charset="0"/>
-            </a:endParaRPr>
           </a:p>
           <a:p>
             <a:pPr marL="1314450" lvl="1" indent="-571500" defTabSz="913839" eaLnBrk="1" hangingPunct="1">
               <a:buFont typeface="Arial" charset="0"/>
               <a:buChar char="•"/>
             </a:pPr>
+            <a:r>
+              <a:rPr lang="en-US" sz="3600" dirty="0" smtClean="0">
+                <a:latin typeface="Roboto" charset="0"/>
+                <a:ea typeface="Roboto" charset="0"/>
+                <a:cs typeface="Roboto" charset="0"/>
+              </a:rPr>
+              <a:t>User testing involving potential UI Updates</a:t>
+            </a:r>
+          </a:p>
+          <a:p>
+            <a:pPr marL="1314450" lvl="1" indent="-571500" defTabSz="913839" eaLnBrk="1" hangingPunct="1">
+              <a:buFont typeface="Arial" charset="0"/>
+              <a:buChar char="•"/>
+            </a:pPr>
+            <a:r>
+              <a:rPr lang="en-US" sz="3600" dirty="0" smtClean="0">
+                <a:latin typeface="Roboto" charset="0"/>
+                <a:ea typeface="Roboto" charset="0"/>
+                <a:cs typeface="Roboto" charset="0"/>
+              </a:rPr>
+              <a:t>In depth hardware consideration</a:t>
+            </a:r>
             <a:endParaRPr lang="en-US" sz="3600" dirty="0" smtClean="0">
               <a:latin typeface="Roboto" charset="0"/>
               <a:ea typeface="Roboto" charset="0"/>
@@ -7787,7 +7802,7 @@
                 <a:ea typeface="Roboto Medium" charset="0"/>
                 <a:cs typeface="Roboto Medium" charset="0"/>
               </a:rPr>
-              <a:t>Deployment</a:t>
+              <a:t>Future</a:t>
             </a:r>
             <a:endParaRPr lang="en-US" sz="4400" dirty="0">
               <a:solidFill>
@@ -7962,11 +7977,6 @@
               </a:rPr>
               <a:t>/android)</a:t>
             </a:r>
-            <a:endParaRPr lang="en-US" sz="3600" dirty="0" smtClean="0">
-              <a:latin typeface="Roboto" charset="0"/>
-              <a:ea typeface="Roboto" charset="0"/>
-              <a:cs typeface="Roboto" charset="0"/>
-            </a:endParaRPr>
           </a:p>
           <a:p>
             <a:pPr marL="571500" indent="-571500" defTabSz="913839" eaLnBrk="1" hangingPunct="1">

</xml_diff>